<commit_message>
updated my code to confirm with our hyperparamter discussion. Does not work yet
</commit_message>
<xml_diff>
--- a/models/diffpool_unet_architecture.pptx
+++ b/models/diffpool_unet_architecture.pptx
@@ -127,7 +127,7 @@
 <file path=ppt/revisionInfo.xml><?xml version="1.0" encoding="utf-8"?>
 <p1510:revInfo xmlns:a="http://schemas.openxmlformats.org/drawingml/2006/main" xmlns:r="http://schemas.openxmlformats.org/officeDocument/2006/relationships" xmlns:p1510="http://schemas.microsoft.com/office/powerpoint/2015/10/main">
   <p1510:revLst>
-    <p1510:client id="{2905985C-D2AF-4E47-976F-9F6DE4D7A03C}" v="131" dt="2020-01-13T16:05:27.278"/>
+    <p1510:client id="{2905985C-D2AF-4E47-976F-9F6DE4D7A03C}" v="161" dt="2020-01-13T17:05:36.576"/>
   </p1510:revLst>
 </p1510:revInfo>
 </file>
@@ -137,7 +137,7 @@
   <pc:docChgLst>
     <pc:chgData name="Henry Martin" userId="cc6f2d1fd4666abe" providerId="LiveId" clId="{2905985C-D2AF-4E47-976F-9F6DE4D7A03C}"/>
     <pc:docChg chg="undo custSel addSld modSld">
-      <pc:chgData name="Henry Martin" userId="cc6f2d1fd4666abe" providerId="LiveId" clId="{2905985C-D2AF-4E47-976F-9F6DE4D7A03C}" dt="2020-01-13T16:05:46.060" v="586" actId="1076"/>
+      <pc:chgData name="Henry Martin" userId="cc6f2d1fd4666abe" providerId="LiveId" clId="{2905985C-D2AF-4E47-976F-9F6DE4D7A03C}" dt="2020-01-13T17:05:44.553" v="1018" actId="6549"/>
       <pc:docMkLst>
         <pc:docMk/>
       </pc:docMkLst>
@@ -525,7 +525,7 @@
         </pc:spChg>
       </pc:sldChg>
       <pc:sldChg chg="addSp delSp modSp add">
-        <pc:chgData name="Henry Martin" userId="cc6f2d1fd4666abe" providerId="LiveId" clId="{2905985C-D2AF-4E47-976F-9F6DE4D7A03C}" dt="2020-01-13T16:05:46.060" v="586" actId="1076"/>
+        <pc:chgData name="Henry Martin" userId="cc6f2d1fd4666abe" providerId="LiveId" clId="{2905985C-D2AF-4E47-976F-9F6DE4D7A03C}" dt="2020-01-13T17:05:44.553" v="1018" actId="6549"/>
         <pc:sldMkLst>
           <pc:docMk/>
           <pc:sldMk cId="2084767380" sldId="257"/>
@@ -538,8 +538,8 @@
             <ac:spMk id="2" creationId="{C33A6264-182B-4547-969A-71E6D2C683D2}"/>
           </ac:spMkLst>
         </pc:spChg>
-        <pc:spChg chg="add mod">
-          <ac:chgData name="Henry Martin" userId="cc6f2d1fd4666abe" providerId="LiveId" clId="{2905985C-D2AF-4E47-976F-9F6DE4D7A03C}" dt="2020-01-13T15:56:59.621" v="377" actId="164"/>
+        <pc:spChg chg="add mod topLvl">
+          <ac:chgData name="Henry Martin" userId="cc6f2d1fd4666abe" providerId="LiveId" clId="{2905985C-D2AF-4E47-976F-9F6DE4D7A03C}" dt="2020-01-13T16:15:50.471" v="681" actId="20577"/>
           <ac:spMkLst>
             <pc:docMk/>
             <pc:sldMk cId="2084767380" sldId="257"/>
@@ -562,14 +562,22 @@
             <ac:spMk id="5" creationId="{04BBD4F2-45A4-479D-ACE4-7368C87A9A41}"/>
           </ac:spMkLst>
         </pc:spChg>
-        <pc:spChg chg="mod">
-          <ac:chgData name="Henry Martin" userId="cc6f2d1fd4666abe" providerId="LiveId" clId="{2905985C-D2AF-4E47-976F-9F6DE4D7A03C}" dt="2020-01-13T15:56:59.621" v="377" actId="164"/>
+        <pc:spChg chg="mod topLvl">
+          <ac:chgData name="Henry Martin" userId="cc6f2d1fd4666abe" providerId="LiveId" clId="{2905985C-D2AF-4E47-976F-9F6DE4D7A03C}" dt="2020-01-13T16:10:12.070" v="619" actId="165"/>
           <ac:spMkLst>
             <pc:docMk/>
             <pc:sldMk cId="2084767380" sldId="257"/>
             <ac:spMk id="9" creationId="{C4197ACF-7A33-4477-AA05-A911ABD020CE}"/>
           </ac:spMkLst>
         </pc:spChg>
+        <pc:spChg chg="add mod">
+          <ac:chgData name="Henry Martin" userId="cc6f2d1fd4666abe" providerId="LiveId" clId="{2905985C-D2AF-4E47-976F-9F6DE4D7A03C}" dt="2020-01-13T16:20:17.948" v="793" actId="1076"/>
+          <ac:spMkLst>
+            <pc:docMk/>
+            <pc:sldMk cId="2084767380" sldId="257"/>
+            <ac:spMk id="10" creationId="{66854192-106D-45AD-A631-E42BF53DA55A}"/>
+          </ac:spMkLst>
+        </pc:spChg>
         <pc:spChg chg="mod topLvl">
           <ac:chgData name="Henry Martin" userId="cc6f2d1fd4666abe" providerId="LiveId" clId="{2905985C-D2AF-4E47-976F-9F6DE4D7A03C}" dt="2020-01-13T16:00:07.485" v="450" actId="164"/>
           <ac:spMkLst>
@@ -578,6 +586,14 @@
             <ac:spMk id="11" creationId="{28203AEB-4905-4C25-8693-670EC5394134}"/>
           </ac:spMkLst>
         </pc:spChg>
+        <pc:spChg chg="add mod">
+          <ac:chgData name="Henry Martin" userId="cc6f2d1fd4666abe" providerId="LiveId" clId="{2905985C-D2AF-4E47-976F-9F6DE4D7A03C}" dt="2020-01-13T16:22:02.397" v="836" actId="1076"/>
+          <ac:spMkLst>
+            <pc:docMk/>
+            <pc:sldMk cId="2084767380" sldId="257"/>
+            <ac:spMk id="12" creationId="{18F2B010-5EAB-406C-9BFF-B5E467427404}"/>
+          </ac:spMkLst>
+        </pc:spChg>
         <pc:spChg chg="del mod">
           <ac:chgData name="Henry Martin" userId="cc6f2d1fd4666abe" providerId="LiveId" clId="{2905985C-D2AF-4E47-976F-9F6DE4D7A03C}" dt="2020-01-13T15:58:34.310" v="398" actId="478"/>
           <ac:spMkLst>
@@ -586,6 +602,14 @@
             <ac:spMk id="12" creationId="{7BCB1638-E6DF-4E46-A76F-6110FF583032}"/>
           </ac:spMkLst>
         </pc:spChg>
+        <pc:spChg chg="add mod">
+          <ac:chgData name="Henry Martin" userId="cc6f2d1fd4666abe" providerId="LiveId" clId="{2905985C-D2AF-4E47-976F-9F6DE4D7A03C}" dt="2020-01-13T17:05:44.553" v="1018" actId="6549"/>
+          <ac:spMkLst>
+            <pc:docMk/>
+            <pc:sldMk cId="2084767380" sldId="257"/>
+            <ac:spMk id="13" creationId="{CA661599-50C4-4E07-9D09-5C9E7C4F8A83}"/>
+          </ac:spMkLst>
+        </pc:spChg>
         <pc:spChg chg="mod topLvl">
           <ac:chgData name="Henry Martin" userId="cc6f2d1fd4666abe" providerId="LiveId" clId="{2905985C-D2AF-4E47-976F-9F6DE4D7A03C}" dt="2020-01-13T16:02:12.773" v="495" actId="465"/>
           <ac:spMkLst>
@@ -603,7 +627,7 @@
           </ac:spMkLst>
         </pc:spChg>
         <pc:spChg chg="mod topLvl">
-          <ac:chgData name="Henry Martin" userId="cc6f2d1fd4666abe" providerId="LiveId" clId="{2905985C-D2AF-4E47-976F-9F6DE4D7A03C}" dt="2020-01-13T16:02:24.245" v="498" actId="12788"/>
+          <ac:chgData name="Henry Martin" userId="cc6f2d1fd4666abe" providerId="LiveId" clId="{2905985C-D2AF-4E47-976F-9F6DE4D7A03C}" dt="2020-01-13T16:17:51.061" v="731" actId="1076"/>
           <ac:spMkLst>
             <pc:docMk/>
             <pc:sldMk cId="2084767380" sldId="257"/>
@@ -627,7 +651,7 @@
           </ac:spMkLst>
         </pc:spChg>
         <pc:spChg chg="mod topLvl">
-          <ac:chgData name="Henry Martin" userId="cc6f2d1fd4666abe" providerId="LiveId" clId="{2905985C-D2AF-4E47-976F-9F6DE4D7A03C}" dt="2020-01-13T16:00:17.460" v="453" actId="164"/>
+          <ac:chgData name="Henry Martin" userId="cc6f2d1fd4666abe" providerId="LiveId" clId="{2905985C-D2AF-4E47-976F-9F6DE4D7A03C}" dt="2020-01-13T16:16:13.126" v="682" actId="478"/>
           <ac:spMkLst>
             <pc:docMk/>
             <pc:sldMk cId="2084767380" sldId="257"/>
@@ -635,7 +659,7 @@
           </ac:spMkLst>
         </pc:spChg>
         <pc:spChg chg="mod topLvl">
-          <ac:chgData name="Henry Martin" userId="cc6f2d1fd4666abe" providerId="LiveId" clId="{2905985C-D2AF-4E47-976F-9F6DE4D7A03C}" dt="2020-01-13T16:02:16.429" v="496" actId="465"/>
+          <ac:chgData name="Henry Martin" userId="cc6f2d1fd4666abe" providerId="LiveId" clId="{2905985C-D2AF-4E47-976F-9F6DE4D7A03C}" dt="2020-01-13T16:17:51.061" v="731" actId="1076"/>
           <ac:spMkLst>
             <pc:docMk/>
             <pc:sldMk cId="2084767380" sldId="257"/>
@@ -650,8 +674,8 @@
             <ac:spMk id="27" creationId="{53ED714E-D598-41DA-83DC-6CA6839E7EF8}"/>
           </ac:spMkLst>
         </pc:spChg>
-        <pc:spChg chg="mod">
-          <ac:chgData name="Henry Martin" userId="cc6f2d1fd4666abe" providerId="LiveId" clId="{2905985C-D2AF-4E47-976F-9F6DE4D7A03C}" dt="2020-01-13T16:01:05.837" v="463" actId="164"/>
+        <pc:spChg chg="mod topLvl">
+          <ac:chgData name="Henry Martin" userId="cc6f2d1fd4666abe" providerId="LiveId" clId="{2905985C-D2AF-4E47-976F-9F6DE4D7A03C}" dt="2020-01-13T16:16:53.174" v="702" actId="478"/>
           <ac:spMkLst>
             <pc:docMk/>
             <pc:sldMk cId="2084767380" sldId="257"/>
@@ -667,7 +691,7 @@
           </ac:spMkLst>
         </pc:spChg>
         <pc:spChg chg="mod topLvl">
-          <ac:chgData name="Henry Martin" userId="cc6f2d1fd4666abe" providerId="LiveId" clId="{2905985C-D2AF-4E47-976F-9F6DE4D7A03C}" dt="2020-01-13T16:02:16.429" v="496" actId="465"/>
+          <ac:chgData name="Henry Martin" userId="cc6f2d1fd4666abe" providerId="LiveId" clId="{2905985C-D2AF-4E47-976F-9F6DE4D7A03C}" dt="2020-01-13T16:17:51.061" v="731" actId="1076"/>
           <ac:spMkLst>
             <pc:docMk/>
             <pc:sldMk cId="2084767380" sldId="257"/>
@@ -683,7 +707,7 @@
           </ac:spMkLst>
         </pc:spChg>
         <pc:spChg chg="mod topLvl">
-          <ac:chgData name="Henry Martin" userId="cc6f2d1fd4666abe" providerId="LiveId" clId="{2905985C-D2AF-4E47-976F-9F6DE4D7A03C}" dt="2020-01-13T16:00:15.092" v="452" actId="164"/>
+          <ac:chgData name="Henry Martin" userId="cc6f2d1fd4666abe" providerId="LiveId" clId="{2905985C-D2AF-4E47-976F-9F6DE4D7A03C}" dt="2020-01-13T16:18:55.510" v="752" actId="478"/>
           <ac:spMkLst>
             <pc:docMk/>
             <pc:sldMk cId="2084767380" sldId="257"/>
@@ -770,16 +794,16 @@
             <ac:spMk id="43" creationId="{3D438139-2456-494D-88A4-1171BC6F495E}"/>
           </ac:spMkLst>
         </pc:spChg>
-        <pc:spChg chg="add mod">
-          <ac:chgData name="Henry Martin" userId="cc6f2d1fd4666abe" providerId="LiveId" clId="{2905985C-D2AF-4E47-976F-9F6DE4D7A03C}" dt="2020-01-13T15:57:03.373" v="379" actId="164"/>
+        <pc:spChg chg="add del mod topLvl">
+          <ac:chgData name="Henry Martin" userId="cc6f2d1fd4666abe" providerId="LiveId" clId="{2905985C-D2AF-4E47-976F-9F6DE4D7A03C}" dt="2020-01-13T16:22:14.423" v="839" actId="478"/>
           <ac:spMkLst>
             <pc:docMk/>
             <pc:sldMk cId="2084767380" sldId="257"/>
             <ac:spMk id="44" creationId="{0D272F5F-148A-41EB-964B-347493397D31}"/>
           </ac:spMkLst>
         </pc:spChg>
-        <pc:spChg chg="mod">
-          <ac:chgData name="Henry Martin" userId="cc6f2d1fd4666abe" providerId="LiveId" clId="{2905985C-D2AF-4E47-976F-9F6DE4D7A03C}" dt="2020-01-13T15:57:03.373" v="379" actId="164"/>
+        <pc:spChg chg="mod topLvl">
+          <ac:chgData name="Henry Martin" userId="cc6f2d1fd4666abe" providerId="LiveId" clId="{2905985C-D2AF-4E47-976F-9F6DE4D7A03C}" dt="2020-01-13T16:22:14.423" v="839" actId="478"/>
           <ac:spMkLst>
             <pc:docMk/>
             <pc:sldMk cId="2084767380" sldId="257"/>
@@ -810,24 +834,24 @@
             <ac:spMk id="48" creationId="{E0156F9F-5DB5-4A6F-9230-76E2591E3146}"/>
           </ac:spMkLst>
         </pc:spChg>
-        <pc:spChg chg="add mod topLvl">
-          <ac:chgData name="Henry Martin" userId="cc6f2d1fd4666abe" providerId="LiveId" clId="{2905985C-D2AF-4E47-976F-9F6DE4D7A03C}" dt="2020-01-13T16:00:17.460" v="453" actId="164"/>
+        <pc:spChg chg="add del mod topLvl">
+          <ac:chgData name="Henry Martin" userId="cc6f2d1fd4666abe" providerId="LiveId" clId="{2905985C-D2AF-4E47-976F-9F6DE4D7A03C}" dt="2020-01-13T16:16:13.126" v="682" actId="478"/>
           <ac:spMkLst>
             <pc:docMk/>
             <pc:sldMk cId="2084767380" sldId="257"/>
             <ac:spMk id="49" creationId="{85923EAB-54DA-4A19-8891-66924C34DDDA}"/>
           </ac:spMkLst>
         </pc:spChg>
-        <pc:spChg chg="add mod">
-          <ac:chgData name="Henry Martin" userId="cc6f2d1fd4666abe" providerId="LiveId" clId="{2905985C-D2AF-4E47-976F-9F6DE4D7A03C}" dt="2020-01-13T16:01:05.837" v="463" actId="164"/>
+        <pc:spChg chg="add del mod topLvl">
+          <ac:chgData name="Henry Martin" userId="cc6f2d1fd4666abe" providerId="LiveId" clId="{2905985C-D2AF-4E47-976F-9F6DE4D7A03C}" dt="2020-01-13T16:16:53.174" v="702" actId="478"/>
           <ac:spMkLst>
             <pc:docMk/>
             <pc:sldMk cId="2084767380" sldId="257"/>
             <ac:spMk id="50" creationId="{E1D4595E-9E63-41AA-985B-9E576073864D}"/>
           </ac:spMkLst>
         </pc:spChg>
-        <pc:spChg chg="add mod topLvl">
-          <ac:chgData name="Henry Martin" userId="cc6f2d1fd4666abe" providerId="LiveId" clId="{2905985C-D2AF-4E47-976F-9F6DE4D7A03C}" dt="2020-01-13T16:00:15.092" v="452" actId="164"/>
+        <pc:spChg chg="add del mod topLvl">
+          <ac:chgData name="Henry Martin" userId="cc6f2d1fd4666abe" providerId="LiveId" clId="{2905985C-D2AF-4E47-976F-9F6DE4D7A03C}" dt="2020-01-13T16:18:55.510" v="752" actId="478"/>
           <ac:spMkLst>
             <pc:docMk/>
             <pc:sldMk cId="2084767380" sldId="257"/>
@@ -859,7 +883,7 @@
           </ac:spMkLst>
         </pc:spChg>
         <pc:spChg chg="add mod">
-          <ac:chgData name="Henry Martin" userId="cc6f2d1fd4666abe" providerId="LiveId" clId="{2905985C-D2AF-4E47-976F-9F6DE4D7A03C}" dt="2020-01-13T16:05:27.278" v="581" actId="12789"/>
+          <ac:chgData name="Henry Martin" userId="cc6f2d1fd4666abe" providerId="LiveId" clId="{2905985C-D2AF-4E47-976F-9F6DE4D7A03C}" dt="2020-01-13T16:17:57.236" v="732" actId="1076"/>
           <ac:spMkLst>
             <pc:docMk/>
             <pc:sldMk cId="2084767380" sldId="257"/>
@@ -867,7 +891,7 @@
           </ac:spMkLst>
         </pc:spChg>
         <pc:spChg chg="add mod">
-          <ac:chgData name="Henry Martin" userId="cc6f2d1fd4666abe" providerId="LiveId" clId="{2905985C-D2AF-4E47-976F-9F6DE4D7A03C}" dt="2020-01-13T16:05:46.060" v="586" actId="1076"/>
+          <ac:chgData name="Henry Martin" userId="cc6f2d1fd4666abe" providerId="LiveId" clId="{2905985C-D2AF-4E47-976F-9F6DE4D7A03C}" dt="2020-01-13T16:17:51.061" v="731" actId="1076"/>
           <ac:spMkLst>
             <pc:docMk/>
             <pc:sldMk cId="2084767380" sldId="257"/>
@@ -875,7 +899,7 @@
           </ac:spMkLst>
         </pc:spChg>
         <pc:spChg chg="add mod">
-          <ac:chgData name="Henry Martin" userId="cc6f2d1fd4666abe" providerId="LiveId" clId="{2905985C-D2AF-4E47-976F-9F6DE4D7A03C}" dt="2020-01-13T16:05:27.278" v="581" actId="12789"/>
+          <ac:chgData name="Henry Martin" userId="cc6f2d1fd4666abe" providerId="LiveId" clId="{2905985C-D2AF-4E47-976F-9F6DE4D7A03C}" dt="2020-01-13T16:17:51.061" v="731" actId="1076"/>
           <ac:spMkLst>
             <pc:docMk/>
             <pc:sldMk cId="2084767380" sldId="257"/>
@@ -891,7 +915,7 @@
           </ac:spMkLst>
         </pc:spChg>
         <pc:spChg chg="add mod">
-          <ac:chgData name="Henry Martin" userId="cc6f2d1fd4666abe" providerId="LiveId" clId="{2905985C-D2AF-4E47-976F-9F6DE4D7A03C}" dt="2020-01-13T16:05:32.789" v="582" actId="1076"/>
+          <ac:chgData name="Henry Martin" userId="cc6f2d1fd4666abe" providerId="LiveId" clId="{2905985C-D2AF-4E47-976F-9F6DE4D7A03C}" dt="2020-01-13T16:45:59.558" v="1009" actId="20577"/>
           <ac:spMkLst>
             <pc:docMk/>
             <pc:sldMk cId="2084767380" sldId="257"/>
@@ -915,7 +939,7 @@
           </ac:spMkLst>
         </pc:spChg>
         <pc:spChg chg="add mod">
-          <ac:chgData name="Henry Martin" userId="cc6f2d1fd4666abe" providerId="LiveId" clId="{2905985C-D2AF-4E47-976F-9F6DE4D7A03C}" dt="2020-01-13T16:05:11.701" v="579" actId="12789"/>
+          <ac:chgData name="Henry Martin" userId="cc6f2d1fd4666abe" providerId="LiveId" clId="{2905985C-D2AF-4E47-976F-9F6DE4D7A03C}" dt="2020-01-13T16:17:57.236" v="732" actId="1076"/>
           <ac:spMkLst>
             <pc:docMk/>
             <pc:sldMk cId="2084767380" sldId="257"/>
@@ -939,6 +963,14 @@
           </ac:spMkLst>
         </pc:spChg>
         <pc:spChg chg="add mod">
+          <ac:chgData name="Henry Martin" userId="cc6f2d1fd4666abe" providerId="LiveId" clId="{2905985C-D2AF-4E47-976F-9F6DE4D7A03C}" dt="2020-01-13T16:09:56.252" v="605" actId="1076"/>
+          <ac:spMkLst>
+            <pc:docMk/>
+            <pc:sldMk cId="2084767380" sldId="257"/>
+            <ac:spMk id="68" creationId="{6B70A8AF-5C9B-4119-8215-FA0798DC71B6}"/>
+          </ac:spMkLst>
+        </pc:spChg>
+        <pc:spChg chg="add mod">
           <ac:chgData name="Henry Martin" userId="cc6f2d1fd4666abe" providerId="LiveId" clId="{2905985C-D2AF-4E47-976F-9F6DE4D7A03C}" dt="2020-01-13T16:04:37.672" v="556" actId="571"/>
           <ac:spMkLst>
             <pc:docMk/>
@@ -947,6 +979,14 @@
           </ac:spMkLst>
         </pc:spChg>
         <pc:spChg chg="add mod">
+          <ac:chgData name="Henry Martin" userId="cc6f2d1fd4666abe" providerId="LiveId" clId="{2905985C-D2AF-4E47-976F-9F6DE4D7A03C}" dt="2020-01-13T16:18:02.124" v="733" actId="1076"/>
+          <ac:spMkLst>
+            <pc:docMk/>
+            <pc:sldMk cId="2084767380" sldId="257"/>
+            <ac:spMk id="69" creationId="{7E697601-8771-4F6E-B4F6-80C40A9BB7B5}"/>
+          </ac:spMkLst>
+        </pc:spChg>
+        <pc:spChg chg="add mod">
           <ac:chgData name="Henry Martin" userId="cc6f2d1fd4666abe" providerId="LiveId" clId="{2905985C-D2AF-4E47-976F-9F6DE4D7A03C}" dt="2020-01-13T16:04:37.672" v="556" actId="571"/>
           <ac:spMkLst>
             <pc:docMk/>
@@ -954,6 +994,22 @@
             <ac:spMk id="70" creationId="{0ED504F5-EA36-4E57-BCBE-36F1E1EC71E8}"/>
           </ac:spMkLst>
         </pc:spChg>
+        <pc:spChg chg="add del mod">
+          <ac:chgData name="Henry Martin" userId="cc6f2d1fd4666abe" providerId="LiveId" clId="{2905985C-D2AF-4E47-976F-9F6DE4D7A03C}" dt="2020-01-13T16:18:08.870" v="734" actId="478"/>
+          <ac:spMkLst>
+            <pc:docMk/>
+            <pc:sldMk cId="2084767380" sldId="257"/>
+            <ac:spMk id="70" creationId="{C97E659E-C5C2-4B02-A187-2077CCBFE303}"/>
+          </ac:spMkLst>
+        </pc:spChg>
+        <pc:spChg chg="add del mod">
+          <ac:chgData name="Henry Martin" userId="cc6f2d1fd4666abe" providerId="LiveId" clId="{2905985C-D2AF-4E47-976F-9F6DE4D7A03C}" dt="2020-01-13T16:18:19.606" v="737" actId="478"/>
+          <ac:spMkLst>
+            <pc:docMk/>
+            <pc:sldMk cId="2084767380" sldId="257"/>
+            <ac:spMk id="71" creationId="{0ACCB248-6D0D-48F7-8950-AE693E7D77E8}"/>
+          </ac:spMkLst>
+        </pc:spChg>
         <pc:spChg chg="add mod">
           <ac:chgData name="Henry Martin" userId="cc6f2d1fd4666abe" providerId="LiveId" clId="{2905985C-D2AF-4E47-976F-9F6DE4D7A03C}" dt="2020-01-13T16:04:37.672" v="556" actId="571"/>
           <ac:spMkLst>
@@ -962,16 +1018,120 @@
             <ac:spMk id="71" creationId="{65FC7540-F551-4E27-8EC0-2D02C49C40AA}"/>
           </ac:spMkLst>
         </pc:spChg>
-        <pc:grpChg chg="add mod">
-          <ac:chgData name="Henry Martin" userId="cc6f2d1fd4666abe" providerId="LiveId" clId="{2905985C-D2AF-4E47-976F-9F6DE4D7A03C}" dt="2020-01-13T15:57:17.517" v="382" actId="408"/>
+        <pc:spChg chg="add mod">
+          <ac:chgData name="Henry Martin" userId="cc6f2d1fd4666abe" providerId="LiveId" clId="{2905985C-D2AF-4E47-976F-9F6DE4D7A03C}" dt="2020-01-13T16:41:11.240" v="1006" actId="20577"/>
+          <ac:spMkLst>
+            <pc:docMk/>
+            <pc:sldMk cId="2084767380" sldId="257"/>
+            <ac:spMk id="72" creationId="{EF8176B5-5500-4705-B082-481EFFD04FB8}"/>
+          </ac:spMkLst>
+        </pc:spChg>
+        <pc:spChg chg="add mod">
+          <ac:chgData name="Henry Martin" userId="cc6f2d1fd4666abe" providerId="LiveId" clId="{2905985C-D2AF-4E47-976F-9F6DE4D7A03C}" dt="2020-01-13T16:22:42.868" v="867" actId="1076"/>
+          <ac:spMkLst>
+            <pc:docMk/>
+            <pc:sldMk cId="2084767380" sldId="257"/>
+            <ac:spMk id="73" creationId="{2C038B75-BA5C-41F6-8C34-72260E035814}"/>
+          </ac:spMkLst>
+        </pc:spChg>
+        <pc:spChg chg="add mod">
+          <ac:chgData name="Henry Martin" userId="cc6f2d1fd4666abe" providerId="LiveId" clId="{2905985C-D2AF-4E47-976F-9F6DE4D7A03C}" dt="2020-01-13T16:37:19.862" v="989" actId="20577"/>
+          <ac:spMkLst>
+            <pc:docMk/>
+            <pc:sldMk cId="2084767380" sldId="257"/>
+            <ac:spMk id="74" creationId="{1F2B487B-9BAE-4CFC-AAC2-ED16C06CE1B4}"/>
+          </ac:spMkLst>
+        </pc:spChg>
+        <pc:spChg chg="add del mod">
+          <ac:chgData name="Henry Martin" userId="cc6f2d1fd4666abe" providerId="LiveId" clId="{2905985C-D2AF-4E47-976F-9F6DE4D7A03C}" dt="2020-01-13T16:29:55.991" v="949" actId="478"/>
+          <ac:spMkLst>
+            <pc:docMk/>
+            <pc:sldMk cId="2084767380" sldId="257"/>
+            <ac:spMk id="75" creationId="{81297043-DB4B-44EA-AFB7-5141101BD53E}"/>
+          </ac:spMkLst>
+        </pc:spChg>
+        <pc:spChg chg="add mod">
+          <ac:chgData name="Henry Martin" userId="cc6f2d1fd4666abe" providerId="LiveId" clId="{2905985C-D2AF-4E47-976F-9F6DE4D7A03C}" dt="2020-01-13T16:22:06.580" v="838" actId="1076"/>
+          <ac:spMkLst>
+            <pc:docMk/>
+            <pc:sldMk cId="2084767380" sldId="257"/>
+            <ac:spMk id="76" creationId="{16FD38B4-2F24-40E3-81BA-A8654739A77A}"/>
+          </ac:spMkLst>
+        </pc:spChg>
+        <pc:spChg chg="add mod">
+          <ac:chgData name="Henry Martin" userId="cc6f2d1fd4666abe" providerId="LiveId" clId="{2905985C-D2AF-4E47-976F-9F6DE4D7A03C}" dt="2020-01-13T16:22:34.872" v="866" actId="20577"/>
+          <ac:spMkLst>
+            <pc:docMk/>
+            <pc:sldMk cId="2084767380" sldId="257"/>
+            <ac:spMk id="77" creationId="{496DC1E0-6079-43EE-88D8-1B8672F483B3}"/>
+          </ac:spMkLst>
+        </pc:spChg>
+        <pc:spChg chg="add mod">
+          <ac:chgData name="Henry Martin" userId="cc6f2d1fd4666abe" providerId="LiveId" clId="{2905985C-D2AF-4E47-976F-9F6DE4D7A03C}" dt="2020-01-13T16:22:55.540" v="872" actId="1076"/>
+          <ac:spMkLst>
+            <pc:docMk/>
+            <pc:sldMk cId="2084767380" sldId="257"/>
+            <ac:spMk id="78" creationId="{229BE1E8-7A6F-45DD-9668-0EA34D05E781}"/>
+          </ac:spMkLst>
+        </pc:spChg>
+        <pc:spChg chg="add mod">
+          <ac:chgData name="Henry Martin" userId="cc6f2d1fd4666abe" providerId="LiveId" clId="{2905985C-D2AF-4E47-976F-9F6DE4D7A03C}" dt="2020-01-13T16:22:59.472" v="874" actId="20577"/>
+          <ac:spMkLst>
+            <pc:docMk/>
+            <pc:sldMk cId="2084767380" sldId="257"/>
+            <ac:spMk id="79" creationId="{C40F302E-85F1-405C-AF98-3E69E320E45C}"/>
+          </ac:spMkLst>
+        </pc:spChg>
+        <pc:spChg chg="add del">
+          <ac:chgData name="Henry Martin" userId="cc6f2d1fd4666abe" providerId="LiveId" clId="{2905985C-D2AF-4E47-976F-9F6DE4D7A03C}" dt="2020-01-13T16:23:08.853" v="876"/>
+          <ac:spMkLst>
+            <pc:docMk/>
+            <pc:sldMk cId="2084767380" sldId="257"/>
+            <ac:spMk id="80" creationId="{AA1E2EEC-1707-4DEE-9955-83D7D50A3F56}"/>
+          </ac:spMkLst>
+        </pc:spChg>
+        <pc:spChg chg="add mod">
+          <ac:chgData name="Henry Martin" userId="cc6f2d1fd4666abe" providerId="LiveId" clId="{2905985C-D2AF-4E47-976F-9F6DE4D7A03C}" dt="2020-01-13T16:23:17.957" v="883" actId="1076"/>
+          <ac:spMkLst>
+            <pc:docMk/>
+            <pc:sldMk cId="2084767380" sldId="257"/>
+            <ac:spMk id="81" creationId="{40779BD3-A282-491A-B08F-79DE84B05662}"/>
+          </ac:spMkLst>
+        </pc:spChg>
+        <pc:spChg chg="add mod">
+          <ac:chgData name="Henry Martin" userId="cc6f2d1fd4666abe" providerId="LiveId" clId="{2905985C-D2AF-4E47-976F-9F6DE4D7A03C}" dt="2020-01-13T16:23:29.228" v="886" actId="1076"/>
+          <ac:spMkLst>
+            <pc:docMk/>
+            <pc:sldMk cId="2084767380" sldId="257"/>
+            <ac:spMk id="82" creationId="{6A62F598-CF83-41DA-908A-5A203F60C66D}"/>
+          </ac:spMkLst>
+        </pc:spChg>
+        <pc:spChg chg="add del mod">
+          <ac:chgData name="Henry Martin" userId="cc6f2d1fd4666abe" providerId="LiveId" clId="{2905985C-D2AF-4E47-976F-9F6DE4D7A03C}" dt="2020-01-13T16:37:01.783" v="981" actId="478"/>
+          <ac:spMkLst>
+            <pc:docMk/>
+            <pc:sldMk cId="2084767380" sldId="257"/>
+            <ac:spMk id="83" creationId="{994734B7-3D50-45F1-A4F6-16BADC992EB8}"/>
+          </ac:spMkLst>
+        </pc:spChg>
+        <pc:spChg chg="add mod">
+          <ac:chgData name="Henry Martin" userId="cc6f2d1fd4666abe" providerId="LiveId" clId="{2905985C-D2AF-4E47-976F-9F6DE4D7A03C}" dt="2020-01-13T16:37:42.423" v="1005" actId="20577"/>
+          <ac:spMkLst>
+            <pc:docMk/>
+            <pc:sldMk cId="2084767380" sldId="257"/>
+            <ac:spMk id="84" creationId="{2CCD6E27-51E5-4B75-BECE-6E523A85497B}"/>
+          </ac:spMkLst>
+        </pc:spChg>
+        <pc:grpChg chg="add del mod">
+          <ac:chgData name="Henry Martin" userId="cc6f2d1fd4666abe" providerId="LiveId" clId="{2905985C-D2AF-4E47-976F-9F6DE4D7A03C}" dt="2020-01-13T16:10:12.070" v="619" actId="165"/>
           <ac:grpSpMkLst>
             <pc:docMk/>
             <pc:sldMk cId="2084767380" sldId="257"/>
             <ac:grpSpMk id="6" creationId="{E2CA4807-F08B-4D41-A68D-84799BB28804}"/>
           </ac:grpSpMkLst>
         </pc:grpChg>
-        <pc:grpChg chg="add mod">
-          <ac:chgData name="Henry Martin" userId="cc6f2d1fd4666abe" providerId="LiveId" clId="{2905985C-D2AF-4E47-976F-9F6DE4D7A03C}" dt="2020-01-13T15:57:17.517" v="382" actId="408"/>
+        <pc:grpChg chg="add del mod">
+          <ac:chgData name="Henry Martin" userId="cc6f2d1fd4666abe" providerId="LiveId" clId="{2905985C-D2AF-4E47-976F-9F6DE4D7A03C}" dt="2020-01-13T16:22:14.423" v="839" actId="478"/>
           <ac:grpSpMkLst>
             <pc:docMk/>
             <pc:sldMk cId="2084767380" sldId="257"/>
@@ -1027,7 +1187,7 @@
           </ac:grpSpMkLst>
         </pc:grpChg>
         <pc:grpChg chg="add mod topLvl">
-          <ac:chgData name="Henry Martin" userId="cc6f2d1fd4666abe" providerId="LiveId" clId="{2905985C-D2AF-4E47-976F-9F6DE4D7A03C}" dt="2020-01-13T16:02:12.773" v="495" actId="465"/>
+          <ac:chgData name="Henry Martin" userId="cc6f2d1fd4666abe" providerId="LiveId" clId="{2905985C-D2AF-4E47-976F-9F6DE4D7A03C}" dt="2020-01-13T16:20:02.630" v="784" actId="1076"/>
           <ac:grpSpMkLst>
             <pc:docMk/>
             <pc:sldMk cId="2084767380" sldId="257"/>
@@ -1035,7 +1195,7 @@
           </ac:grpSpMkLst>
         </pc:grpChg>
         <pc:grpChg chg="add mod">
-          <ac:chgData name="Henry Martin" userId="cc6f2d1fd4666abe" providerId="LiveId" clId="{2905985C-D2AF-4E47-976F-9F6DE4D7A03C}" dt="2020-01-13T16:00:07.485" v="450" actId="164"/>
+          <ac:chgData name="Henry Martin" userId="cc6f2d1fd4666abe" providerId="LiveId" clId="{2905985C-D2AF-4E47-976F-9F6DE4D7A03C}" dt="2020-01-13T16:17:57.236" v="732" actId="1076"/>
           <ac:grpSpMkLst>
             <pc:docMk/>
             <pc:sldMk cId="2084767380" sldId="257"/>
@@ -1050,24 +1210,24 @@
             <ac:grpSpMk id="20" creationId="{73760071-A232-4BC7-AEDB-241D49F966E1}"/>
           </ac:grpSpMkLst>
         </pc:grpChg>
-        <pc:grpChg chg="add mod">
-          <ac:chgData name="Henry Martin" userId="cc6f2d1fd4666abe" providerId="LiveId" clId="{2905985C-D2AF-4E47-976F-9F6DE4D7A03C}" dt="2020-01-13T16:00:15.092" v="452" actId="164"/>
+        <pc:grpChg chg="add del mod">
+          <ac:chgData name="Henry Martin" userId="cc6f2d1fd4666abe" providerId="LiveId" clId="{2905985C-D2AF-4E47-976F-9F6DE4D7A03C}" dt="2020-01-13T16:18:55.510" v="752" actId="478"/>
           <ac:grpSpMkLst>
             <pc:docMk/>
             <pc:sldMk cId="2084767380" sldId="257"/>
             <ac:grpSpMk id="30" creationId="{9B8AD1A1-5B74-4BEE-83F9-86F6F3FFB557}"/>
           </ac:grpSpMkLst>
         </pc:grpChg>
-        <pc:grpChg chg="add mod">
-          <ac:chgData name="Henry Martin" userId="cc6f2d1fd4666abe" providerId="LiveId" clId="{2905985C-D2AF-4E47-976F-9F6DE4D7A03C}" dt="2020-01-13T16:00:17.460" v="453" actId="164"/>
+        <pc:grpChg chg="add del mod">
+          <ac:chgData name="Henry Martin" userId="cc6f2d1fd4666abe" providerId="LiveId" clId="{2905985C-D2AF-4E47-976F-9F6DE4D7A03C}" dt="2020-01-13T16:16:13.126" v="682" actId="478"/>
           <ac:grpSpMkLst>
             <pc:docMk/>
             <pc:sldMk cId="2084767380" sldId="257"/>
             <ac:grpSpMk id="54" creationId="{86F74D9B-6750-4248-9E3D-2A2BD1B582A7}"/>
           </ac:grpSpMkLst>
         </pc:grpChg>
-        <pc:grpChg chg="add mod">
-          <ac:chgData name="Henry Martin" userId="cc6f2d1fd4666abe" providerId="LiveId" clId="{2905985C-D2AF-4E47-976F-9F6DE4D7A03C}" dt="2020-01-13T16:02:07.342" v="494" actId="1036"/>
+        <pc:grpChg chg="add del mod">
+          <ac:chgData name="Henry Martin" userId="cc6f2d1fd4666abe" providerId="LiveId" clId="{2905985C-D2AF-4E47-976F-9F6DE4D7A03C}" dt="2020-01-13T16:16:53.174" v="702" actId="478"/>
           <ac:grpSpMkLst>
             <pc:docMk/>
             <pc:sldMk cId="2084767380" sldId="257"/>
@@ -6119,7 +6279,7 @@
         </p:nvGrpSpPr>
         <p:grpSpPr>
           <a:xfrm>
-            <a:off x="3377424" y="565626"/>
+            <a:off x="3209660" y="565626"/>
             <a:ext cx="259058" cy="3575344"/>
             <a:chOff x="3377424" y="565626"/>
             <a:chExt cx="259058" cy="3575344"/>
@@ -6538,7 +6698,7 @@
         </p:nvSpPr>
         <p:spPr>
           <a:xfrm>
-            <a:off x="4580658" y="3060970"/>
+            <a:off x="4653751" y="3060970"/>
             <a:ext cx="288000" cy="1080000"/>
           </a:xfrm>
           <a:prstGeom prst="rect">
@@ -6589,7 +6749,7 @@
         </p:nvSpPr>
         <p:spPr>
           <a:xfrm>
-            <a:off x="4580658" y="5304378"/>
+            <a:off x="4653751" y="5304378"/>
             <a:ext cx="288000" cy="720000"/>
           </a:xfrm>
           <a:prstGeom prst="rect">
@@ -6640,7 +6800,7 @@
         </p:nvSpPr>
         <p:spPr>
           <a:xfrm rot="5400000">
-            <a:off x="4589637" y="4593146"/>
+            <a:off x="4662730" y="4593146"/>
             <a:ext cx="270043" cy="259058"/>
           </a:xfrm>
           <a:prstGeom prst="rightArrow">
@@ -7449,552 +7609,63 @@
           </a:p>
         </p:txBody>
       </p:sp>
-      <p:grpSp>
-        <p:nvGrpSpPr>
-          <p:cNvPr id="6" name="Group 5">
-            <a:extLst>
-              <a:ext uri="{FF2B5EF4-FFF2-40B4-BE49-F238E27FC236}">
-                <a16:creationId xmlns:a16="http://schemas.microsoft.com/office/drawing/2014/main" id="{E2CA4807-F08B-4D41-A68D-84799BB28804}"/>
-              </a:ext>
-            </a:extLst>
-          </p:cNvPr>
-          <p:cNvGrpSpPr/>
+      <p:sp>
+        <p:nvSpPr>
+          <p:cNvPr id="9" name="Arrow: Right 8">
+            <a:extLst>
+              <a:ext uri="{FF2B5EF4-FFF2-40B4-BE49-F238E27FC236}">
+                <a16:creationId xmlns:a16="http://schemas.microsoft.com/office/drawing/2014/main" id="{C4197ACF-7A33-4477-AA05-A911ABD020CE}"/>
+              </a:ext>
+            </a:extLst>
+          </p:cNvPr>
+          <p:cNvSpPr/>
           <p:nvPr/>
-        </p:nvGrpSpPr>
-        <p:grpSpPr>
-          <a:xfrm>
-            <a:off x="1798930" y="1004165"/>
-            <a:ext cx="834267" cy="562923"/>
-            <a:chOff x="1022358" y="846528"/>
-            <a:chExt cx="834267" cy="562923"/>
-          </a:xfrm>
-        </p:grpSpPr>
-        <p:sp>
-          <p:nvSpPr>
-            <p:cNvPr id="9" name="Arrow: Right 8">
-              <a:extLst>
-                <a:ext uri="{FF2B5EF4-FFF2-40B4-BE49-F238E27FC236}">
-                  <a16:creationId xmlns:a16="http://schemas.microsoft.com/office/drawing/2014/main" id="{C4197ACF-7A33-4477-AA05-A911ABD020CE}"/>
-                </a:ext>
-              </a:extLst>
-            </p:cNvPr>
-            <p:cNvSpPr/>
-            <p:nvPr/>
-          </p:nvSpPr>
-          <p:spPr>
-            <a:xfrm>
-              <a:off x="1112466" y="1244351"/>
-              <a:ext cx="654050" cy="165100"/>
-            </a:xfrm>
-            <a:prstGeom prst="rightArrow">
-              <a:avLst/>
-            </a:prstGeom>
-            <a:ln>
-              <a:solidFill>
-                <a:schemeClr val="tx1"/>
-              </a:solidFill>
-            </a:ln>
-          </p:spPr>
-          <p:style>
-            <a:lnRef idx="2">
-              <a:schemeClr val="accent1">
-                <a:shade val="50000"/>
-              </a:schemeClr>
-            </a:lnRef>
-            <a:fillRef idx="1">
-              <a:schemeClr val="accent1"/>
-            </a:fillRef>
-            <a:effectRef idx="0">
-              <a:schemeClr val="accent1"/>
-            </a:effectRef>
-            <a:fontRef idx="minor">
-              <a:schemeClr val="lt1"/>
-            </a:fontRef>
-          </p:style>
-          <p:txBody>
-            <a:bodyPr rtlCol="0" anchor="ctr"/>
-            <a:lstStyle/>
-            <a:p>
-              <a:pPr algn="ctr"/>
-              <a:endParaRPr lang="en-CH" dirty="0"/>
-            </a:p>
-          </p:txBody>
-        </p:sp>
-        <p:sp>
-          <p:nvSpPr>
-            <p:cNvPr id="3" name="TextBox 2">
-              <a:extLst>
-                <a:ext uri="{FF2B5EF4-FFF2-40B4-BE49-F238E27FC236}">
-                  <a16:creationId xmlns:a16="http://schemas.microsoft.com/office/drawing/2014/main" id="{A001B40B-BC9C-46EE-8A67-DD12B6F5D20B}"/>
-                </a:ext>
-              </a:extLst>
-            </p:cNvPr>
-            <p:cNvSpPr txBox="1"/>
-            <p:nvPr/>
-          </p:nvSpPr>
-          <p:spPr>
-            <a:xfrm>
-              <a:off x="1022358" y="846528"/>
-              <a:ext cx="834267" cy="338554"/>
-            </a:xfrm>
-            <a:prstGeom prst="rect">
-              <a:avLst/>
-            </a:prstGeom>
-            <a:noFill/>
-          </p:spPr>
-          <p:txBody>
-            <a:bodyPr wrap="none" rtlCol="0">
-              <a:spAutoFit/>
-            </a:bodyPr>
-            <a:lstStyle/>
-            <a:p>
-              <a:r>
-                <a:rPr lang="en-US" sz="1600" dirty="0"/>
-                <a:t>gcn0_in</a:t>
-              </a:r>
-              <a:endParaRPr lang="en-CH" sz="1600" dirty="0"/>
-            </a:p>
-          </p:txBody>
-        </p:sp>
-      </p:grpSp>
-      <p:grpSp>
-        <p:nvGrpSpPr>
-          <p:cNvPr id="7" name="Group 6">
-            <a:extLst>
-              <a:ext uri="{FF2B5EF4-FFF2-40B4-BE49-F238E27FC236}">
-                <a16:creationId xmlns:a16="http://schemas.microsoft.com/office/drawing/2014/main" id="{2A353D3A-2C42-4C4F-AAA5-E9CFE8ED688B}"/>
-              </a:ext>
-            </a:extLst>
-          </p:cNvPr>
-          <p:cNvGrpSpPr/>
-          <p:nvPr/>
-        </p:nvGrpSpPr>
-        <p:grpSpPr>
-          <a:xfrm>
-            <a:off x="9645335" y="1007739"/>
-            <a:ext cx="965714" cy="555774"/>
-            <a:chOff x="9732441" y="879802"/>
-            <a:chExt cx="965714" cy="555774"/>
-          </a:xfrm>
-        </p:grpSpPr>
-        <p:sp>
-          <p:nvSpPr>
-            <p:cNvPr id="45" name="Arrow: Right 44">
-              <a:extLst>
-                <a:ext uri="{FF2B5EF4-FFF2-40B4-BE49-F238E27FC236}">
-                  <a16:creationId xmlns:a16="http://schemas.microsoft.com/office/drawing/2014/main" id="{2051397D-EB90-423D-B820-AF6FDBE2CD7E}"/>
-                </a:ext>
-              </a:extLst>
-            </p:cNvPr>
-            <p:cNvSpPr/>
-            <p:nvPr/>
-          </p:nvSpPr>
-          <p:spPr>
-            <a:xfrm>
-              <a:off x="9888273" y="1270476"/>
-              <a:ext cx="654050" cy="165100"/>
-            </a:xfrm>
-            <a:prstGeom prst="rightArrow">
-              <a:avLst/>
-            </a:prstGeom>
-            <a:ln>
-              <a:solidFill>
-                <a:schemeClr val="tx1"/>
-              </a:solidFill>
-            </a:ln>
-          </p:spPr>
-          <p:style>
-            <a:lnRef idx="2">
-              <a:schemeClr val="accent1">
-                <a:shade val="50000"/>
-              </a:schemeClr>
-            </a:lnRef>
-            <a:fillRef idx="1">
-              <a:schemeClr val="accent1"/>
-            </a:fillRef>
-            <a:effectRef idx="0">
-              <a:schemeClr val="accent1"/>
-            </a:effectRef>
-            <a:fontRef idx="minor">
-              <a:schemeClr val="lt1"/>
-            </a:fontRef>
-          </p:style>
-          <p:txBody>
-            <a:bodyPr rtlCol="0" anchor="ctr"/>
-            <a:lstStyle/>
-            <a:p>
-              <a:pPr algn="ctr"/>
-              <a:endParaRPr lang="en-CH"/>
-            </a:p>
-          </p:txBody>
-        </p:sp>
-        <p:sp>
-          <p:nvSpPr>
-            <p:cNvPr id="44" name="TextBox 43">
-              <a:extLst>
-                <a:ext uri="{FF2B5EF4-FFF2-40B4-BE49-F238E27FC236}">
-                  <a16:creationId xmlns:a16="http://schemas.microsoft.com/office/drawing/2014/main" id="{0D272F5F-148A-41EB-964B-347493397D31}"/>
-                </a:ext>
-              </a:extLst>
-            </p:cNvPr>
-            <p:cNvSpPr txBox="1"/>
-            <p:nvPr/>
-          </p:nvSpPr>
-          <p:spPr>
-            <a:xfrm>
-              <a:off x="9732441" y="879802"/>
-              <a:ext cx="965714" cy="338554"/>
-            </a:xfrm>
-            <a:prstGeom prst="rect">
-              <a:avLst/>
-            </a:prstGeom>
-            <a:noFill/>
-          </p:spPr>
-          <p:txBody>
-            <a:bodyPr wrap="none" rtlCol="0">
-              <a:spAutoFit/>
-            </a:bodyPr>
-            <a:lstStyle/>
-            <a:p>
-              <a:r>
-                <a:rPr lang="en-US" sz="1600" dirty="0"/>
-                <a:t>gcn0_out</a:t>
-              </a:r>
-              <a:endParaRPr lang="en-CH" sz="1600" dirty="0"/>
-            </a:p>
-          </p:txBody>
-        </p:sp>
-      </p:grpSp>
-      <p:grpSp>
-        <p:nvGrpSpPr>
-          <p:cNvPr id="54" name="Group 53">
-            <a:extLst>
-              <a:ext uri="{FF2B5EF4-FFF2-40B4-BE49-F238E27FC236}">
-                <a16:creationId xmlns:a16="http://schemas.microsoft.com/office/drawing/2014/main" id="{86F74D9B-6750-4248-9E3D-2A2BD1B582A7}"/>
-              </a:ext>
-            </a:extLst>
-          </p:cNvPr>
-          <p:cNvGrpSpPr/>
-          <p:nvPr/>
-        </p:nvGrpSpPr>
-        <p:grpSpPr>
-          <a:xfrm>
-            <a:off x="3584176" y="3181905"/>
-            <a:ext cx="834267" cy="501615"/>
-            <a:chOff x="3584176" y="3181905"/>
-            <a:chExt cx="834267" cy="501615"/>
-          </a:xfrm>
-        </p:grpSpPr>
-        <p:sp>
-          <p:nvSpPr>
-            <p:cNvPr id="25" name="Arrow: Right 24">
-              <a:extLst>
-                <a:ext uri="{FF2B5EF4-FFF2-40B4-BE49-F238E27FC236}">
-                  <a16:creationId xmlns:a16="http://schemas.microsoft.com/office/drawing/2014/main" id="{955C35DA-1627-4CB4-9D09-DE019414688F}"/>
-                </a:ext>
-              </a:extLst>
-            </p:cNvPr>
-            <p:cNvSpPr/>
-            <p:nvPr/>
-          </p:nvSpPr>
-          <p:spPr>
-            <a:xfrm>
-              <a:off x="3674284" y="3518420"/>
-              <a:ext cx="654050" cy="165100"/>
-            </a:xfrm>
-            <a:prstGeom prst="rightArrow">
-              <a:avLst/>
-            </a:prstGeom>
-            <a:ln>
-              <a:solidFill>
-                <a:schemeClr val="tx1"/>
-              </a:solidFill>
-            </a:ln>
-          </p:spPr>
-          <p:style>
-            <a:lnRef idx="2">
-              <a:schemeClr val="accent1">
-                <a:shade val="50000"/>
-              </a:schemeClr>
-            </a:lnRef>
-            <a:fillRef idx="1">
-              <a:schemeClr val="accent1"/>
-            </a:fillRef>
-            <a:effectRef idx="0">
-              <a:schemeClr val="accent1"/>
-            </a:effectRef>
-            <a:fontRef idx="minor">
-              <a:schemeClr val="lt1"/>
-            </a:fontRef>
-          </p:style>
-          <p:txBody>
-            <a:bodyPr rtlCol="0" anchor="ctr"/>
-            <a:lstStyle/>
-            <a:p>
-              <a:pPr algn="ctr"/>
-              <a:endParaRPr lang="en-CH"/>
-            </a:p>
-          </p:txBody>
-        </p:sp>
-        <p:sp>
-          <p:nvSpPr>
-            <p:cNvPr id="49" name="TextBox 48">
-              <a:extLst>
-                <a:ext uri="{FF2B5EF4-FFF2-40B4-BE49-F238E27FC236}">
-                  <a16:creationId xmlns:a16="http://schemas.microsoft.com/office/drawing/2014/main" id="{85923EAB-54DA-4A19-8891-66924C34DDDA}"/>
-                </a:ext>
-              </a:extLst>
-            </p:cNvPr>
-            <p:cNvSpPr txBox="1"/>
-            <p:nvPr/>
-          </p:nvSpPr>
-          <p:spPr>
-            <a:xfrm>
-              <a:off x="3584176" y="3181905"/>
-              <a:ext cx="834267" cy="338554"/>
-            </a:xfrm>
-            <a:prstGeom prst="rect">
-              <a:avLst/>
-            </a:prstGeom>
-            <a:noFill/>
-          </p:spPr>
-          <p:txBody>
-            <a:bodyPr wrap="none" rtlCol="0">
-              <a:spAutoFit/>
-            </a:bodyPr>
-            <a:lstStyle/>
-            <a:p>
-              <a:r>
-                <a:rPr lang="en-US" sz="1600" dirty="0"/>
-                <a:t>gcn1_in</a:t>
-              </a:r>
-              <a:endParaRPr lang="en-CH" sz="1600" dirty="0"/>
-            </a:p>
-          </p:txBody>
-        </p:sp>
-      </p:grpSp>
-      <p:grpSp>
-        <p:nvGrpSpPr>
-          <p:cNvPr id="55" name="Group 54">
-            <a:extLst>
-              <a:ext uri="{FF2B5EF4-FFF2-40B4-BE49-F238E27FC236}">
-                <a16:creationId xmlns:a16="http://schemas.microsoft.com/office/drawing/2014/main" id="{B339D82F-ED8D-4DDB-B283-670824353F6D}"/>
-              </a:ext>
-            </a:extLst>
-          </p:cNvPr>
-          <p:cNvGrpSpPr/>
-          <p:nvPr/>
-        </p:nvGrpSpPr>
-        <p:grpSpPr>
-          <a:xfrm>
-            <a:off x="5196549" y="5236626"/>
-            <a:ext cx="654050" cy="510302"/>
-            <a:chOff x="5196549" y="4944526"/>
-            <a:chExt cx="654050" cy="510302"/>
-          </a:xfrm>
-        </p:grpSpPr>
-        <p:sp>
-          <p:nvSpPr>
-            <p:cNvPr id="28" name="Arrow: Right 27">
-              <a:extLst>
-                <a:ext uri="{FF2B5EF4-FFF2-40B4-BE49-F238E27FC236}">
-                  <a16:creationId xmlns:a16="http://schemas.microsoft.com/office/drawing/2014/main" id="{EBB4DC02-D5B8-4102-90F4-EBE8612F6CAE}"/>
-                </a:ext>
-              </a:extLst>
-            </p:cNvPr>
-            <p:cNvSpPr/>
-            <p:nvPr/>
-          </p:nvSpPr>
-          <p:spPr>
-            <a:xfrm>
-              <a:off x="5196549" y="5289728"/>
-              <a:ext cx="654050" cy="165100"/>
-            </a:xfrm>
-            <a:prstGeom prst="rightArrow">
-              <a:avLst/>
-            </a:prstGeom>
-            <a:ln>
-              <a:solidFill>
-                <a:schemeClr val="tx1"/>
-              </a:solidFill>
-            </a:ln>
-          </p:spPr>
-          <p:style>
-            <a:lnRef idx="2">
-              <a:schemeClr val="accent1">
-                <a:shade val="50000"/>
-              </a:schemeClr>
-            </a:lnRef>
-            <a:fillRef idx="1">
-              <a:schemeClr val="accent1"/>
-            </a:fillRef>
-            <a:effectRef idx="0">
-              <a:schemeClr val="accent1"/>
-            </a:effectRef>
-            <a:fontRef idx="minor">
-              <a:schemeClr val="lt1"/>
-            </a:fontRef>
-          </p:style>
-          <p:txBody>
-            <a:bodyPr rtlCol="0" anchor="ctr"/>
-            <a:lstStyle/>
-            <a:p>
-              <a:pPr algn="ctr"/>
-              <a:endParaRPr lang="en-CH"/>
-            </a:p>
-          </p:txBody>
-        </p:sp>
-        <p:sp>
-          <p:nvSpPr>
-            <p:cNvPr id="50" name="TextBox 49">
-              <a:extLst>
-                <a:ext uri="{FF2B5EF4-FFF2-40B4-BE49-F238E27FC236}">
-                  <a16:creationId xmlns:a16="http://schemas.microsoft.com/office/drawing/2014/main" id="{E1D4595E-9E63-41AA-985B-9E576073864D}"/>
-                </a:ext>
-              </a:extLst>
-            </p:cNvPr>
-            <p:cNvSpPr txBox="1"/>
-            <p:nvPr/>
-          </p:nvSpPr>
-          <p:spPr>
-            <a:xfrm>
-              <a:off x="5234681" y="4944526"/>
-              <a:ext cx="577787" cy="338554"/>
-            </a:xfrm>
-            <a:prstGeom prst="rect">
-              <a:avLst/>
-            </a:prstGeom>
-            <a:noFill/>
-          </p:spPr>
-          <p:txBody>
-            <a:bodyPr wrap="none" rtlCol="0">
-              <a:spAutoFit/>
-            </a:bodyPr>
-            <a:lstStyle/>
-            <a:p>
-              <a:r>
-                <a:rPr lang="en-US" sz="1600" dirty="0"/>
-                <a:t>gcn2</a:t>
-              </a:r>
-              <a:endParaRPr lang="en-CH" sz="1600" dirty="0"/>
-            </a:p>
-          </p:txBody>
-        </p:sp>
-      </p:grpSp>
-      <p:grpSp>
-        <p:nvGrpSpPr>
-          <p:cNvPr id="30" name="Group 29">
-            <a:extLst>
-              <a:ext uri="{FF2B5EF4-FFF2-40B4-BE49-F238E27FC236}">
-                <a16:creationId xmlns:a16="http://schemas.microsoft.com/office/drawing/2014/main" id="{9B8AD1A1-5B74-4BEE-83F9-86F6F3FFB557}"/>
-              </a:ext>
-            </a:extLst>
-          </p:cNvPr>
-          <p:cNvGrpSpPr/>
-          <p:nvPr/>
-        </p:nvGrpSpPr>
-        <p:grpSpPr>
-          <a:xfrm>
-            <a:off x="6986058" y="3181905"/>
-            <a:ext cx="965714" cy="501615"/>
-            <a:chOff x="6986058" y="3181905"/>
-            <a:chExt cx="965714" cy="501615"/>
-          </a:xfrm>
-        </p:grpSpPr>
-        <p:sp>
-          <p:nvSpPr>
-            <p:cNvPr id="33" name="Arrow: Right 32">
-              <a:extLst>
-                <a:ext uri="{FF2B5EF4-FFF2-40B4-BE49-F238E27FC236}">
-                  <a16:creationId xmlns:a16="http://schemas.microsoft.com/office/drawing/2014/main" id="{54F1970B-A5F2-48F3-A232-D13D1406F43F}"/>
-                </a:ext>
-              </a:extLst>
-            </p:cNvPr>
-            <p:cNvSpPr/>
-            <p:nvPr/>
-          </p:nvSpPr>
-          <p:spPr>
-            <a:xfrm>
-              <a:off x="7141890" y="3518420"/>
-              <a:ext cx="654050" cy="165100"/>
-            </a:xfrm>
-            <a:prstGeom prst="rightArrow">
-              <a:avLst/>
-            </a:prstGeom>
-            <a:ln>
-              <a:solidFill>
-                <a:schemeClr val="tx1"/>
-              </a:solidFill>
-            </a:ln>
-          </p:spPr>
-          <p:style>
-            <a:lnRef idx="2">
-              <a:schemeClr val="accent1">
-                <a:shade val="50000"/>
-              </a:schemeClr>
-            </a:lnRef>
-            <a:fillRef idx="1">
-              <a:schemeClr val="accent1"/>
-            </a:fillRef>
-            <a:effectRef idx="0">
-              <a:schemeClr val="accent1"/>
-            </a:effectRef>
-            <a:fontRef idx="minor">
-              <a:schemeClr val="lt1"/>
-            </a:fontRef>
-          </p:style>
-          <p:txBody>
-            <a:bodyPr rtlCol="0" anchor="ctr"/>
-            <a:lstStyle/>
-            <a:p>
-              <a:pPr algn="ctr"/>
-              <a:endParaRPr lang="en-CH"/>
-            </a:p>
-          </p:txBody>
-        </p:sp>
-        <p:sp>
-          <p:nvSpPr>
-            <p:cNvPr id="51" name="TextBox 50">
-              <a:extLst>
-                <a:ext uri="{FF2B5EF4-FFF2-40B4-BE49-F238E27FC236}">
-                  <a16:creationId xmlns:a16="http://schemas.microsoft.com/office/drawing/2014/main" id="{8BD5BEC8-864D-47EF-AF83-D8563F9F7956}"/>
-                </a:ext>
-              </a:extLst>
-            </p:cNvPr>
-            <p:cNvSpPr txBox="1"/>
-            <p:nvPr/>
-          </p:nvSpPr>
-          <p:spPr>
-            <a:xfrm>
-              <a:off x="6986058" y="3181905"/>
-              <a:ext cx="965714" cy="338554"/>
-            </a:xfrm>
-            <a:prstGeom prst="rect">
-              <a:avLst/>
-            </a:prstGeom>
-            <a:noFill/>
-          </p:spPr>
-          <p:txBody>
-            <a:bodyPr wrap="none" rtlCol="0">
-              <a:spAutoFit/>
-            </a:bodyPr>
-            <a:lstStyle/>
-            <a:p>
-              <a:r>
-                <a:rPr lang="en-US" sz="1600" dirty="0"/>
-                <a:t>gcn1_out</a:t>
-              </a:r>
-              <a:endParaRPr lang="en-CH" sz="1600" dirty="0"/>
-            </a:p>
-          </p:txBody>
-        </p:sp>
-      </p:grpSp>
-      <p:sp>
-        <p:nvSpPr>
-          <p:cNvPr id="58" name="TextBox 57">
-            <a:extLst>
-              <a:ext uri="{FF2B5EF4-FFF2-40B4-BE49-F238E27FC236}">
-                <a16:creationId xmlns:a16="http://schemas.microsoft.com/office/drawing/2014/main" id="{3E4B0948-514B-43DA-9BE9-9D191769AFEF}"/>
+        </p:nvSpPr>
+        <p:spPr>
+          <a:xfrm>
+            <a:off x="1889038" y="1401988"/>
+            <a:ext cx="654050" cy="165100"/>
+          </a:xfrm>
+          <a:prstGeom prst="rightArrow">
+            <a:avLst/>
+          </a:prstGeom>
+          <a:ln>
+            <a:solidFill>
+              <a:schemeClr val="tx1"/>
+            </a:solidFill>
+          </a:ln>
+        </p:spPr>
+        <p:style>
+          <a:lnRef idx="2">
+            <a:schemeClr val="accent1">
+              <a:shade val="50000"/>
+            </a:schemeClr>
+          </a:lnRef>
+          <a:fillRef idx="1">
+            <a:schemeClr val="accent1"/>
+          </a:fillRef>
+          <a:effectRef idx="0">
+            <a:schemeClr val="accent1"/>
+          </a:effectRef>
+          <a:fontRef idx="minor">
+            <a:schemeClr val="lt1"/>
+          </a:fontRef>
+        </p:style>
+        <p:txBody>
+          <a:bodyPr rtlCol="0" anchor="ctr"/>
+          <a:lstStyle/>
+          <a:p>
+            <a:pPr algn="ctr"/>
+            <a:endParaRPr lang="en-CH" dirty="0"/>
+          </a:p>
+        </p:txBody>
+      </p:sp>
+      <p:sp>
+        <p:nvSpPr>
+          <p:cNvPr id="3" name="TextBox 2">
+            <a:extLst>
+              <a:ext uri="{FF2B5EF4-FFF2-40B4-BE49-F238E27FC236}">
+                <a16:creationId xmlns:a16="http://schemas.microsoft.com/office/drawing/2014/main" id="{A001B40B-BC9C-46EE-8A67-DD12B6F5D20B}"/>
               </a:ext>
             </a:extLst>
           </p:cNvPr>
@@ -8003,8 +7674,8 @@
         </p:nvSpPr>
         <p:spPr>
           <a:xfrm>
-            <a:off x="741771" y="2009685"/>
-            <a:ext cx="401072" cy="369332"/>
+            <a:off x="1259739" y="1162515"/>
+            <a:ext cx="1689886" cy="246221"/>
           </a:xfrm>
           <a:prstGeom prst="rect">
             <a:avLst/>
@@ -8018,19 +7689,239 @@
           <a:lstStyle/>
           <a:p>
             <a:r>
-              <a:rPr lang="en-US" dirty="0"/>
-              <a:t>x0</a:t>
-            </a:r>
-            <a:endParaRPr lang="en-CH" dirty="0"/>
-          </a:p>
-        </p:txBody>
-      </p:sp>
-      <p:sp>
-        <p:nvSpPr>
-          <p:cNvPr id="59" name="TextBox 58">
-            <a:extLst>
-              <a:ext uri="{FF2B5EF4-FFF2-40B4-BE49-F238E27FC236}">
-                <a16:creationId xmlns:a16="http://schemas.microsoft.com/office/drawing/2014/main" id="{7579EF44-F1E9-4AF0-967C-E4F21A75464E}"/>
+              <a:rPr lang="en-US" sz="1000" dirty="0"/>
+              <a:t>gcn0_in(</a:t>
+            </a:r>
+            <a:r>
+              <a:rPr lang="en-US" sz="1000" dirty="0" err="1"/>
+              <a:t>n_features</a:t>
+            </a:r>
+            <a:r>
+              <a:rPr lang="en-US" sz="1000" dirty="0"/>
+              <a:t>-&gt; 2**</a:t>
+            </a:r>
+            <a:r>
+              <a:rPr lang="en-US" sz="1000" dirty="0" err="1"/>
+              <a:t>wf</a:t>
+            </a:r>
+            <a:r>
+              <a:rPr lang="en-US" sz="1000" dirty="0"/>
+              <a:t>)</a:t>
+            </a:r>
+            <a:endParaRPr lang="en-CH" sz="1000" dirty="0"/>
+          </a:p>
+        </p:txBody>
+      </p:sp>
+      <p:sp>
+        <p:nvSpPr>
+          <p:cNvPr id="45" name="Arrow: Right 44">
+            <a:extLst>
+              <a:ext uri="{FF2B5EF4-FFF2-40B4-BE49-F238E27FC236}">
+                <a16:creationId xmlns:a16="http://schemas.microsoft.com/office/drawing/2014/main" id="{2051397D-EB90-423D-B820-AF6FDBE2CD7E}"/>
+              </a:ext>
+            </a:extLst>
+          </p:cNvPr>
+          <p:cNvSpPr/>
+          <p:nvPr/>
+        </p:nvSpPr>
+        <p:spPr>
+          <a:xfrm>
+            <a:off x="9801167" y="1398413"/>
+            <a:ext cx="654050" cy="165100"/>
+          </a:xfrm>
+          <a:prstGeom prst="rightArrow">
+            <a:avLst/>
+          </a:prstGeom>
+          <a:ln>
+            <a:solidFill>
+              <a:schemeClr val="tx1"/>
+            </a:solidFill>
+          </a:ln>
+        </p:spPr>
+        <p:style>
+          <a:lnRef idx="2">
+            <a:schemeClr val="accent1">
+              <a:shade val="50000"/>
+            </a:schemeClr>
+          </a:lnRef>
+          <a:fillRef idx="1">
+            <a:schemeClr val="accent1"/>
+          </a:fillRef>
+          <a:effectRef idx="0">
+            <a:schemeClr val="accent1"/>
+          </a:effectRef>
+          <a:fontRef idx="minor">
+            <a:schemeClr val="lt1"/>
+          </a:fontRef>
+        </p:style>
+        <p:txBody>
+          <a:bodyPr rtlCol="0" anchor="ctr"/>
+          <a:lstStyle/>
+          <a:p>
+            <a:pPr algn="ctr"/>
+            <a:endParaRPr lang="en-CH"/>
+          </a:p>
+        </p:txBody>
+      </p:sp>
+      <p:sp>
+        <p:nvSpPr>
+          <p:cNvPr id="25" name="Arrow: Right 24">
+            <a:extLst>
+              <a:ext uri="{FF2B5EF4-FFF2-40B4-BE49-F238E27FC236}">
+                <a16:creationId xmlns:a16="http://schemas.microsoft.com/office/drawing/2014/main" id="{955C35DA-1627-4CB4-9D09-DE019414688F}"/>
+              </a:ext>
+            </a:extLst>
+          </p:cNvPr>
+          <p:cNvSpPr/>
+          <p:nvPr/>
+        </p:nvSpPr>
+        <p:spPr>
+          <a:xfrm>
+            <a:off x="3674284" y="3518420"/>
+            <a:ext cx="654050" cy="165100"/>
+          </a:xfrm>
+          <a:prstGeom prst="rightArrow">
+            <a:avLst/>
+          </a:prstGeom>
+          <a:ln>
+            <a:solidFill>
+              <a:schemeClr val="tx1"/>
+            </a:solidFill>
+          </a:ln>
+        </p:spPr>
+        <p:style>
+          <a:lnRef idx="2">
+            <a:schemeClr val="accent1">
+              <a:shade val="50000"/>
+            </a:schemeClr>
+          </a:lnRef>
+          <a:fillRef idx="1">
+            <a:schemeClr val="accent1"/>
+          </a:fillRef>
+          <a:effectRef idx="0">
+            <a:schemeClr val="accent1"/>
+          </a:effectRef>
+          <a:fontRef idx="minor">
+            <a:schemeClr val="lt1"/>
+          </a:fontRef>
+        </p:style>
+        <p:txBody>
+          <a:bodyPr rtlCol="0" anchor="ctr"/>
+          <a:lstStyle/>
+          <a:p>
+            <a:pPr algn="ctr"/>
+            <a:endParaRPr lang="en-CH"/>
+          </a:p>
+        </p:txBody>
+      </p:sp>
+      <p:sp>
+        <p:nvSpPr>
+          <p:cNvPr id="28" name="Arrow: Right 27">
+            <a:extLst>
+              <a:ext uri="{FF2B5EF4-FFF2-40B4-BE49-F238E27FC236}">
+                <a16:creationId xmlns:a16="http://schemas.microsoft.com/office/drawing/2014/main" id="{EBB4DC02-D5B8-4102-90F4-EBE8612F6CAE}"/>
+              </a:ext>
+            </a:extLst>
+          </p:cNvPr>
+          <p:cNvSpPr/>
+          <p:nvPr/>
+        </p:nvSpPr>
+        <p:spPr>
+          <a:xfrm>
+            <a:off x="5196549" y="5581828"/>
+            <a:ext cx="654050" cy="165100"/>
+          </a:xfrm>
+          <a:prstGeom prst="rightArrow">
+            <a:avLst/>
+          </a:prstGeom>
+          <a:ln>
+            <a:solidFill>
+              <a:schemeClr val="tx1"/>
+            </a:solidFill>
+          </a:ln>
+        </p:spPr>
+        <p:style>
+          <a:lnRef idx="2">
+            <a:schemeClr val="accent1">
+              <a:shade val="50000"/>
+            </a:schemeClr>
+          </a:lnRef>
+          <a:fillRef idx="1">
+            <a:schemeClr val="accent1"/>
+          </a:fillRef>
+          <a:effectRef idx="0">
+            <a:schemeClr val="accent1"/>
+          </a:effectRef>
+          <a:fontRef idx="minor">
+            <a:schemeClr val="lt1"/>
+          </a:fontRef>
+        </p:style>
+        <p:txBody>
+          <a:bodyPr rtlCol="0" anchor="ctr"/>
+          <a:lstStyle/>
+          <a:p>
+            <a:pPr algn="ctr"/>
+            <a:endParaRPr lang="en-CH"/>
+          </a:p>
+        </p:txBody>
+      </p:sp>
+      <p:sp>
+        <p:nvSpPr>
+          <p:cNvPr id="33" name="Arrow: Right 32">
+            <a:extLst>
+              <a:ext uri="{FF2B5EF4-FFF2-40B4-BE49-F238E27FC236}">
+                <a16:creationId xmlns:a16="http://schemas.microsoft.com/office/drawing/2014/main" id="{54F1970B-A5F2-48F3-A232-D13D1406F43F}"/>
+              </a:ext>
+            </a:extLst>
+          </p:cNvPr>
+          <p:cNvSpPr/>
+          <p:nvPr/>
+        </p:nvSpPr>
+        <p:spPr>
+          <a:xfrm>
+            <a:off x="7141890" y="3518420"/>
+            <a:ext cx="654050" cy="165100"/>
+          </a:xfrm>
+          <a:prstGeom prst="rightArrow">
+            <a:avLst/>
+          </a:prstGeom>
+          <a:ln>
+            <a:solidFill>
+              <a:schemeClr val="tx1"/>
+            </a:solidFill>
+          </a:ln>
+        </p:spPr>
+        <p:style>
+          <a:lnRef idx="2">
+            <a:schemeClr val="accent1">
+              <a:shade val="50000"/>
+            </a:schemeClr>
+          </a:lnRef>
+          <a:fillRef idx="1">
+            <a:schemeClr val="accent1"/>
+          </a:fillRef>
+          <a:effectRef idx="0">
+            <a:schemeClr val="accent1"/>
+          </a:effectRef>
+          <a:fontRef idx="minor">
+            <a:schemeClr val="lt1"/>
+          </a:fontRef>
+        </p:style>
+        <p:txBody>
+          <a:bodyPr rtlCol="0" anchor="ctr"/>
+          <a:lstStyle/>
+          <a:p>
+            <a:pPr algn="ctr"/>
+            <a:endParaRPr lang="en-CH"/>
+          </a:p>
+        </p:txBody>
+      </p:sp>
+      <p:sp>
+        <p:nvSpPr>
+          <p:cNvPr id="58" name="TextBox 57">
+            <a:extLst>
+              <a:ext uri="{FF2B5EF4-FFF2-40B4-BE49-F238E27FC236}">
+                <a16:creationId xmlns:a16="http://schemas.microsoft.com/office/drawing/2014/main" id="{3E4B0948-514B-43DA-9BE9-9D191769AFEF}"/>
               </a:ext>
             </a:extLst>
           </p:cNvPr>
@@ -8039,7 +7930,7 @@
         </p:nvSpPr>
         <p:spPr>
           <a:xfrm>
-            <a:off x="3306416" y="4162784"/>
+            <a:off x="741771" y="2009685"/>
             <a:ext cx="401072" cy="369332"/>
           </a:xfrm>
           <a:prstGeom prst="rect">
@@ -8055,7 +7946,7 @@
           <a:p>
             <a:r>
               <a:rPr lang="en-US" dirty="0"/>
-              <a:t>x1</a:t>
+              <a:t>x0</a:t>
             </a:r>
             <a:endParaRPr lang="en-CH" dirty="0"/>
           </a:p>
@@ -8063,10 +7954,10 @@
       </p:sp>
       <p:sp>
         <p:nvSpPr>
-          <p:cNvPr id="60" name="TextBox 59">
-            <a:extLst>
-              <a:ext uri="{FF2B5EF4-FFF2-40B4-BE49-F238E27FC236}">
-                <a16:creationId xmlns:a16="http://schemas.microsoft.com/office/drawing/2014/main" id="{599E0B1D-F48D-47DB-B5F5-5D90C3A5E917}"/>
+          <p:cNvPr id="59" name="TextBox 58">
+            <a:extLst>
+              <a:ext uri="{FF2B5EF4-FFF2-40B4-BE49-F238E27FC236}">
+                <a16:creationId xmlns:a16="http://schemas.microsoft.com/office/drawing/2014/main" id="{7579EF44-F1E9-4AF0-967C-E4F21A75464E}"/>
               </a:ext>
             </a:extLst>
           </p:cNvPr>
@@ -8075,7 +7966,7 @@
         </p:nvSpPr>
         <p:spPr>
           <a:xfrm>
-            <a:off x="4531307" y="6024378"/>
+            <a:off x="3138652" y="4162784"/>
             <a:ext cx="401072" cy="369332"/>
           </a:xfrm>
           <a:prstGeom prst="rect">
@@ -8091,7 +7982,7 @@
           <a:p>
             <a:r>
               <a:rPr lang="en-US" dirty="0"/>
-              <a:t>x2</a:t>
+              <a:t>x1</a:t>
             </a:r>
             <a:endParaRPr lang="en-CH" dirty="0"/>
           </a:p>
@@ -8099,10 +7990,10 @@
       </p:sp>
       <p:sp>
         <p:nvSpPr>
-          <p:cNvPr id="61" name="TextBox 60">
-            <a:extLst>
-              <a:ext uri="{FF2B5EF4-FFF2-40B4-BE49-F238E27FC236}">
-                <a16:creationId xmlns:a16="http://schemas.microsoft.com/office/drawing/2014/main" id="{06C13880-870D-4BB0-B5B0-C406EFC63AF5}"/>
+          <p:cNvPr id="60" name="TextBox 59">
+            <a:extLst>
+              <a:ext uri="{FF2B5EF4-FFF2-40B4-BE49-F238E27FC236}">
+                <a16:creationId xmlns:a16="http://schemas.microsoft.com/office/drawing/2014/main" id="{599E0B1D-F48D-47DB-B5F5-5D90C3A5E917}"/>
               </a:ext>
             </a:extLst>
           </p:cNvPr>
@@ -8111,8 +8002,8 @@
         </p:nvSpPr>
         <p:spPr>
           <a:xfrm>
-            <a:off x="4473599" y="4162784"/>
-            <a:ext cx="516488" cy="369332"/>
+            <a:off x="4604400" y="6024378"/>
+            <a:ext cx="401072" cy="369332"/>
           </a:xfrm>
           <a:prstGeom prst="rect">
             <a:avLst/>
@@ -8127,7 +8018,7 @@
           <a:p>
             <a:r>
               <a:rPr lang="en-US" dirty="0"/>
-              <a:t>x1_</a:t>
+              <a:t>x2</a:t>
             </a:r>
             <a:endParaRPr lang="en-CH" dirty="0"/>
           </a:p>
@@ -8135,10 +8026,10 @@
       </p:sp>
       <p:sp>
         <p:nvSpPr>
-          <p:cNvPr id="62" name="TextBox 61">
-            <a:extLst>
-              <a:ext uri="{FF2B5EF4-FFF2-40B4-BE49-F238E27FC236}">
-                <a16:creationId xmlns:a16="http://schemas.microsoft.com/office/drawing/2014/main" id="{58E1BB2B-BFBD-4F79-94B1-EEA8A5CFFE1E}"/>
+          <p:cNvPr id="61" name="TextBox 60">
+            <a:extLst>
+              <a:ext uri="{FF2B5EF4-FFF2-40B4-BE49-F238E27FC236}">
+                <a16:creationId xmlns:a16="http://schemas.microsoft.com/office/drawing/2014/main" id="{06C13880-870D-4BB0-B5B0-C406EFC63AF5}"/>
               </a:ext>
             </a:extLst>
           </p:cNvPr>
@@ -8147,8 +8038,8 @@
         </p:nvSpPr>
         <p:spPr>
           <a:xfrm>
-            <a:off x="6047945" y="6024378"/>
-            <a:ext cx="837089" cy="369332"/>
+            <a:off x="4546692" y="4162784"/>
+            <a:ext cx="516488" cy="369332"/>
           </a:xfrm>
           <a:prstGeom prst="rect">
             <a:avLst/>
@@ -8163,7 +8054,7 @@
           <a:p>
             <a:r>
               <a:rPr lang="en-US" dirty="0"/>
-              <a:t>x2_out</a:t>
+              <a:t>x1_</a:t>
             </a:r>
             <a:endParaRPr lang="en-CH" dirty="0"/>
           </a:p>
@@ -8171,10 +8062,10 @@
       </p:sp>
       <p:sp>
         <p:nvSpPr>
-          <p:cNvPr id="63" name="TextBox 62">
-            <a:extLst>
-              <a:ext uri="{FF2B5EF4-FFF2-40B4-BE49-F238E27FC236}">
-                <a16:creationId xmlns:a16="http://schemas.microsoft.com/office/drawing/2014/main" id="{D4954A41-366D-4C6B-9D9C-58CE0CB22D20}"/>
+          <p:cNvPr id="62" name="TextBox 61">
+            <a:extLst>
+              <a:ext uri="{FF2B5EF4-FFF2-40B4-BE49-F238E27FC236}">
+                <a16:creationId xmlns:a16="http://schemas.microsoft.com/office/drawing/2014/main" id="{58E1BB2B-BFBD-4F79-94B1-EEA8A5CFFE1E}"/>
               </a:ext>
             </a:extLst>
           </p:cNvPr>
@@ -8183,8 +8074,8 @@
         </p:nvSpPr>
         <p:spPr>
           <a:xfrm>
-            <a:off x="5756199" y="4170558"/>
-            <a:ext cx="1420582" cy="369332"/>
+            <a:off x="6047945" y="6024378"/>
+            <a:ext cx="837089" cy="369332"/>
           </a:xfrm>
           <a:prstGeom prst="rect">
             <a:avLst/>
@@ -8199,7 +8090,7 @@
           <a:p>
             <a:r>
               <a:rPr lang="en-US" dirty="0"/>
-              <a:t>[x1_, x2_out]</a:t>
+              <a:t>x2_out</a:t>
             </a:r>
             <a:endParaRPr lang="en-CH" dirty="0"/>
           </a:p>
@@ -8207,10 +8098,10 @@
       </p:sp>
       <p:sp>
         <p:nvSpPr>
-          <p:cNvPr id="64" name="TextBox 63">
-            <a:extLst>
-              <a:ext uri="{FF2B5EF4-FFF2-40B4-BE49-F238E27FC236}">
-                <a16:creationId xmlns:a16="http://schemas.microsoft.com/office/drawing/2014/main" id="{B4ABBADD-A6AE-4105-A348-3133EAC1B7FB}"/>
+          <p:cNvPr id="63" name="TextBox 62">
+            <a:extLst>
+              <a:ext uri="{FF2B5EF4-FFF2-40B4-BE49-F238E27FC236}">
+                <a16:creationId xmlns:a16="http://schemas.microsoft.com/office/drawing/2014/main" id="{D4954A41-366D-4C6B-9D9C-58CE0CB22D20}"/>
               </a:ext>
             </a:extLst>
           </p:cNvPr>
@@ -8219,8 +8110,8 @@
         </p:nvSpPr>
         <p:spPr>
           <a:xfrm>
-            <a:off x="8190167" y="4131383"/>
-            <a:ext cx="837089" cy="369332"/>
+            <a:off x="5756199" y="4170558"/>
+            <a:ext cx="1779654" cy="369332"/>
           </a:xfrm>
           <a:prstGeom prst="rect">
             <a:avLst/>
@@ -8235,7 +8126,7 @@
           <a:p>
             <a:r>
               <a:rPr lang="en-US" dirty="0"/>
-              <a:t>x1_out</a:t>
+              <a:t>[x1_, x2_out_up]</a:t>
             </a:r>
             <a:endParaRPr lang="en-CH" dirty="0"/>
           </a:p>
@@ -8243,10 +8134,10 @@
       </p:sp>
       <p:sp>
         <p:nvSpPr>
-          <p:cNvPr id="65" name="TextBox 64">
-            <a:extLst>
-              <a:ext uri="{FF2B5EF4-FFF2-40B4-BE49-F238E27FC236}">
-                <a16:creationId xmlns:a16="http://schemas.microsoft.com/office/drawing/2014/main" id="{9DC51178-9F9A-4867-B9D0-8C97FB4ABBA8}"/>
+          <p:cNvPr id="64" name="TextBox 63">
+            <a:extLst>
+              <a:ext uri="{FF2B5EF4-FFF2-40B4-BE49-F238E27FC236}">
+                <a16:creationId xmlns:a16="http://schemas.microsoft.com/office/drawing/2014/main" id="{B4ABBADD-A6AE-4105-A348-3133EAC1B7FB}"/>
               </a:ext>
             </a:extLst>
           </p:cNvPr>
@@ -8255,8 +8146,8 @@
         </p:nvSpPr>
         <p:spPr>
           <a:xfrm>
-            <a:off x="8028129" y="2009685"/>
-            <a:ext cx="1305165" cy="369332"/>
+            <a:off x="8190167" y="4131383"/>
+            <a:ext cx="837089" cy="369332"/>
           </a:xfrm>
           <a:prstGeom prst="rect">
             <a:avLst/>
@@ -8271,7 +8162,7 @@
           <a:p>
             <a:r>
               <a:rPr lang="en-US" dirty="0"/>
-              <a:t>[x0, x1_out]</a:t>
+              <a:t>x1_out</a:t>
             </a:r>
             <a:endParaRPr lang="en-CH" dirty="0"/>
           </a:p>
@@ -8279,10 +8170,10 @@
       </p:sp>
       <p:sp>
         <p:nvSpPr>
-          <p:cNvPr id="66" name="TextBox 65">
-            <a:extLst>
-              <a:ext uri="{FF2B5EF4-FFF2-40B4-BE49-F238E27FC236}">
-                <a16:creationId xmlns:a16="http://schemas.microsoft.com/office/drawing/2014/main" id="{2D7AD520-7E9F-49D4-B6CE-C5BA875A2E15}"/>
+          <p:cNvPr id="65" name="TextBox 64">
+            <a:extLst>
+              <a:ext uri="{FF2B5EF4-FFF2-40B4-BE49-F238E27FC236}">
+                <a16:creationId xmlns:a16="http://schemas.microsoft.com/office/drawing/2014/main" id="{9DC51178-9F9A-4867-B9D0-8C97FB4ABBA8}"/>
               </a:ext>
             </a:extLst>
           </p:cNvPr>
@@ -8291,8 +8182,8 @@
         </p:nvSpPr>
         <p:spPr>
           <a:xfrm>
-            <a:off x="3248708" y="2009685"/>
-            <a:ext cx="516488" cy="369332"/>
+            <a:off x="8028129" y="2009685"/>
+            <a:ext cx="1305165" cy="369332"/>
           </a:xfrm>
           <a:prstGeom prst="rect">
             <a:avLst/>
@@ -8307,7 +8198,7 @@
           <a:p>
             <a:r>
               <a:rPr lang="en-US" dirty="0"/>
-              <a:t>x0_</a:t>
+              <a:t>[x0, x1_out]</a:t>
             </a:r>
             <a:endParaRPr lang="en-CH" dirty="0"/>
           </a:p>
@@ -8315,10 +8206,10 @@
       </p:sp>
       <p:sp>
         <p:nvSpPr>
-          <p:cNvPr id="67" name="TextBox 66">
-            <a:extLst>
-              <a:ext uri="{FF2B5EF4-FFF2-40B4-BE49-F238E27FC236}">
-                <a16:creationId xmlns:a16="http://schemas.microsoft.com/office/drawing/2014/main" id="{CD32680D-DD8F-4FBE-B701-2F264D28A4BF}"/>
+          <p:cNvPr id="66" name="TextBox 65">
+            <a:extLst>
+              <a:ext uri="{FF2B5EF4-FFF2-40B4-BE49-F238E27FC236}">
+                <a16:creationId xmlns:a16="http://schemas.microsoft.com/office/drawing/2014/main" id="{2D7AD520-7E9F-49D4-B6CE-C5BA875A2E15}"/>
               </a:ext>
             </a:extLst>
           </p:cNvPr>
@@ -8327,8 +8218,8 @@
         </p:nvSpPr>
         <p:spPr>
           <a:xfrm>
-            <a:off x="11049126" y="2009685"/>
-            <a:ext cx="837089" cy="369332"/>
+            <a:off x="3080944" y="2009685"/>
+            <a:ext cx="516488" cy="369332"/>
           </a:xfrm>
           <a:prstGeom prst="rect">
             <a:avLst/>
@@ -8343,9 +8234,707 @@
           <a:p>
             <a:r>
               <a:rPr lang="en-US" dirty="0"/>
+              <a:t>x0_</a:t>
+            </a:r>
+            <a:endParaRPr lang="en-CH" dirty="0"/>
+          </a:p>
+        </p:txBody>
+      </p:sp>
+      <p:sp>
+        <p:nvSpPr>
+          <p:cNvPr id="67" name="TextBox 66">
+            <a:extLst>
+              <a:ext uri="{FF2B5EF4-FFF2-40B4-BE49-F238E27FC236}">
+                <a16:creationId xmlns:a16="http://schemas.microsoft.com/office/drawing/2014/main" id="{CD32680D-DD8F-4FBE-B701-2F264D28A4BF}"/>
+              </a:ext>
+            </a:extLst>
+          </p:cNvPr>
+          <p:cNvSpPr txBox="1"/>
+          <p:nvPr/>
+        </p:nvSpPr>
+        <p:spPr>
+          <a:xfrm>
+            <a:off x="11049126" y="2009685"/>
+            <a:ext cx="837089" cy="369332"/>
+          </a:xfrm>
+          <a:prstGeom prst="rect">
+            <a:avLst/>
+          </a:prstGeom>
+          <a:noFill/>
+        </p:spPr>
+        <p:txBody>
+          <a:bodyPr wrap="none" rtlCol="0">
+            <a:spAutoFit/>
+          </a:bodyPr>
+          <a:lstStyle/>
+          <a:p>
+            <a:r>
+              <a:rPr lang="en-US" dirty="0"/>
               <a:t>x0_out</a:t>
             </a:r>
             <a:endParaRPr lang="en-CH" dirty="0"/>
+          </a:p>
+        </p:txBody>
+      </p:sp>
+      <p:sp>
+        <p:nvSpPr>
+          <p:cNvPr id="68" name="TextBox 67">
+            <a:extLst>
+              <a:ext uri="{FF2B5EF4-FFF2-40B4-BE49-F238E27FC236}">
+                <a16:creationId xmlns:a16="http://schemas.microsoft.com/office/drawing/2014/main" id="{6B70A8AF-5C9B-4119-8215-FA0798DC71B6}"/>
+              </a:ext>
+            </a:extLst>
+          </p:cNvPr>
+          <p:cNvSpPr txBox="1"/>
+          <p:nvPr/>
+        </p:nvSpPr>
+        <p:spPr>
+          <a:xfrm>
+            <a:off x="566976" y="268345"/>
+            <a:ext cx="822661" cy="261610"/>
+          </a:xfrm>
+          <a:prstGeom prst="rect">
+            <a:avLst/>
+          </a:prstGeom>
+          <a:noFill/>
+        </p:spPr>
+        <p:txBody>
+          <a:bodyPr wrap="none" rtlCol="0">
+            <a:spAutoFit/>
+          </a:bodyPr>
+          <a:lstStyle/>
+          <a:p>
+            <a:r>
+              <a:rPr lang="en-US" sz="1050" dirty="0" err="1"/>
+              <a:t>N_features</a:t>
+            </a:r>
+            <a:endParaRPr lang="en-CH" sz="1050" dirty="0"/>
+          </a:p>
+        </p:txBody>
+      </p:sp>
+      <p:sp>
+        <p:nvSpPr>
+          <p:cNvPr id="69" name="TextBox 68">
+            <a:extLst>
+              <a:ext uri="{FF2B5EF4-FFF2-40B4-BE49-F238E27FC236}">
+                <a16:creationId xmlns:a16="http://schemas.microsoft.com/office/drawing/2014/main" id="{7E697601-8771-4F6E-B4F6-80C40A9BB7B5}"/>
+              </a:ext>
+            </a:extLst>
+          </p:cNvPr>
+          <p:cNvSpPr txBox="1"/>
+          <p:nvPr/>
+        </p:nvSpPr>
+        <p:spPr>
+          <a:xfrm>
+            <a:off x="3462933" y="3149088"/>
+            <a:ext cx="1330519" cy="400110"/>
+          </a:xfrm>
+          <a:prstGeom prst="rect">
+            <a:avLst/>
+          </a:prstGeom>
+          <a:noFill/>
+        </p:spPr>
+        <p:txBody>
+          <a:bodyPr wrap="square" rtlCol="0">
+            <a:spAutoFit/>
+          </a:bodyPr>
+          <a:lstStyle/>
+          <a:p>
+            <a:r>
+              <a:rPr lang="en-US" sz="1000" dirty="0"/>
+              <a:t>gcn1_in</a:t>
+            </a:r>
+          </a:p>
+          <a:p>
+            <a:r>
+              <a:rPr lang="en-US" sz="1000" dirty="0"/>
+              <a:t>(2**wf</a:t>
+            </a:r>
+            <a:r>
+              <a:rPr lang="en-US" sz="1000" dirty="0">
+                <a:sym typeface="Wingdings" panose="05000000000000000000" pitchFamily="2" charset="2"/>
+              </a:rPr>
+              <a:t>2**(wf+1)</a:t>
+            </a:r>
+            <a:r>
+              <a:rPr lang="en-US" sz="1000" dirty="0"/>
+              <a:t>)</a:t>
+            </a:r>
+            <a:endParaRPr lang="en-CH" sz="1000" dirty="0"/>
+          </a:p>
+        </p:txBody>
+      </p:sp>
+      <p:sp>
+        <p:nvSpPr>
+          <p:cNvPr id="72" name="TextBox 71">
+            <a:extLst>
+              <a:ext uri="{FF2B5EF4-FFF2-40B4-BE49-F238E27FC236}">
+                <a16:creationId xmlns:a16="http://schemas.microsoft.com/office/drawing/2014/main" id="{EF8176B5-5500-4705-B082-481EFFD04FB8}"/>
+              </a:ext>
+            </a:extLst>
+          </p:cNvPr>
+          <p:cNvSpPr txBox="1"/>
+          <p:nvPr/>
+        </p:nvSpPr>
+        <p:spPr>
+          <a:xfrm>
+            <a:off x="4860596" y="5143209"/>
+            <a:ext cx="1591557" cy="400110"/>
+          </a:xfrm>
+          <a:prstGeom prst="rect">
+            <a:avLst/>
+          </a:prstGeom>
+          <a:noFill/>
+        </p:spPr>
+        <p:txBody>
+          <a:bodyPr wrap="square" rtlCol="0">
+            <a:spAutoFit/>
+          </a:bodyPr>
+          <a:lstStyle/>
+          <a:p>
+            <a:r>
+              <a:rPr lang="en-US" sz="1000" dirty="0"/>
+              <a:t>gcn2_in</a:t>
+            </a:r>
+          </a:p>
+          <a:p>
+            <a:r>
+              <a:rPr lang="en-US" sz="1000" dirty="0"/>
+              <a:t>(</a:t>
+            </a:r>
+            <a:r>
+              <a:rPr lang="en-US" sz="1000" dirty="0">
+                <a:sym typeface="Wingdings" panose="05000000000000000000" pitchFamily="2" charset="2"/>
+              </a:rPr>
+              <a:t>2**(wf+1)2**(wf+2)</a:t>
+            </a:r>
+            <a:r>
+              <a:rPr lang="en-US" sz="1000" dirty="0"/>
+              <a:t>)</a:t>
+            </a:r>
+            <a:endParaRPr lang="en-CH" sz="1000" dirty="0"/>
+          </a:p>
+        </p:txBody>
+      </p:sp>
+      <p:sp>
+        <p:nvSpPr>
+          <p:cNvPr id="73" name="TextBox 72">
+            <a:extLst>
+              <a:ext uri="{FF2B5EF4-FFF2-40B4-BE49-F238E27FC236}">
+                <a16:creationId xmlns:a16="http://schemas.microsoft.com/office/drawing/2014/main" id="{2C038B75-BA5C-41F6-8C34-72260E035814}"/>
+              </a:ext>
+            </a:extLst>
+          </p:cNvPr>
+          <p:cNvSpPr txBox="1"/>
+          <p:nvPr/>
+        </p:nvSpPr>
+        <p:spPr>
+          <a:xfrm>
+            <a:off x="6725223" y="3201141"/>
+            <a:ext cx="1868692" cy="338554"/>
+          </a:xfrm>
+          <a:prstGeom prst="rect">
+            <a:avLst/>
+          </a:prstGeom>
+          <a:noFill/>
+        </p:spPr>
+        <p:txBody>
+          <a:bodyPr wrap="square" rtlCol="0">
+            <a:spAutoFit/>
+          </a:bodyPr>
+          <a:lstStyle/>
+          <a:p>
+            <a:r>
+              <a:rPr lang="en-US" sz="800" dirty="0"/>
+              <a:t>gcn1_out</a:t>
+            </a:r>
+          </a:p>
+          <a:p>
+            <a:r>
+              <a:rPr lang="en-US" sz="800" dirty="0"/>
+              <a:t>([2**(wf+1) + 2**(wf+2)]) -&gt; 2**(wf+1) </a:t>
+            </a:r>
+            <a:endParaRPr lang="en-CH" sz="800" dirty="0"/>
+          </a:p>
+        </p:txBody>
+      </p:sp>
+      <p:sp>
+        <p:nvSpPr>
+          <p:cNvPr id="74" name="TextBox 73">
+            <a:extLst>
+              <a:ext uri="{FF2B5EF4-FFF2-40B4-BE49-F238E27FC236}">
+                <a16:creationId xmlns:a16="http://schemas.microsoft.com/office/drawing/2014/main" id="{1F2B487B-9BAE-4CFC-AAC2-ED16C06CE1B4}"/>
+              </a:ext>
+            </a:extLst>
+          </p:cNvPr>
+          <p:cNvSpPr txBox="1"/>
+          <p:nvPr/>
+        </p:nvSpPr>
+        <p:spPr>
+          <a:xfrm>
+            <a:off x="1335149" y="2355786"/>
+            <a:ext cx="2054319" cy="553998"/>
+          </a:xfrm>
+          <a:prstGeom prst="rect">
+            <a:avLst/>
+          </a:prstGeom>
+          <a:noFill/>
+        </p:spPr>
+        <p:txBody>
+          <a:bodyPr wrap="square" rtlCol="0">
+            <a:spAutoFit/>
+          </a:bodyPr>
+          <a:lstStyle/>
+          <a:p>
+            <a:r>
+              <a:rPr lang="en-US" sz="1000" dirty="0"/>
+              <a:t>s1 = conv_pool1(num_clusters1)</a:t>
+            </a:r>
+            <a:br>
+              <a:rPr lang="en-US" sz="1000" dirty="0"/>
+            </a:br>
+            <a:r>
+              <a:rPr lang="en-US" sz="1000" dirty="0" err="1"/>
+              <a:t>dense_diff_pool</a:t>
+            </a:r>
+            <a:r>
+              <a:rPr lang="en-US" sz="1000" dirty="0"/>
+              <a:t>(x0_, </a:t>
+            </a:r>
+            <a:r>
+              <a:rPr lang="en-US" sz="1000" dirty="0" err="1"/>
+              <a:t>data.adj</a:t>
+            </a:r>
+            <a:r>
+              <a:rPr lang="en-US" sz="1000" dirty="0"/>
+              <a:t>, s1, mask)</a:t>
+            </a:r>
+            <a:endParaRPr lang="en-CH" sz="1000" dirty="0"/>
+          </a:p>
+        </p:txBody>
+      </p:sp>
+      <p:sp>
+        <p:nvSpPr>
+          <p:cNvPr id="10" name="Rectangle 9">
+            <a:extLst>
+              <a:ext uri="{FF2B5EF4-FFF2-40B4-BE49-F238E27FC236}">
+                <a16:creationId xmlns:a16="http://schemas.microsoft.com/office/drawing/2014/main" id="{66854192-106D-45AD-A631-E42BF53DA55A}"/>
+              </a:ext>
+            </a:extLst>
+          </p:cNvPr>
+          <p:cNvSpPr/>
+          <p:nvPr/>
+        </p:nvSpPr>
+        <p:spPr>
+          <a:xfrm>
+            <a:off x="6071096" y="5019556"/>
+            <a:ext cx="823110" cy="276999"/>
+          </a:xfrm>
+          <a:prstGeom prst="rect">
+            <a:avLst/>
+          </a:prstGeom>
+        </p:spPr>
+        <p:txBody>
+          <a:bodyPr wrap="none">
+            <a:spAutoFit/>
+          </a:bodyPr>
+          <a:lstStyle/>
+          <a:p>
+            <a:r>
+              <a:rPr lang="en-US" sz="1200" dirty="0">
+                <a:sym typeface="Wingdings" panose="05000000000000000000" pitchFamily="2" charset="2"/>
+              </a:rPr>
+              <a:t>2**(wf+2)</a:t>
+            </a:r>
+            <a:endParaRPr lang="en-CH" sz="1200" dirty="0"/>
+          </a:p>
+        </p:txBody>
+      </p:sp>
+      <p:sp>
+        <p:nvSpPr>
+          <p:cNvPr id="12" name="Rectangle 11">
+            <a:extLst>
+              <a:ext uri="{FF2B5EF4-FFF2-40B4-BE49-F238E27FC236}">
+                <a16:creationId xmlns:a16="http://schemas.microsoft.com/office/drawing/2014/main" id="{18F2B010-5EAB-406C-9BFF-B5E467427404}"/>
+              </a:ext>
+            </a:extLst>
+          </p:cNvPr>
+          <p:cNvSpPr/>
+          <p:nvPr/>
+        </p:nvSpPr>
+        <p:spPr>
+          <a:xfrm>
+            <a:off x="4410899" y="2769772"/>
+            <a:ext cx="771365" cy="261610"/>
+          </a:xfrm>
+          <a:prstGeom prst="rect">
+            <a:avLst/>
+          </a:prstGeom>
+        </p:spPr>
+        <p:txBody>
+          <a:bodyPr wrap="none">
+            <a:spAutoFit/>
+          </a:bodyPr>
+          <a:lstStyle/>
+          <a:p>
+            <a:r>
+              <a:rPr lang="en-US" sz="1050" dirty="0">
+                <a:sym typeface="Wingdings" panose="05000000000000000000" pitchFamily="2" charset="2"/>
+              </a:rPr>
+              <a:t>2**(wf+1)</a:t>
+            </a:r>
+            <a:endParaRPr lang="en-CH" sz="1050" dirty="0"/>
+          </a:p>
+        </p:txBody>
+      </p:sp>
+      <p:sp>
+        <p:nvSpPr>
+          <p:cNvPr id="76" name="Rectangle 75">
+            <a:extLst>
+              <a:ext uri="{FF2B5EF4-FFF2-40B4-BE49-F238E27FC236}">
+                <a16:creationId xmlns:a16="http://schemas.microsoft.com/office/drawing/2014/main" id="{16FD38B4-2F24-40E3-81BA-A8654739A77A}"/>
+              </a:ext>
+            </a:extLst>
+          </p:cNvPr>
+          <p:cNvSpPr/>
+          <p:nvPr/>
+        </p:nvSpPr>
+        <p:spPr>
+          <a:xfrm>
+            <a:off x="8221552" y="2766641"/>
+            <a:ext cx="771365" cy="261610"/>
+          </a:xfrm>
+          <a:prstGeom prst="rect">
+            <a:avLst/>
+          </a:prstGeom>
+        </p:spPr>
+        <p:txBody>
+          <a:bodyPr wrap="none">
+            <a:spAutoFit/>
+          </a:bodyPr>
+          <a:lstStyle/>
+          <a:p>
+            <a:r>
+              <a:rPr lang="en-US" sz="1050" dirty="0">
+                <a:sym typeface="Wingdings" panose="05000000000000000000" pitchFamily="2" charset="2"/>
+              </a:rPr>
+              <a:t>2**(wf+1)</a:t>
+            </a:r>
+            <a:endParaRPr lang="en-CH" sz="1050" dirty="0"/>
+          </a:p>
+        </p:txBody>
+      </p:sp>
+      <p:sp>
+        <p:nvSpPr>
+          <p:cNvPr id="77" name="TextBox 76">
+            <a:extLst>
+              <a:ext uri="{FF2B5EF4-FFF2-40B4-BE49-F238E27FC236}">
+                <a16:creationId xmlns:a16="http://schemas.microsoft.com/office/drawing/2014/main" id="{496DC1E0-6079-43EE-88D8-1B8672F483B3}"/>
+              </a:ext>
+            </a:extLst>
+          </p:cNvPr>
+          <p:cNvSpPr txBox="1"/>
+          <p:nvPr/>
+        </p:nvSpPr>
+        <p:spPr>
+          <a:xfrm>
+            <a:off x="9228086" y="1032818"/>
+            <a:ext cx="1868692" cy="338554"/>
+          </a:xfrm>
+          <a:prstGeom prst="rect">
+            <a:avLst/>
+          </a:prstGeom>
+          <a:noFill/>
+        </p:spPr>
+        <p:txBody>
+          <a:bodyPr wrap="square" rtlCol="0">
+            <a:spAutoFit/>
+          </a:bodyPr>
+          <a:lstStyle/>
+          <a:p>
+            <a:r>
+              <a:rPr lang="en-US" sz="800" dirty="0"/>
+              <a:t>gcn0_out</a:t>
+            </a:r>
+          </a:p>
+          <a:p>
+            <a:r>
+              <a:rPr lang="en-US" sz="800" dirty="0"/>
+              <a:t>([2**(</a:t>
+            </a:r>
+            <a:r>
+              <a:rPr lang="en-US" sz="800" dirty="0" err="1"/>
+              <a:t>wf</a:t>
+            </a:r>
+            <a:r>
+              <a:rPr lang="en-US" sz="800" dirty="0"/>
+              <a:t>) + 2**(wf+1)]) -&gt; </a:t>
+            </a:r>
+            <a:r>
+              <a:rPr lang="en-US" sz="800" dirty="0" err="1"/>
+              <a:t>n_classes</a:t>
+            </a:r>
+            <a:r>
+              <a:rPr lang="en-US" sz="800" dirty="0"/>
+              <a:t> </a:t>
+            </a:r>
+            <a:endParaRPr lang="en-CH" sz="800" dirty="0"/>
+          </a:p>
+        </p:txBody>
+      </p:sp>
+      <p:sp>
+        <p:nvSpPr>
+          <p:cNvPr id="78" name="Rectangle 77">
+            <a:extLst>
+              <a:ext uri="{FF2B5EF4-FFF2-40B4-BE49-F238E27FC236}">
+                <a16:creationId xmlns:a16="http://schemas.microsoft.com/office/drawing/2014/main" id="{229BE1E8-7A6F-45DD-9668-0EA34D05E781}"/>
+              </a:ext>
+            </a:extLst>
+          </p:cNvPr>
+          <p:cNvSpPr/>
+          <p:nvPr/>
+        </p:nvSpPr>
+        <p:spPr>
+          <a:xfrm>
+            <a:off x="5844294" y="2805508"/>
+            <a:ext cx="607859" cy="215444"/>
+          </a:xfrm>
+          <a:prstGeom prst="rect">
+            <a:avLst/>
+          </a:prstGeom>
+        </p:spPr>
+        <p:txBody>
+          <a:bodyPr wrap="none">
+            <a:spAutoFit/>
+          </a:bodyPr>
+          <a:lstStyle/>
+          <a:p>
+            <a:r>
+              <a:rPr lang="en-US" sz="800" dirty="0">
+                <a:sym typeface="Wingdings" panose="05000000000000000000" pitchFamily="2" charset="2"/>
+              </a:rPr>
+              <a:t>2**(wf+1)</a:t>
+            </a:r>
+            <a:endParaRPr lang="en-CH" sz="800" dirty="0"/>
+          </a:p>
+        </p:txBody>
+      </p:sp>
+      <p:sp>
+        <p:nvSpPr>
+          <p:cNvPr id="79" name="Rectangle 78">
+            <a:extLst>
+              <a:ext uri="{FF2B5EF4-FFF2-40B4-BE49-F238E27FC236}">
+                <a16:creationId xmlns:a16="http://schemas.microsoft.com/office/drawing/2014/main" id="{C40F302E-85F1-405C-AF98-3E69E320E45C}"/>
+              </a:ext>
+            </a:extLst>
+          </p:cNvPr>
+          <p:cNvSpPr/>
+          <p:nvPr/>
+        </p:nvSpPr>
+        <p:spPr>
+          <a:xfrm>
+            <a:off x="6531768" y="2777988"/>
+            <a:ext cx="607859" cy="215444"/>
+          </a:xfrm>
+          <a:prstGeom prst="rect">
+            <a:avLst/>
+          </a:prstGeom>
+        </p:spPr>
+        <p:txBody>
+          <a:bodyPr wrap="none">
+            <a:spAutoFit/>
+          </a:bodyPr>
+          <a:lstStyle/>
+          <a:p>
+            <a:r>
+              <a:rPr lang="en-US" sz="800" dirty="0">
+                <a:sym typeface="Wingdings" panose="05000000000000000000" pitchFamily="2" charset="2"/>
+              </a:rPr>
+              <a:t>2**(wf+2)</a:t>
+            </a:r>
+            <a:endParaRPr lang="en-CH" sz="800" dirty="0"/>
+          </a:p>
+        </p:txBody>
+      </p:sp>
+      <p:sp>
+        <p:nvSpPr>
+          <p:cNvPr id="81" name="Rectangle 80">
+            <a:extLst>
+              <a:ext uri="{FF2B5EF4-FFF2-40B4-BE49-F238E27FC236}">
+                <a16:creationId xmlns:a16="http://schemas.microsoft.com/office/drawing/2014/main" id="{40779BD3-A282-491A-B08F-79DE84B05662}"/>
+              </a:ext>
+            </a:extLst>
+          </p:cNvPr>
+          <p:cNvSpPr/>
+          <p:nvPr/>
+        </p:nvSpPr>
+        <p:spPr>
+          <a:xfrm>
+            <a:off x="7928853" y="333427"/>
+            <a:ext cx="607859" cy="215444"/>
+          </a:xfrm>
+          <a:prstGeom prst="rect">
+            <a:avLst/>
+          </a:prstGeom>
+        </p:spPr>
+        <p:txBody>
+          <a:bodyPr wrap="none">
+            <a:spAutoFit/>
+          </a:bodyPr>
+          <a:lstStyle/>
+          <a:p>
+            <a:r>
+              <a:rPr lang="en-US" sz="800" dirty="0">
+                <a:sym typeface="Wingdings" panose="05000000000000000000" pitchFamily="2" charset="2"/>
+              </a:rPr>
+              <a:t>2**(wf+1)</a:t>
+            </a:r>
+            <a:endParaRPr lang="en-CH" sz="800" dirty="0"/>
+          </a:p>
+        </p:txBody>
+      </p:sp>
+      <p:sp>
+        <p:nvSpPr>
+          <p:cNvPr id="82" name="Rectangle 81">
+            <a:extLst>
+              <a:ext uri="{FF2B5EF4-FFF2-40B4-BE49-F238E27FC236}">
+                <a16:creationId xmlns:a16="http://schemas.microsoft.com/office/drawing/2014/main" id="{6A62F598-CF83-41DA-908A-5A203F60C66D}"/>
+              </a:ext>
+            </a:extLst>
+          </p:cNvPr>
+          <p:cNvSpPr/>
+          <p:nvPr/>
+        </p:nvSpPr>
+        <p:spPr>
+          <a:xfrm>
+            <a:off x="8536712" y="333427"/>
+            <a:ext cx="505267" cy="215444"/>
+          </a:xfrm>
+          <a:prstGeom prst="rect">
+            <a:avLst/>
+          </a:prstGeom>
+        </p:spPr>
+        <p:txBody>
+          <a:bodyPr wrap="none">
+            <a:spAutoFit/>
+          </a:bodyPr>
+          <a:lstStyle/>
+          <a:p>
+            <a:r>
+              <a:rPr lang="en-US" sz="800" dirty="0">
+                <a:sym typeface="Wingdings" panose="05000000000000000000" pitchFamily="2" charset="2"/>
+              </a:rPr>
+              <a:t>2**(</a:t>
+            </a:r>
+            <a:r>
+              <a:rPr lang="en-US" sz="800" dirty="0" err="1">
+                <a:sym typeface="Wingdings" panose="05000000000000000000" pitchFamily="2" charset="2"/>
+              </a:rPr>
+              <a:t>wf</a:t>
+            </a:r>
+            <a:r>
+              <a:rPr lang="en-US" sz="800" dirty="0">
+                <a:sym typeface="Wingdings" panose="05000000000000000000" pitchFamily="2" charset="2"/>
+              </a:rPr>
+              <a:t>)</a:t>
+            </a:r>
+            <a:endParaRPr lang="en-CH" sz="800" dirty="0"/>
+          </a:p>
+        </p:txBody>
+      </p:sp>
+      <p:sp>
+        <p:nvSpPr>
+          <p:cNvPr id="84" name="TextBox 83">
+            <a:extLst>
+              <a:ext uri="{FF2B5EF4-FFF2-40B4-BE49-F238E27FC236}">
+                <a16:creationId xmlns:a16="http://schemas.microsoft.com/office/drawing/2014/main" id="{2CCD6E27-51E5-4B75-BECE-6E523A85497B}"/>
+              </a:ext>
+            </a:extLst>
+          </p:cNvPr>
+          <p:cNvSpPr txBox="1"/>
+          <p:nvPr/>
+        </p:nvSpPr>
+        <p:spPr>
+          <a:xfrm>
+            <a:off x="2435773" y="4580698"/>
+            <a:ext cx="2054319" cy="400110"/>
+          </a:xfrm>
+          <a:prstGeom prst="rect">
+            <a:avLst/>
+          </a:prstGeom>
+          <a:noFill/>
+        </p:spPr>
+        <p:txBody>
+          <a:bodyPr wrap="square" rtlCol="0">
+            <a:spAutoFit/>
+          </a:bodyPr>
+          <a:lstStyle/>
+          <a:p>
+            <a:r>
+              <a:rPr lang="en-US" sz="1000" dirty="0"/>
+              <a:t>s2 = conv_pool2(num_clusters2)</a:t>
+            </a:r>
+            <a:br>
+              <a:rPr lang="en-US" sz="1000" dirty="0"/>
+            </a:br>
+            <a:r>
+              <a:rPr lang="en-US" sz="1000" dirty="0" err="1"/>
+              <a:t>dense_diff_pool</a:t>
+            </a:r>
+            <a:r>
+              <a:rPr lang="en-US" sz="1000" dirty="0"/>
+              <a:t>(x1_, adj1, s2)</a:t>
+            </a:r>
+            <a:endParaRPr lang="en-CH" sz="1000" dirty="0"/>
+          </a:p>
+        </p:txBody>
+      </p:sp>
+      <p:sp>
+        <p:nvSpPr>
+          <p:cNvPr id="13" name="Rectangle 12">
+            <a:extLst>
+              <a:ext uri="{FF2B5EF4-FFF2-40B4-BE49-F238E27FC236}">
+                <a16:creationId xmlns:a16="http://schemas.microsoft.com/office/drawing/2014/main" id="{CA661599-50C4-4E07-9D09-5C9E7C4F8A83}"/>
+              </a:ext>
+            </a:extLst>
+          </p:cNvPr>
+          <p:cNvSpPr/>
+          <p:nvPr/>
+        </p:nvSpPr>
+        <p:spPr>
+          <a:xfrm>
+            <a:off x="2949625" y="264415"/>
+            <a:ext cx="628698" cy="261610"/>
+          </a:xfrm>
+          <a:prstGeom prst="rect">
+            <a:avLst/>
+          </a:prstGeom>
+        </p:spPr>
+        <p:txBody>
+          <a:bodyPr wrap="none">
+            <a:spAutoFit/>
+          </a:bodyPr>
+          <a:lstStyle/>
+          <a:p>
+            <a:r>
+              <a:rPr lang="en-US" sz="1100" dirty="0">
+                <a:sym typeface="Wingdings" panose="05000000000000000000" pitchFamily="2" charset="2"/>
+              </a:rPr>
+              <a:t>2**(</a:t>
+            </a:r>
+            <a:r>
+              <a:rPr lang="en-US" sz="1100" dirty="0" err="1">
+                <a:sym typeface="Wingdings" panose="05000000000000000000" pitchFamily="2" charset="2"/>
+              </a:rPr>
+              <a:t>wf</a:t>
+            </a:r>
+            <a:r>
+              <a:rPr lang="en-US" sz="1100" dirty="0">
+                <a:sym typeface="Wingdings" panose="05000000000000000000" pitchFamily="2" charset="2"/>
+              </a:rPr>
+              <a:t>)</a:t>
+            </a:r>
+            <a:endParaRPr lang="en-CH" sz="1100" dirty="0"/>
           </a:p>
         </p:txBody>
       </p:sp>

</xml_diff>

<commit_message>
updated diff pooling methods to distinguish between 1 and 2 hidden layer in the horizontal gcn. Created time complexity code.
</commit_message>
<xml_diff>
--- a/models/diffpool_unet_architecture.pptx
+++ b/models/diffpool_unet_architecture.pptx
@@ -7,6 +7,7 @@
   <p:sldIdLst>
     <p:sldId id="256" r:id="rId2"/>
     <p:sldId id="257" r:id="rId3"/>
+    <p:sldId id="258" r:id="rId4"/>
   </p:sldIdLst>
   <p:sldSz cx="12192000" cy="6858000"/>
   <p:notesSz cx="6858000" cy="9144000"/>
@@ -127,7 +128,8 @@
 <file path=ppt/revisionInfo.xml><?xml version="1.0" encoding="utf-8"?>
 <p1510:revInfo xmlns:a="http://schemas.openxmlformats.org/drawingml/2006/main" xmlns:r="http://schemas.openxmlformats.org/officeDocument/2006/relationships" xmlns:p1510="http://schemas.microsoft.com/office/powerpoint/2015/10/main">
   <p1510:revLst>
-    <p1510:client id="{2905985C-D2AF-4E47-976F-9F6DE4D7A03C}" v="161" dt="2020-01-13T17:05:36.576"/>
+    <p1510:client id="{2905985C-D2AF-4E47-976F-9F6DE4D7A03C}" v="165" dt="2020-01-14T06:07:17.957"/>
+    <p1510:client id="{C961C1F1-7D2C-4DE2-A7AF-4CBC6813BF88}" v="2" dt="2020-01-13T19:11:07.230"/>
   </p1510:revLst>
 </p1510:revInfo>
 </file>
@@ -135,9 +137,40 @@
 <file path=ppt/changesInfos/changesInfo1.xml><?xml version="1.0" encoding="utf-8"?>
 <pc:chgInfo xmlns:a="http://schemas.openxmlformats.org/drawingml/2006/main" xmlns:r="http://schemas.openxmlformats.org/officeDocument/2006/relationships" xmlns:ac="http://schemas.microsoft.com/office/drawing/2013/main/command" xmlns:pc="http://schemas.microsoft.com/office/powerpoint/2013/main/command">
   <pc:docChgLst>
+    <pc:chgData name="Henry Martin" userId="cc6f2d1fd4666abe" providerId="LiveId" clId="{C961C1F1-7D2C-4DE2-A7AF-4CBC6813BF88}"/>
+    <pc:docChg chg="addSld modSld">
+      <pc:chgData name="Henry Martin" userId="cc6f2d1fd4666abe" providerId="LiveId" clId="{C961C1F1-7D2C-4DE2-A7AF-4CBC6813BF88}" dt="2020-01-13T19:11:10.502" v="2" actId="1076"/>
+      <pc:docMkLst>
+        <pc:docMk/>
+      </pc:docMkLst>
+      <pc:sldChg chg="addSp modSp">
+        <pc:chgData name="Henry Martin" userId="cc6f2d1fd4666abe" providerId="LiveId" clId="{C961C1F1-7D2C-4DE2-A7AF-4CBC6813BF88}" dt="2020-01-13T19:11:10.502" v="2" actId="1076"/>
+        <pc:sldMkLst>
+          <pc:docMk/>
+          <pc:sldMk cId="2084767380" sldId="257"/>
+        </pc:sldMkLst>
+        <pc:spChg chg="add mod">
+          <ac:chgData name="Henry Martin" userId="cc6f2d1fd4666abe" providerId="LiveId" clId="{C961C1F1-7D2C-4DE2-A7AF-4CBC6813BF88}" dt="2020-01-13T19:11:10.502" v="2" actId="1076"/>
+          <ac:spMkLst>
+            <pc:docMk/>
+            <pc:sldMk cId="2084767380" sldId="257"/>
+            <ac:spMk id="70" creationId="{E046BDD7-C59B-4003-B5E4-7566B0BFD2F0}"/>
+          </ac:spMkLst>
+        </pc:spChg>
+      </pc:sldChg>
+      <pc:sldChg chg="add">
+        <pc:chgData name="Henry Martin" userId="cc6f2d1fd4666abe" providerId="LiveId" clId="{C961C1F1-7D2C-4DE2-A7AF-4CBC6813BF88}" dt="2020-01-13T19:11:00.070" v="0"/>
+        <pc:sldMkLst>
+          <pc:docMk/>
+          <pc:sldMk cId="469849756" sldId="258"/>
+        </pc:sldMkLst>
+      </pc:sldChg>
+    </pc:docChg>
+  </pc:docChgLst>
+  <pc:docChgLst>
     <pc:chgData name="Henry Martin" userId="cc6f2d1fd4666abe" providerId="LiveId" clId="{2905985C-D2AF-4E47-976F-9F6DE4D7A03C}"/>
     <pc:docChg chg="undo custSel addSld modSld">
-      <pc:chgData name="Henry Martin" userId="cc6f2d1fd4666abe" providerId="LiveId" clId="{2905985C-D2AF-4E47-976F-9F6DE4D7A03C}" dt="2020-01-13T17:05:44.553" v="1018" actId="6549"/>
+      <pc:chgData name="Henry Martin" userId="cc6f2d1fd4666abe" providerId="LiveId" clId="{2905985C-D2AF-4E47-976F-9F6DE4D7A03C}" dt="2020-01-14T06:07:23.255" v="1048" actId="20577"/>
       <pc:docMkLst>
         <pc:docMk/>
       </pc:docMkLst>
@@ -525,7 +558,7 @@
         </pc:spChg>
       </pc:sldChg>
       <pc:sldChg chg="addSp delSp modSp add">
-        <pc:chgData name="Henry Martin" userId="cc6f2d1fd4666abe" providerId="LiveId" clId="{2905985C-D2AF-4E47-976F-9F6DE4D7A03C}" dt="2020-01-13T17:05:44.553" v="1018" actId="6549"/>
+        <pc:chgData name="Henry Martin" userId="cc6f2d1fd4666abe" providerId="LiveId" clId="{2905985C-D2AF-4E47-976F-9F6DE4D7A03C}" dt="2020-01-14T06:07:23.255" v="1048" actId="20577"/>
         <pc:sldMkLst>
           <pc:docMk/>
           <pc:sldMk cId="2084767380" sldId="257"/>
@@ -1011,6 +1044,14 @@
           </ac:spMkLst>
         </pc:spChg>
         <pc:spChg chg="add mod">
+          <ac:chgData name="Henry Martin" userId="cc6f2d1fd4666abe" providerId="LiveId" clId="{2905985C-D2AF-4E47-976F-9F6DE4D7A03C}" dt="2020-01-14T06:07:01.223" v="1032" actId="20577"/>
+          <ac:spMkLst>
+            <pc:docMk/>
+            <pc:sldMk cId="2084767380" sldId="257"/>
+            <ac:spMk id="71" creationId="{2769D534-6E6E-4794-AECA-44EB20E3DED0}"/>
+          </ac:spMkLst>
+        </pc:spChg>
+        <pc:spChg chg="add mod">
           <ac:chgData name="Henry Martin" userId="cc6f2d1fd4666abe" providerId="LiveId" clId="{2905985C-D2AF-4E47-976F-9F6DE4D7A03C}" dt="2020-01-13T16:04:37.672" v="556" actId="571"/>
           <ac:spMkLst>
             <pc:docMk/>
@@ -1051,6 +1092,14 @@
           </ac:spMkLst>
         </pc:spChg>
         <pc:spChg chg="add mod">
+          <ac:chgData name="Henry Martin" userId="cc6f2d1fd4666abe" providerId="LiveId" clId="{2905985C-D2AF-4E47-976F-9F6DE4D7A03C}" dt="2020-01-14T06:07:09.550" v="1041" actId="20577"/>
+          <ac:spMkLst>
+            <pc:docMk/>
+            <pc:sldMk cId="2084767380" sldId="257"/>
+            <ac:spMk id="75" creationId="{D9948A37-E6FF-41C7-889E-699B9417B1C9}"/>
+          </ac:spMkLst>
+        </pc:spChg>
+        <pc:spChg chg="add mod">
           <ac:chgData name="Henry Martin" userId="cc6f2d1fd4666abe" providerId="LiveId" clId="{2905985C-D2AF-4E47-976F-9F6DE4D7A03C}" dt="2020-01-13T16:22:06.580" v="838" actId="1076"/>
           <ac:spMkLst>
             <pc:docMk/>
@@ -1082,6 +1131,14 @@
             <ac:spMk id="79" creationId="{C40F302E-85F1-405C-AF98-3E69E320E45C}"/>
           </ac:spMkLst>
         </pc:spChg>
+        <pc:spChg chg="add del mod">
+          <ac:chgData name="Henry Martin" userId="cc6f2d1fd4666abe" providerId="LiveId" clId="{2905985C-D2AF-4E47-976F-9F6DE4D7A03C}" dt="2020-01-14T06:07:15.006" v="1043" actId="478"/>
+          <ac:spMkLst>
+            <pc:docMk/>
+            <pc:sldMk cId="2084767380" sldId="257"/>
+            <ac:spMk id="80" creationId="{138D6EA8-F861-4F3A-83A9-E2218C3AE2C3}"/>
+          </ac:spMkLst>
+        </pc:spChg>
         <pc:spChg chg="add del">
           <ac:chgData name="Henry Martin" userId="cc6f2d1fd4666abe" providerId="LiveId" clId="{2905985C-D2AF-4E47-976F-9F6DE4D7A03C}" dt="2020-01-13T16:23:08.853" v="876"/>
           <ac:spMkLst>
@@ -1104,6 +1161,14 @@
             <pc:docMk/>
             <pc:sldMk cId="2084767380" sldId="257"/>
             <ac:spMk id="82" creationId="{6A62F598-CF83-41DA-908A-5A203F60C66D}"/>
+          </ac:spMkLst>
+        </pc:spChg>
+        <pc:spChg chg="add mod">
+          <ac:chgData name="Henry Martin" userId="cc6f2d1fd4666abe" providerId="LiveId" clId="{2905985C-D2AF-4E47-976F-9F6DE4D7A03C}" dt="2020-01-14T06:07:23.255" v="1048" actId="20577"/>
+          <ac:spMkLst>
+            <pc:docMk/>
+            <pc:sldMk cId="2084767380" sldId="257"/>
+            <ac:spMk id="83" creationId="{417C973D-2D3F-41B4-8C78-E404D2A2B507}"/>
           </ac:spMkLst>
         </pc:spChg>
         <pc:spChg chg="add del mod">
@@ -1405,7 +1470,7 @@
           <a:p>
             <a:fld id="{78E62E1B-6FCD-4114-81BA-4B1FF6A70EA5}" type="datetimeFigureOut">
               <a:rPr lang="en-CH" smtClean="0"/>
-              <a:t>13/01/2020</a:t>
+              <a:t>14/01/2020</a:t>
             </a:fld>
             <a:endParaRPr lang="en-CH"/>
           </a:p>
@@ -1605,7 +1670,7 @@
           <a:p>
             <a:fld id="{78E62E1B-6FCD-4114-81BA-4B1FF6A70EA5}" type="datetimeFigureOut">
               <a:rPr lang="en-CH" smtClean="0"/>
-              <a:t>13/01/2020</a:t>
+              <a:t>14/01/2020</a:t>
             </a:fld>
             <a:endParaRPr lang="en-CH"/>
           </a:p>
@@ -1815,7 +1880,7 @@
           <a:p>
             <a:fld id="{78E62E1B-6FCD-4114-81BA-4B1FF6A70EA5}" type="datetimeFigureOut">
               <a:rPr lang="en-CH" smtClean="0"/>
-              <a:t>13/01/2020</a:t>
+              <a:t>14/01/2020</a:t>
             </a:fld>
             <a:endParaRPr lang="en-CH"/>
           </a:p>
@@ -2015,7 +2080,7 @@
           <a:p>
             <a:fld id="{78E62E1B-6FCD-4114-81BA-4B1FF6A70EA5}" type="datetimeFigureOut">
               <a:rPr lang="en-CH" smtClean="0"/>
-              <a:t>13/01/2020</a:t>
+              <a:t>14/01/2020</a:t>
             </a:fld>
             <a:endParaRPr lang="en-CH"/>
           </a:p>
@@ -2291,7 +2356,7 @@
           <a:p>
             <a:fld id="{78E62E1B-6FCD-4114-81BA-4B1FF6A70EA5}" type="datetimeFigureOut">
               <a:rPr lang="en-CH" smtClean="0"/>
-              <a:t>13/01/2020</a:t>
+              <a:t>14/01/2020</a:t>
             </a:fld>
             <a:endParaRPr lang="en-CH"/>
           </a:p>
@@ -2559,7 +2624,7 @@
           <a:p>
             <a:fld id="{78E62E1B-6FCD-4114-81BA-4B1FF6A70EA5}" type="datetimeFigureOut">
               <a:rPr lang="en-CH" smtClean="0"/>
-              <a:t>13/01/2020</a:t>
+              <a:t>14/01/2020</a:t>
             </a:fld>
             <a:endParaRPr lang="en-CH"/>
           </a:p>
@@ -2974,7 +3039,7 @@
           <a:p>
             <a:fld id="{78E62E1B-6FCD-4114-81BA-4B1FF6A70EA5}" type="datetimeFigureOut">
               <a:rPr lang="en-CH" smtClean="0"/>
-              <a:t>13/01/2020</a:t>
+              <a:t>14/01/2020</a:t>
             </a:fld>
             <a:endParaRPr lang="en-CH"/>
           </a:p>
@@ -3116,7 +3181,7 @@
           <a:p>
             <a:fld id="{78E62E1B-6FCD-4114-81BA-4B1FF6A70EA5}" type="datetimeFigureOut">
               <a:rPr lang="en-CH" smtClean="0"/>
-              <a:t>13/01/2020</a:t>
+              <a:t>14/01/2020</a:t>
             </a:fld>
             <a:endParaRPr lang="en-CH"/>
           </a:p>
@@ -3229,7 +3294,7 @@
           <a:p>
             <a:fld id="{78E62E1B-6FCD-4114-81BA-4B1FF6A70EA5}" type="datetimeFigureOut">
               <a:rPr lang="en-CH" smtClean="0"/>
-              <a:t>13/01/2020</a:t>
+              <a:t>14/01/2020</a:t>
             </a:fld>
             <a:endParaRPr lang="en-CH"/>
           </a:p>
@@ -3542,7 +3607,7 @@
           <a:p>
             <a:fld id="{78E62E1B-6FCD-4114-81BA-4B1FF6A70EA5}" type="datetimeFigureOut">
               <a:rPr lang="en-CH" smtClean="0"/>
-              <a:t>13/01/2020</a:t>
+              <a:t>14/01/2020</a:t>
             </a:fld>
             <a:endParaRPr lang="en-CH"/>
           </a:p>
@@ -3831,7 +3896,7 @@
           <a:p>
             <a:fld id="{78E62E1B-6FCD-4114-81BA-4B1FF6A70EA5}" type="datetimeFigureOut">
               <a:rPr lang="en-CH" smtClean="0"/>
-              <a:t>13/01/2020</a:t>
+              <a:t>14/01/2020</a:t>
             </a:fld>
             <a:endParaRPr lang="en-CH"/>
           </a:p>
@@ -4074,7 +4139,7 @@
           <a:p>
             <a:fld id="{78E62E1B-6FCD-4114-81BA-4B1FF6A70EA5}" type="datetimeFigureOut">
               <a:rPr lang="en-CH" smtClean="0"/>
-              <a:t>13/01/2020</a:t>
+              <a:t>14/01/2020</a:t>
             </a:fld>
             <a:endParaRPr lang="en-CH"/>
           </a:p>
@@ -8938,10 +9003,252 @@
           </a:p>
         </p:txBody>
       </p:sp>
+      <p:sp>
+        <p:nvSpPr>
+          <p:cNvPr id="70" name="Arrow: Right 69">
+            <a:extLst>
+              <a:ext uri="{FF2B5EF4-FFF2-40B4-BE49-F238E27FC236}">
+                <a16:creationId xmlns:a16="http://schemas.microsoft.com/office/drawing/2014/main" id="{E046BDD7-C59B-4003-B5E4-7566B0BFD2F0}"/>
+              </a:ext>
+            </a:extLst>
+          </p:cNvPr>
+          <p:cNvSpPr/>
+          <p:nvPr/>
+        </p:nvSpPr>
+        <p:spPr>
+          <a:xfrm>
+            <a:off x="615282" y="5798479"/>
+            <a:ext cx="654050" cy="165100"/>
+          </a:xfrm>
+          <a:prstGeom prst="rightArrow">
+            <a:avLst/>
+          </a:prstGeom>
+          <a:ln>
+            <a:solidFill>
+              <a:schemeClr val="tx1"/>
+            </a:solidFill>
+          </a:ln>
+        </p:spPr>
+        <p:style>
+          <a:lnRef idx="2">
+            <a:schemeClr val="accent1">
+              <a:shade val="50000"/>
+            </a:schemeClr>
+          </a:lnRef>
+          <a:fillRef idx="1">
+            <a:schemeClr val="accent1"/>
+          </a:fillRef>
+          <a:effectRef idx="0">
+            <a:schemeClr val="accent1"/>
+          </a:effectRef>
+          <a:fontRef idx="minor">
+            <a:schemeClr val="lt1"/>
+          </a:fontRef>
+        </p:style>
+        <p:txBody>
+          <a:bodyPr rtlCol="0" anchor="ctr"/>
+          <a:lstStyle/>
+          <a:p>
+            <a:pPr algn="ctr"/>
+            <a:endParaRPr lang="en-CH" dirty="0"/>
+          </a:p>
+        </p:txBody>
+      </p:sp>
+      <p:sp>
+        <p:nvSpPr>
+          <p:cNvPr id="71" name="Rectangle 70">
+            <a:extLst>
+              <a:ext uri="{FF2B5EF4-FFF2-40B4-BE49-F238E27FC236}">
+                <a16:creationId xmlns:a16="http://schemas.microsoft.com/office/drawing/2014/main" id="{2769D534-6E6E-4794-AECA-44EB20E3DED0}"/>
+              </a:ext>
+            </a:extLst>
+          </p:cNvPr>
+          <p:cNvSpPr/>
+          <p:nvPr/>
+        </p:nvSpPr>
+        <p:spPr>
+          <a:xfrm rot="16200000">
+            <a:off x="2469681" y="3422240"/>
+            <a:ext cx="777777" cy="253916"/>
+          </a:xfrm>
+          <a:prstGeom prst="rect">
+            <a:avLst/>
+          </a:prstGeom>
+        </p:spPr>
+        <p:txBody>
+          <a:bodyPr wrap="none">
+            <a:spAutoFit/>
+          </a:bodyPr>
+          <a:lstStyle/>
+          <a:p>
+            <a:r>
+              <a:rPr lang="en-US" sz="1050" dirty="0">
+                <a:sym typeface="Wingdings" panose="05000000000000000000" pitchFamily="2" charset="2"/>
+              </a:rPr>
+              <a:t>N_cluster1</a:t>
+            </a:r>
+            <a:endParaRPr lang="en-CH" sz="1050" dirty="0"/>
+          </a:p>
+        </p:txBody>
+      </p:sp>
+      <p:sp>
+        <p:nvSpPr>
+          <p:cNvPr id="75" name="Rectangle 74">
+            <a:extLst>
+              <a:ext uri="{FF2B5EF4-FFF2-40B4-BE49-F238E27FC236}">
+                <a16:creationId xmlns:a16="http://schemas.microsoft.com/office/drawing/2014/main" id="{D9948A37-E6FF-41C7-889E-699B9417B1C9}"/>
+              </a:ext>
+            </a:extLst>
+          </p:cNvPr>
+          <p:cNvSpPr/>
+          <p:nvPr/>
+        </p:nvSpPr>
+        <p:spPr>
+          <a:xfrm rot="16200000">
+            <a:off x="216876" y="1163366"/>
+            <a:ext cx="814647" cy="253916"/>
+          </a:xfrm>
+          <a:prstGeom prst="rect">
+            <a:avLst/>
+          </a:prstGeom>
+        </p:spPr>
+        <p:txBody>
+          <a:bodyPr wrap="none">
+            <a:spAutoFit/>
+          </a:bodyPr>
+          <a:lstStyle/>
+          <a:p>
+            <a:r>
+              <a:rPr lang="en-US" sz="1050" dirty="0" err="1">
+                <a:sym typeface="Wingdings" panose="05000000000000000000" pitchFamily="2" charset="2"/>
+              </a:rPr>
+              <a:t>N_Features</a:t>
+            </a:r>
+            <a:endParaRPr lang="en-CH" sz="1050" dirty="0"/>
+          </a:p>
+        </p:txBody>
+      </p:sp>
+      <p:sp>
+        <p:nvSpPr>
+          <p:cNvPr id="83" name="Rectangle 82">
+            <a:extLst>
+              <a:ext uri="{FF2B5EF4-FFF2-40B4-BE49-F238E27FC236}">
+                <a16:creationId xmlns:a16="http://schemas.microsoft.com/office/drawing/2014/main" id="{417C973D-2D3F-41B4-8C78-E404D2A2B507}"/>
+              </a:ext>
+            </a:extLst>
+          </p:cNvPr>
+          <p:cNvSpPr/>
+          <p:nvPr/>
+        </p:nvSpPr>
+        <p:spPr>
+          <a:xfrm rot="16200000">
+            <a:off x="4016209" y="5546097"/>
+            <a:ext cx="777777" cy="253916"/>
+          </a:xfrm>
+          <a:prstGeom prst="rect">
+            <a:avLst/>
+          </a:prstGeom>
+        </p:spPr>
+        <p:txBody>
+          <a:bodyPr wrap="none">
+            <a:spAutoFit/>
+          </a:bodyPr>
+          <a:lstStyle/>
+          <a:p>
+            <a:r>
+              <a:rPr lang="en-US" sz="1050" dirty="0">
+                <a:sym typeface="Wingdings" panose="05000000000000000000" pitchFamily="2" charset="2"/>
+              </a:rPr>
+              <a:t>N_cluster2</a:t>
+            </a:r>
+            <a:endParaRPr lang="en-CH" sz="1050" dirty="0"/>
+          </a:p>
+        </p:txBody>
+      </p:sp>
     </p:spTree>
     <p:extLst>
       <p:ext uri="{BB962C8B-B14F-4D97-AF65-F5344CB8AC3E}">
         <p14:creationId xmlns:p14="http://schemas.microsoft.com/office/powerpoint/2010/main" val="2084767380"/>
+      </p:ext>
+    </p:extLst>
+  </p:cSld>
+  <p:clrMapOvr>
+    <a:masterClrMapping/>
+  </p:clrMapOvr>
+</p:sld>
+</file>
+
+<file path=ppt/slides/slide3.xml><?xml version="1.0" encoding="utf-8"?>
+<p:sld xmlns:a="http://schemas.openxmlformats.org/drawingml/2006/main" xmlns:r="http://schemas.openxmlformats.org/officeDocument/2006/relationships" xmlns:p="http://schemas.openxmlformats.org/presentationml/2006/main">
+  <p:cSld>
+    <p:spTree>
+      <p:nvGrpSpPr>
+        <p:cNvPr id="1" name=""/>
+        <p:cNvGrpSpPr/>
+        <p:nvPr/>
+      </p:nvGrpSpPr>
+      <p:grpSpPr>
+        <a:xfrm>
+          <a:off x="0" y="0"/>
+          <a:ext cx="0" cy="0"/>
+          <a:chOff x="0" y="0"/>
+          <a:chExt cx="0" cy="0"/>
+        </a:xfrm>
+      </p:grpSpPr>
+      <p:sp>
+        <p:nvSpPr>
+          <p:cNvPr id="2" name="Title 1">
+            <a:extLst>
+              <a:ext uri="{FF2B5EF4-FFF2-40B4-BE49-F238E27FC236}">
+                <a16:creationId xmlns:a16="http://schemas.microsoft.com/office/drawing/2014/main" id="{6E6AD097-7633-4345-B3C3-CED53B3996EA}"/>
+              </a:ext>
+            </a:extLst>
+          </p:cNvPr>
+          <p:cNvSpPr>
+            <a:spLocks noGrp="1"/>
+          </p:cNvSpPr>
+          <p:nvPr>
+            <p:ph type="title"/>
+          </p:nvPr>
+        </p:nvSpPr>
+        <p:spPr/>
+        <p:txBody>
+          <a:bodyPr/>
+          <a:lstStyle/>
+          <a:p>
+            <a:endParaRPr lang="en-CH"/>
+          </a:p>
+        </p:txBody>
+      </p:sp>
+      <p:sp>
+        <p:nvSpPr>
+          <p:cNvPr id="3" name="Content Placeholder 2">
+            <a:extLst>
+              <a:ext uri="{FF2B5EF4-FFF2-40B4-BE49-F238E27FC236}">
+                <a16:creationId xmlns:a16="http://schemas.microsoft.com/office/drawing/2014/main" id="{DD3560D7-F9AB-4646-A612-A3CA88B7674B}"/>
+              </a:ext>
+            </a:extLst>
+          </p:cNvPr>
+          <p:cNvSpPr>
+            <a:spLocks noGrp="1"/>
+          </p:cNvSpPr>
+          <p:nvPr>
+            <p:ph idx="1"/>
+          </p:nvPr>
+        </p:nvSpPr>
+        <p:spPr/>
+        <p:txBody>
+          <a:bodyPr/>
+          <a:lstStyle/>
+          <a:p>
+            <a:endParaRPr lang="en-CH"/>
+          </a:p>
+        </p:txBody>
+      </p:sp>
+    </p:spTree>
+    <p:extLst>
+      <p:ext uri="{BB962C8B-B14F-4D97-AF65-F5344CB8AC3E}">
+        <p14:creationId xmlns:p14="http://schemas.microsoft.com/office/powerpoint/2010/main" val="469849756"/>
       </p:ext>
     </p:extLst>
   </p:cSld>

</xml_diff>

<commit_message>
small changes in architecture image
</commit_message>
<xml_diff>
--- a/models/diffpool_unet_architecture.pptx
+++ b/models/diffpool_unet_architecture.pptx
@@ -128,8 +128,7 @@
 <file path=ppt/revisionInfo.xml><?xml version="1.0" encoding="utf-8"?>
 <p1510:revInfo xmlns:a="http://schemas.openxmlformats.org/drawingml/2006/main" xmlns:r="http://schemas.openxmlformats.org/officeDocument/2006/relationships" xmlns:p1510="http://schemas.microsoft.com/office/powerpoint/2015/10/main">
   <p1510:revLst>
-    <p1510:client id="{2905985C-D2AF-4E47-976F-9F6DE4D7A03C}" v="165" dt="2020-01-14T06:07:17.957"/>
-    <p1510:client id="{C961C1F1-7D2C-4DE2-A7AF-4CBC6813BF88}" v="2" dt="2020-01-13T19:11:07.230"/>
+    <p1510:client id="{C961C1F1-7D2C-4DE2-A7AF-4CBC6813BF88}" v="3" dt="2020-01-18T20:28:01.313"/>
   </p1510:revLst>
 </p1510:revInfo>
 </file>
@@ -139,10 +138,161 @@
   <pc:docChgLst>
     <pc:chgData name="Henry Martin" userId="cc6f2d1fd4666abe" providerId="LiveId" clId="{C961C1F1-7D2C-4DE2-A7AF-4CBC6813BF88}"/>
     <pc:docChg chg="addSld modSld">
-      <pc:chgData name="Henry Martin" userId="cc6f2d1fd4666abe" providerId="LiveId" clId="{C961C1F1-7D2C-4DE2-A7AF-4CBC6813BF88}" dt="2020-01-13T19:11:10.502" v="2" actId="1076"/>
+      <pc:chgData name="Henry Martin" userId="cc6f2d1fd4666abe" providerId="LiveId" clId="{C961C1F1-7D2C-4DE2-A7AF-4CBC6813BF88}" dt="2020-01-18T20:28:20.743" v="108" actId="1076"/>
       <pc:docMkLst>
         <pc:docMk/>
       </pc:docMkLst>
+      <pc:sldChg chg="modSp">
+        <pc:chgData name="Henry Martin" userId="cc6f2d1fd4666abe" providerId="LiveId" clId="{C961C1F1-7D2C-4DE2-A7AF-4CBC6813BF88}" dt="2020-01-18T20:28:20.743" v="108" actId="1076"/>
+        <pc:sldMkLst>
+          <pc:docMk/>
+          <pc:sldMk cId="1177320248" sldId="256"/>
+        </pc:sldMkLst>
+        <pc:spChg chg="mod">
+          <ac:chgData name="Henry Martin" userId="cc6f2d1fd4666abe" providerId="LiveId" clId="{C961C1F1-7D2C-4DE2-A7AF-4CBC6813BF88}" dt="2020-01-18T20:28:10.843" v="106" actId="1038"/>
+          <ac:spMkLst>
+            <pc:docMk/>
+            <pc:sldMk cId="1177320248" sldId="256"/>
+            <ac:spMk id="15" creationId="{6787F51F-4E7D-4EA0-93EA-F42B6594CBAB}"/>
+          </ac:spMkLst>
+        </pc:spChg>
+        <pc:spChg chg="mod">
+          <ac:chgData name="Henry Martin" userId="cc6f2d1fd4666abe" providerId="LiveId" clId="{C961C1F1-7D2C-4DE2-A7AF-4CBC6813BF88}" dt="2020-01-18T20:28:01.310" v="79" actId="12788"/>
+          <ac:spMkLst>
+            <pc:docMk/>
+            <pc:sldMk cId="1177320248" sldId="256"/>
+            <ac:spMk id="21" creationId="{7FA098DC-6833-4D49-9AB0-C6A3F115AC7A}"/>
+          </ac:spMkLst>
+        </pc:spChg>
+        <pc:spChg chg="mod">
+          <ac:chgData name="Henry Martin" userId="cc6f2d1fd4666abe" providerId="LiveId" clId="{C961C1F1-7D2C-4DE2-A7AF-4CBC6813BF88}" dt="2020-01-18T20:28:10.843" v="106" actId="1038"/>
+          <ac:spMkLst>
+            <pc:docMk/>
+            <pc:sldMk cId="1177320248" sldId="256"/>
+            <ac:spMk id="23" creationId="{D12ECB96-8C63-4BB9-BC74-DF3D3D816BA3}"/>
+          </ac:spMkLst>
+        </pc:spChg>
+        <pc:spChg chg="mod">
+          <ac:chgData name="Henry Martin" userId="cc6f2d1fd4666abe" providerId="LiveId" clId="{C961C1F1-7D2C-4DE2-A7AF-4CBC6813BF88}" dt="2020-01-18T20:28:10.843" v="106" actId="1038"/>
+          <ac:spMkLst>
+            <pc:docMk/>
+            <pc:sldMk cId="1177320248" sldId="256"/>
+            <ac:spMk id="27" creationId="{53ED714E-D598-41DA-83DC-6CA6839E7EF8}"/>
+          </ac:spMkLst>
+        </pc:spChg>
+        <pc:spChg chg="mod">
+          <ac:chgData name="Henry Martin" userId="cc6f2d1fd4666abe" providerId="LiveId" clId="{C961C1F1-7D2C-4DE2-A7AF-4CBC6813BF88}" dt="2020-01-18T20:28:01.310" v="79" actId="12788"/>
+          <ac:spMkLst>
+            <pc:docMk/>
+            <pc:sldMk cId="1177320248" sldId="256"/>
+            <ac:spMk id="28" creationId="{EBB4DC02-D5B8-4102-90F4-EBE8612F6CAE}"/>
+          </ac:spMkLst>
+        </pc:spChg>
+        <pc:spChg chg="mod">
+          <ac:chgData name="Henry Martin" userId="cc6f2d1fd4666abe" providerId="LiveId" clId="{C961C1F1-7D2C-4DE2-A7AF-4CBC6813BF88}" dt="2020-01-18T20:28:10.843" v="106" actId="1038"/>
+          <ac:spMkLst>
+            <pc:docMk/>
+            <pc:sldMk cId="1177320248" sldId="256"/>
+            <ac:spMk id="29" creationId="{E7A7932C-FBC4-4509-8A68-0CD740C5462B}"/>
+          </ac:spMkLst>
+        </pc:spChg>
+        <pc:spChg chg="mod">
+          <ac:chgData name="Henry Martin" userId="cc6f2d1fd4666abe" providerId="LiveId" clId="{C961C1F1-7D2C-4DE2-A7AF-4CBC6813BF88}" dt="2020-01-18T20:28:01.310" v="79" actId="12788"/>
+          <ac:spMkLst>
+            <pc:docMk/>
+            <pc:sldMk cId="1177320248" sldId="256"/>
+            <ac:spMk id="32" creationId="{70C31499-80AA-45DF-B4FF-65AE32CBFEEA}"/>
+          </ac:spMkLst>
+        </pc:spChg>
+        <pc:spChg chg="mod">
+          <ac:chgData name="Henry Martin" userId="cc6f2d1fd4666abe" providerId="LiveId" clId="{C961C1F1-7D2C-4DE2-A7AF-4CBC6813BF88}" dt="2020-01-18T20:28:14.348" v="107" actId="1076"/>
+          <ac:spMkLst>
+            <pc:docMk/>
+            <pc:sldMk cId="1177320248" sldId="256"/>
+            <ac:spMk id="33" creationId="{54F1970B-A5F2-48F3-A232-D13D1406F43F}"/>
+          </ac:spMkLst>
+        </pc:spChg>
+        <pc:spChg chg="mod">
+          <ac:chgData name="Henry Martin" userId="cc6f2d1fd4666abe" providerId="LiveId" clId="{C961C1F1-7D2C-4DE2-A7AF-4CBC6813BF88}" dt="2020-01-18T20:28:20.743" v="108" actId="1076"/>
+          <ac:spMkLst>
+            <pc:docMk/>
+            <pc:sldMk cId="1177320248" sldId="256"/>
+            <ac:spMk id="38" creationId="{F4517626-A95E-4E71-8F75-C3A67E9E71DF}"/>
+          </ac:spMkLst>
+        </pc:spChg>
+        <pc:spChg chg="mod">
+          <ac:chgData name="Henry Martin" userId="cc6f2d1fd4666abe" providerId="LiveId" clId="{C961C1F1-7D2C-4DE2-A7AF-4CBC6813BF88}" dt="2020-01-18T20:28:20.743" v="108" actId="1076"/>
+          <ac:spMkLst>
+            <pc:docMk/>
+            <pc:sldMk cId="1177320248" sldId="256"/>
+            <ac:spMk id="39" creationId="{E2931C0D-FCCA-44A1-AB07-AD920A303461}"/>
+          </ac:spMkLst>
+        </pc:spChg>
+        <pc:spChg chg="mod">
+          <ac:chgData name="Henry Martin" userId="cc6f2d1fd4666abe" providerId="LiveId" clId="{C961C1F1-7D2C-4DE2-A7AF-4CBC6813BF88}" dt="2020-01-18T20:28:20.743" v="108" actId="1076"/>
+          <ac:spMkLst>
+            <pc:docMk/>
+            <pc:sldMk cId="1177320248" sldId="256"/>
+            <ac:spMk id="40" creationId="{376C799F-74DD-4EBE-ABB5-4E93E4B3EAEE}"/>
+          </ac:spMkLst>
+        </pc:spChg>
+        <pc:spChg chg="mod">
+          <ac:chgData name="Henry Martin" userId="cc6f2d1fd4666abe" providerId="LiveId" clId="{C961C1F1-7D2C-4DE2-A7AF-4CBC6813BF88}" dt="2020-01-18T20:28:20.743" v="108" actId="1076"/>
+          <ac:spMkLst>
+            <pc:docMk/>
+            <pc:sldMk cId="1177320248" sldId="256"/>
+            <ac:spMk id="41" creationId="{CB98E1ED-3F7A-4649-92E2-4C2EC8E22BFD}"/>
+          </ac:spMkLst>
+        </pc:spChg>
+        <pc:spChg chg="mod">
+          <ac:chgData name="Henry Martin" userId="cc6f2d1fd4666abe" providerId="LiveId" clId="{C961C1F1-7D2C-4DE2-A7AF-4CBC6813BF88}" dt="2020-01-18T20:28:20.743" v="108" actId="1076"/>
+          <ac:spMkLst>
+            <pc:docMk/>
+            <pc:sldMk cId="1177320248" sldId="256"/>
+            <ac:spMk id="42" creationId="{71F5C1D1-15CC-4FFA-8BD6-CC5EAB1EB2DA}"/>
+          </ac:spMkLst>
+        </pc:spChg>
+        <pc:spChg chg="mod">
+          <ac:chgData name="Henry Martin" userId="cc6f2d1fd4666abe" providerId="LiveId" clId="{C961C1F1-7D2C-4DE2-A7AF-4CBC6813BF88}" dt="2020-01-18T20:28:20.743" v="108" actId="1076"/>
+          <ac:spMkLst>
+            <pc:docMk/>
+            <pc:sldMk cId="1177320248" sldId="256"/>
+            <ac:spMk id="43" creationId="{3D438139-2456-494D-88A4-1171BC6F495E}"/>
+          </ac:spMkLst>
+        </pc:spChg>
+        <pc:spChg chg="mod">
+          <ac:chgData name="Henry Martin" userId="cc6f2d1fd4666abe" providerId="LiveId" clId="{C961C1F1-7D2C-4DE2-A7AF-4CBC6813BF88}" dt="2020-01-18T20:27:38.685" v="20" actId="1037"/>
+          <ac:spMkLst>
+            <pc:docMk/>
+            <pc:sldMk cId="1177320248" sldId="256"/>
+            <ac:spMk id="45" creationId="{2051397D-EB90-423D-B820-AF6FDBE2CD7E}"/>
+          </ac:spMkLst>
+        </pc:spChg>
+        <pc:spChg chg="mod">
+          <ac:chgData name="Henry Martin" userId="cc6f2d1fd4666abe" providerId="LiveId" clId="{C961C1F1-7D2C-4DE2-A7AF-4CBC6813BF88}" dt="2020-01-18T20:27:41.523" v="35" actId="1037"/>
+          <ac:spMkLst>
+            <pc:docMk/>
+            <pc:sldMk cId="1177320248" sldId="256"/>
+            <ac:spMk id="46" creationId="{39BAD6E2-39B6-4F1D-BE5C-C599C320734D}"/>
+          </ac:spMkLst>
+        </pc:spChg>
+        <pc:spChg chg="mod">
+          <ac:chgData name="Henry Martin" userId="cc6f2d1fd4666abe" providerId="LiveId" clId="{C961C1F1-7D2C-4DE2-A7AF-4CBC6813BF88}" dt="2020-01-18T20:28:20.743" v="108" actId="1076"/>
+          <ac:spMkLst>
+            <pc:docMk/>
+            <pc:sldMk cId="1177320248" sldId="256"/>
+            <ac:spMk id="47" creationId="{04E8ADD8-62C2-43DF-86B6-B68E5FCE009D}"/>
+          </ac:spMkLst>
+        </pc:spChg>
+        <pc:spChg chg="mod">
+          <ac:chgData name="Henry Martin" userId="cc6f2d1fd4666abe" providerId="LiveId" clId="{C961C1F1-7D2C-4DE2-A7AF-4CBC6813BF88}" dt="2020-01-18T20:28:20.743" v="108" actId="1076"/>
+          <ac:spMkLst>
+            <pc:docMk/>
+            <pc:sldMk cId="1177320248" sldId="256"/>
+            <ac:spMk id="48" creationId="{E0156F9F-5DB5-4A6F-9230-76E2591E3146}"/>
+          </ac:spMkLst>
+        </pc:spChg>
+      </pc:sldChg>
       <pc:sldChg chg="addSp modSp">
         <pc:chgData name="Henry Martin" userId="cc6f2d1fd4666abe" providerId="LiveId" clId="{C961C1F1-7D2C-4DE2-A7AF-4CBC6813BF88}" dt="2020-01-13T19:11:10.502" v="2" actId="1076"/>
         <pc:sldMkLst>
@@ -1470,7 +1620,7 @@
           <a:p>
             <a:fld id="{78E62E1B-6FCD-4114-81BA-4B1FF6A70EA5}" type="datetimeFigureOut">
               <a:rPr lang="en-CH" smtClean="0"/>
-              <a:t>14/01/2020</a:t>
+              <a:t>18/01/2020</a:t>
             </a:fld>
             <a:endParaRPr lang="en-CH"/>
           </a:p>
@@ -1670,7 +1820,7 @@
           <a:p>
             <a:fld id="{78E62E1B-6FCD-4114-81BA-4B1FF6A70EA5}" type="datetimeFigureOut">
               <a:rPr lang="en-CH" smtClean="0"/>
-              <a:t>14/01/2020</a:t>
+              <a:t>18/01/2020</a:t>
             </a:fld>
             <a:endParaRPr lang="en-CH"/>
           </a:p>
@@ -1880,7 +2030,7 @@
           <a:p>
             <a:fld id="{78E62E1B-6FCD-4114-81BA-4B1FF6A70EA5}" type="datetimeFigureOut">
               <a:rPr lang="en-CH" smtClean="0"/>
-              <a:t>14/01/2020</a:t>
+              <a:t>18/01/2020</a:t>
             </a:fld>
             <a:endParaRPr lang="en-CH"/>
           </a:p>
@@ -2080,7 +2230,7 @@
           <a:p>
             <a:fld id="{78E62E1B-6FCD-4114-81BA-4B1FF6A70EA5}" type="datetimeFigureOut">
               <a:rPr lang="en-CH" smtClean="0"/>
-              <a:t>14/01/2020</a:t>
+              <a:t>18/01/2020</a:t>
             </a:fld>
             <a:endParaRPr lang="en-CH"/>
           </a:p>
@@ -2356,7 +2506,7 @@
           <a:p>
             <a:fld id="{78E62E1B-6FCD-4114-81BA-4B1FF6A70EA5}" type="datetimeFigureOut">
               <a:rPr lang="en-CH" smtClean="0"/>
-              <a:t>14/01/2020</a:t>
+              <a:t>18/01/2020</a:t>
             </a:fld>
             <a:endParaRPr lang="en-CH"/>
           </a:p>
@@ -2624,7 +2774,7 @@
           <a:p>
             <a:fld id="{78E62E1B-6FCD-4114-81BA-4B1FF6A70EA5}" type="datetimeFigureOut">
               <a:rPr lang="en-CH" smtClean="0"/>
-              <a:t>14/01/2020</a:t>
+              <a:t>18/01/2020</a:t>
             </a:fld>
             <a:endParaRPr lang="en-CH"/>
           </a:p>
@@ -3039,7 +3189,7 @@
           <a:p>
             <a:fld id="{78E62E1B-6FCD-4114-81BA-4B1FF6A70EA5}" type="datetimeFigureOut">
               <a:rPr lang="en-CH" smtClean="0"/>
-              <a:t>14/01/2020</a:t>
+              <a:t>18/01/2020</a:t>
             </a:fld>
             <a:endParaRPr lang="en-CH"/>
           </a:p>
@@ -3181,7 +3331,7 @@
           <a:p>
             <a:fld id="{78E62E1B-6FCD-4114-81BA-4B1FF6A70EA5}" type="datetimeFigureOut">
               <a:rPr lang="en-CH" smtClean="0"/>
-              <a:t>14/01/2020</a:t>
+              <a:t>18/01/2020</a:t>
             </a:fld>
             <a:endParaRPr lang="en-CH"/>
           </a:p>
@@ -3294,7 +3444,7 @@
           <a:p>
             <a:fld id="{78E62E1B-6FCD-4114-81BA-4B1FF6A70EA5}" type="datetimeFigureOut">
               <a:rPr lang="en-CH" smtClean="0"/>
-              <a:t>14/01/2020</a:t>
+              <a:t>18/01/2020</a:t>
             </a:fld>
             <a:endParaRPr lang="en-CH"/>
           </a:p>
@@ -3607,7 +3757,7 @@
           <a:p>
             <a:fld id="{78E62E1B-6FCD-4114-81BA-4B1FF6A70EA5}" type="datetimeFigureOut">
               <a:rPr lang="en-CH" smtClean="0"/>
-              <a:t>14/01/2020</a:t>
+              <a:t>18/01/2020</a:t>
             </a:fld>
             <a:endParaRPr lang="en-CH"/>
           </a:p>
@@ -3896,7 +4046,7 @@
           <a:p>
             <a:fld id="{78E62E1B-6FCD-4114-81BA-4B1FF6A70EA5}" type="datetimeFigureOut">
               <a:rPr lang="en-CH" smtClean="0"/>
-              <a:t>14/01/2020</a:t>
+              <a:t>18/01/2020</a:t>
             </a:fld>
             <a:endParaRPr lang="en-CH"/>
           </a:p>
@@ -4139,7 +4289,7 @@
           <a:p>
             <a:fld id="{78E62E1B-6FCD-4114-81BA-4B1FF6A70EA5}" type="datetimeFigureOut">
               <a:rPr lang="en-CH" smtClean="0"/>
-              <a:t>14/01/2020</a:t>
+              <a:t>18/01/2020</a:t>
             </a:fld>
             <a:endParaRPr lang="en-CH"/>
           </a:p>
@@ -4830,7 +4980,7 @@
         </p:nvSpPr>
         <p:spPr>
           <a:xfrm rot="16200000">
-            <a:off x="4735763" y="4512083"/>
+            <a:off x="5102905" y="4512083"/>
             <a:ext cx="270043" cy="259058"/>
           </a:xfrm>
           <a:prstGeom prst="rightArrow">
@@ -4993,7 +5143,7 @@
         </p:nvSpPr>
         <p:spPr>
           <a:xfrm>
-            <a:off x="4870784" y="3140675"/>
+            <a:off x="5237926" y="3140675"/>
             <a:ext cx="288000" cy="1080000"/>
           </a:xfrm>
           <a:prstGeom prst="rect">
@@ -5197,7 +5347,7 @@
         </p:nvSpPr>
         <p:spPr>
           <a:xfrm>
-            <a:off x="4582784" y="5057463"/>
+            <a:off x="4949926" y="5057463"/>
             <a:ext cx="576000" cy="720000"/>
           </a:xfrm>
           <a:prstGeom prst="rect">
@@ -5248,7 +5398,7 @@
         </p:nvSpPr>
         <p:spPr>
           <a:xfrm>
-            <a:off x="3636009" y="5334913"/>
+            <a:off x="3898295" y="5334913"/>
             <a:ext cx="654050" cy="165100"/>
           </a:xfrm>
           <a:prstGeom prst="rightArrow">
@@ -5299,7 +5449,7 @@
         </p:nvSpPr>
         <p:spPr>
           <a:xfrm>
-            <a:off x="4582784" y="3140675"/>
+            <a:off x="4949926" y="3140675"/>
             <a:ext cx="288000" cy="1080000"/>
           </a:xfrm>
           <a:prstGeom prst="rect">
@@ -5416,7 +5566,7 @@
         </p:nvSpPr>
         <p:spPr>
           <a:xfrm>
-            <a:off x="3580971" y="3599367"/>
+            <a:off x="3898295" y="3599367"/>
             <a:ext cx="654050" cy="165100"/>
           </a:xfrm>
           <a:prstGeom prst="rightArrow">
@@ -5472,7 +5622,7 @@
         </p:nvSpPr>
         <p:spPr>
           <a:xfrm>
-            <a:off x="5511800" y="3598125"/>
+            <a:off x="5677069" y="3598125"/>
             <a:ext cx="654050" cy="165100"/>
           </a:xfrm>
           <a:prstGeom prst="rightArrow">
@@ -5742,7 +5892,7 @@
         </p:nvSpPr>
         <p:spPr>
           <a:xfrm>
-            <a:off x="7991442" y="5057463"/>
+            <a:off x="6239797" y="5050006"/>
             <a:ext cx="654050" cy="165100"/>
           </a:xfrm>
           <a:prstGeom prst="rightArrow">
@@ -5793,8 +5943,8 @@
         </p:nvSpPr>
         <p:spPr>
           <a:xfrm>
-            <a:off x="8916892" y="4955347"/>
-            <a:ext cx="2613344" cy="369332"/>
+            <a:off x="7165247" y="4947890"/>
+            <a:ext cx="1920910" cy="369332"/>
           </a:xfrm>
           <a:prstGeom prst="rect">
             <a:avLst/>
@@ -5809,7 +5959,7 @@
           <a:p>
             <a:r>
               <a:rPr lang="en-US" dirty="0"/>
-              <a:t>GCN (double convolution)</a:t>
+              <a:t>Graph convolution</a:t>
             </a:r>
             <a:endParaRPr lang="en-CH" dirty="0"/>
           </a:p>
@@ -5829,7 +5979,7 @@
         </p:nvSpPr>
         <p:spPr>
           <a:xfrm rot="5400000">
-            <a:off x="8183446" y="5496829"/>
+            <a:off x="6431801" y="5489372"/>
             <a:ext cx="270043" cy="259058"/>
           </a:xfrm>
           <a:prstGeom prst="rightArrow">
@@ -5885,7 +6035,7 @@
         </p:nvSpPr>
         <p:spPr>
           <a:xfrm>
-            <a:off x="8916892" y="5417463"/>
+            <a:off x="7165247" y="5410006"/>
             <a:ext cx="886781" cy="369332"/>
           </a:xfrm>
           <a:prstGeom prst="rect">
@@ -5921,7 +6071,7 @@
         </p:nvSpPr>
         <p:spPr>
           <a:xfrm rot="16200000">
-            <a:off x="8183446" y="6035646"/>
+            <a:off x="6431801" y="6028189"/>
             <a:ext cx="270043" cy="259058"/>
           </a:xfrm>
           <a:prstGeom prst="rightArrow">
@@ -5977,7 +6127,7 @@
         </p:nvSpPr>
         <p:spPr>
           <a:xfrm>
-            <a:off x="8935449" y="5930865"/>
+            <a:off x="7183804" y="5923408"/>
             <a:ext cx="1130438" cy="369332"/>
           </a:xfrm>
           <a:prstGeom prst="rect">
@@ -6013,7 +6163,7 @@
         </p:nvSpPr>
         <p:spPr>
           <a:xfrm>
-            <a:off x="7236121" y="1244351"/>
+            <a:off x="7076796" y="1244351"/>
             <a:ext cx="654050" cy="165100"/>
           </a:xfrm>
           <a:prstGeom prst="rightArrow">
@@ -6064,7 +6214,7 @@
         </p:nvSpPr>
         <p:spPr>
           <a:xfrm>
-            <a:off x="8188938" y="606901"/>
+            <a:off x="7974192" y="606901"/>
             <a:ext cx="72000" cy="1440000"/>
           </a:xfrm>
           <a:prstGeom prst="rect">
@@ -6115,7 +6265,7 @@
         </p:nvSpPr>
         <p:spPr>
           <a:xfrm>
-            <a:off x="7978806" y="4670966"/>
+            <a:off x="6227161" y="4663509"/>
             <a:ext cx="654050" cy="165100"/>
           </a:xfrm>
           <a:prstGeom prst="rightArrow">
@@ -6171,7 +6321,7 @@
         </p:nvSpPr>
         <p:spPr>
           <a:xfrm>
-            <a:off x="8904256" y="4568850"/>
+            <a:off x="7152611" y="4561393"/>
             <a:ext cx="1670329" cy="369332"/>
           </a:xfrm>
           <a:prstGeom prst="rect">

</xml_diff>

<commit_message>
clean up and readme
</commit_message>
<xml_diff>
--- a/models/diffpool_unet_architecture.pptx
+++ b/models/diffpool_unet_architecture.pptx
@@ -6,8 +6,6 @@
   </p:sldMasterIdLst>
   <p:sldIdLst>
     <p:sldId id="256" r:id="rId2"/>
-    <p:sldId id="257" r:id="rId3"/>
-    <p:sldId id="258" r:id="rId4"/>
   </p:sldIdLst>
   <p:sldSz cx="12192000" cy="6858000"/>
   <p:notesSz cx="6858000" cy="9144000"/>
@@ -114,6 +112,11 @@
             <a:srgbClr val="A4A3A4"/>
           </p15:clr>
         </p15:guide>
+        <p15:guide id="3" orient="horz" pos="2160">
+          <p15:clr>
+            <a:srgbClr val="A4A3A4"/>
+          </p15:clr>
+        </p15:guide>
       </p15:sldGuideLst>
     </p:ext>
   </p:extLst>
@@ -132,8 +135,8 @@
 <pc:chgInfo xmlns:a="http://schemas.openxmlformats.org/drawingml/2006/main" xmlns:r="http://schemas.openxmlformats.org/officeDocument/2006/relationships" xmlns:ac="http://schemas.microsoft.com/office/drawing/2013/main/command" xmlns:pc="http://schemas.microsoft.com/office/powerpoint/2013/main/command">
   <pc:docChgLst>
     <pc:chgData name="Henry Martin" userId="cc6f2d1fd4666abe" providerId="LiveId" clId="{C961C1F1-7D2C-4DE2-A7AF-4CBC6813BF88}"/>
-    <pc:docChg chg="undo custSel addSld modSld modMainMaster">
-      <pc:chgData name="Henry Martin" userId="cc6f2d1fd4666abe" providerId="LiveId" clId="{C961C1F1-7D2C-4DE2-A7AF-4CBC6813BF88}" dt="2020-01-18T20:54:11.600" v="345" actId="164"/>
+    <pc:docChg chg="undo custSel addSld delSld modSld modMainMaster">
+      <pc:chgData name="Henry Martin" userId="cc6f2d1fd4666abe" providerId="LiveId" clId="{C961C1F1-7D2C-4DE2-A7AF-4CBC6813BF88}" dt="2020-01-18T21:17:15.447" v="346" actId="47"/>
       <pc:docMkLst>
         <pc:docMk/>
       </pc:docMkLst>
@@ -584,8 +587,8 @@
           </ac:grpSpMkLst>
         </pc:grpChg>
       </pc:sldChg>
-      <pc:sldChg chg="addSp modSp">
-        <pc:chgData name="Henry Martin" userId="cc6f2d1fd4666abe" providerId="LiveId" clId="{C961C1F1-7D2C-4DE2-A7AF-4CBC6813BF88}" dt="2020-01-18T20:48:26.336" v="339"/>
+      <pc:sldChg chg="addSp modSp del">
+        <pc:chgData name="Henry Martin" userId="cc6f2d1fd4666abe" providerId="LiveId" clId="{C961C1F1-7D2C-4DE2-A7AF-4CBC6813BF88}" dt="2020-01-18T21:17:15.447" v="346" actId="47"/>
         <pc:sldMkLst>
           <pc:docMk/>
           <pc:sldMk cId="2084767380" sldId="257"/>
@@ -1047,8 +1050,8 @@
           </ac:grpSpMkLst>
         </pc:grpChg>
       </pc:sldChg>
-      <pc:sldChg chg="add">
-        <pc:chgData name="Henry Martin" userId="cc6f2d1fd4666abe" providerId="LiveId" clId="{C961C1F1-7D2C-4DE2-A7AF-4CBC6813BF88}" dt="2020-01-13T19:11:00.070" v="0"/>
+      <pc:sldChg chg="add del">
+        <pc:chgData name="Henry Martin" userId="cc6f2d1fd4666abe" providerId="LiveId" clId="{C961C1F1-7D2C-4DE2-A7AF-4CBC6813BF88}" dt="2020-01-18T21:17:15.447" v="346" actId="47"/>
         <pc:sldMkLst>
           <pc:docMk/>
           <pc:sldMk cId="469849756" sldId="258"/>
@@ -7947,3058 +7950,6 @@
 </p:sld>
 </file>
 
-<file path=ppt/slides/slide2.xml><?xml version="1.0" encoding="utf-8"?>
-<p:sld xmlns:a="http://schemas.openxmlformats.org/drawingml/2006/main" xmlns:r="http://schemas.openxmlformats.org/officeDocument/2006/relationships" xmlns:p="http://schemas.openxmlformats.org/presentationml/2006/main">
-  <p:cSld>
-    <p:spTree>
-      <p:nvGrpSpPr>
-        <p:cNvPr id="1" name=""/>
-        <p:cNvGrpSpPr/>
-        <p:nvPr/>
-      </p:nvGrpSpPr>
-      <p:grpSpPr>
-        <a:xfrm>
-          <a:off x="0" y="0"/>
-          <a:ext cx="0" cy="0"/>
-          <a:chOff x="0" y="0"/>
-          <a:chExt cx="0" cy="0"/>
-        </a:xfrm>
-      </p:grpSpPr>
-      <p:sp>
-        <p:nvSpPr>
-          <p:cNvPr id="4" name="Rectangle 3">
-            <a:extLst>
-              <a:ext uri="{FF2B5EF4-FFF2-40B4-BE49-F238E27FC236}">
-                <a16:creationId xmlns:a16="http://schemas.microsoft.com/office/drawing/2014/main" id="{339F9F6B-CD18-44DE-A7ED-E4D7F329C137}"/>
-              </a:ext>
-            </a:extLst>
-          </p:cNvPr>
-          <p:cNvSpPr/>
-          <p:nvPr/>
-        </p:nvSpPr>
-        <p:spPr>
-          <a:xfrm>
-            <a:off x="906308" y="565626"/>
-            <a:ext cx="72000" cy="1440000"/>
-          </a:xfrm>
-          <a:prstGeom prst="rect">
-            <a:avLst/>
-          </a:prstGeom>
-          <a:ln>
-            <a:solidFill>
-              <a:schemeClr val="tx1"/>
-            </a:solidFill>
-          </a:ln>
-        </p:spPr>
-        <p:style>
-          <a:lnRef idx="2">
-            <a:schemeClr val="accent1">
-              <a:shade val="50000"/>
-            </a:schemeClr>
-          </a:lnRef>
-          <a:fillRef idx="1">
-            <a:schemeClr val="accent1"/>
-          </a:fillRef>
-          <a:effectRef idx="0">
-            <a:schemeClr val="accent1"/>
-          </a:effectRef>
-          <a:fontRef idx="minor">
-            <a:schemeClr val="lt1"/>
-          </a:fontRef>
-        </p:style>
-        <p:txBody>
-          <a:bodyPr rtlCol="0" anchor="ctr"/>
-          <a:lstStyle/>
-          <a:p>
-            <a:pPr algn="ctr"/>
-            <a:endParaRPr lang="en-CH" sz="1801"/>
-          </a:p>
-        </p:txBody>
-      </p:sp>
-      <p:sp>
-        <p:nvSpPr>
-          <p:cNvPr id="21" name="Arrow: Right 20">
-            <a:extLst>
-              <a:ext uri="{FF2B5EF4-FFF2-40B4-BE49-F238E27FC236}">
-                <a16:creationId xmlns:a16="http://schemas.microsoft.com/office/drawing/2014/main" id="{7FA098DC-6833-4D49-9AB0-C6A3F115AC7A}"/>
-              </a:ext>
-            </a:extLst>
-          </p:cNvPr>
-          <p:cNvSpPr/>
-          <p:nvPr/>
-        </p:nvSpPr>
-        <p:spPr>
-          <a:xfrm>
-            <a:off x="4418443" y="1174587"/>
-            <a:ext cx="3153646" cy="222082"/>
-          </a:xfrm>
-          <a:prstGeom prst="rightArrow">
-            <a:avLst/>
-          </a:prstGeom>
-          <a:solidFill>
-            <a:schemeClr val="bg1">
-              <a:lumMod val="50000"/>
-            </a:schemeClr>
-          </a:solidFill>
-          <a:ln>
-            <a:solidFill>
-              <a:schemeClr val="tx1"/>
-            </a:solidFill>
-          </a:ln>
-        </p:spPr>
-        <p:style>
-          <a:lnRef idx="2">
-            <a:schemeClr val="accent1">
-              <a:shade val="50000"/>
-            </a:schemeClr>
-          </a:lnRef>
-          <a:fillRef idx="1">
-            <a:schemeClr val="accent1"/>
-          </a:fillRef>
-          <a:effectRef idx="0">
-            <a:schemeClr val="accent1"/>
-          </a:effectRef>
-          <a:fontRef idx="minor">
-            <a:schemeClr val="lt1"/>
-          </a:fontRef>
-        </p:style>
-        <p:txBody>
-          <a:bodyPr rtlCol="0" anchor="ctr"/>
-          <a:lstStyle/>
-          <a:p>
-            <a:pPr algn="ctr"/>
-            <a:endParaRPr lang="en-CH" sz="1801"/>
-          </a:p>
-        </p:txBody>
-      </p:sp>
-      <p:grpSp>
-        <p:nvGrpSpPr>
-          <p:cNvPr id="19" name="Group 18">
-            <a:extLst>
-              <a:ext uri="{FF2B5EF4-FFF2-40B4-BE49-F238E27FC236}">
-                <a16:creationId xmlns:a16="http://schemas.microsoft.com/office/drawing/2014/main" id="{C9D5D690-292B-41A9-8D0F-A029DF14A494}"/>
-              </a:ext>
-            </a:extLst>
-          </p:cNvPr>
-          <p:cNvGrpSpPr/>
-          <p:nvPr/>
-        </p:nvGrpSpPr>
-        <p:grpSpPr>
-          <a:xfrm>
-            <a:off x="3209660" y="565627"/>
-            <a:ext cx="259058" cy="3575344"/>
-            <a:chOff x="3377424" y="565626"/>
-            <a:chExt cx="259058" cy="3575344"/>
-          </a:xfrm>
-        </p:grpSpPr>
-        <p:sp>
-          <p:nvSpPr>
-            <p:cNvPr id="5" name="Rectangle 4">
-              <a:extLst>
-                <a:ext uri="{FF2B5EF4-FFF2-40B4-BE49-F238E27FC236}">
-                  <a16:creationId xmlns:a16="http://schemas.microsoft.com/office/drawing/2014/main" id="{04BBD4F2-45A4-479D-ACE4-7368C87A9A41}"/>
-                </a:ext>
-              </a:extLst>
-            </p:cNvPr>
-            <p:cNvSpPr/>
-            <p:nvPr/>
-          </p:nvSpPr>
-          <p:spPr>
-            <a:xfrm>
-              <a:off x="3434952" y="565626"/>
-              <a:ext cx="144000" cy="1440000"/>
-            </a:xfrm>
-            <a:prstGeom prst="rect">
-              <a:avLst/>
-            </a:prstGeom>
-            <a:ln>
-              <a:solidFill>
-                <a:schemeClr val="tx1"/>
-              </a:solidFill>
-            </a:ln>
-          </p:spPr>
-          <p:style>
-            <a:lnRef idx="2">
-              <a:schemeClr val="accent1">
-                <a:shade val="50000"/>
-              </a:schemeClr>
-            </a:lnRef>
-            <a:fillRef idx="1">
-              <a:schemeClr val="accent1"/>
-            </a:fillRef>
-            <a:effectRef idx="0">
-              <a:schemeClr val="accent1"/>
-            </a:effectRef>
-            <a:fontRef idx="minor">
-              <a:schemeClr val="lt1"/>
-            </a:fontRef>
-          </p:style>
-          <p:txBody>
-            <a:bodyPr rtlCol="0" anchor="ctr"/>
-            <a:lstStyle/>
-            <a:p>
-              <a:pPr algn="ctr"/>
-              <a:endParaRPr lang="en-CH" sz="1801"/>
-            </a:p>
-          </p:txBody>
-        </p:sp>
-        <p:sp>
-          <p:nvSpPr>
-            <p:cNvPr id="11" name="Arrow: Right 10">
-              <a:extLst>
-                <a:ext uri="{FF2B5EF4-FFF2-40B4-BE49-F238E27FC236}">
-                  <a16:creationId xmlns:a16="http://schemas.microsoft.com/office/drawing/2014/main" id="{28203AEB-4905-4C25-8693-670EC5394134}"/>
-                </a:ext>
-              </a:extLst>
-            </p:cNvPr>
-            <p:cNvSpPr/>
-            <p:nvPr/>
-          </p:nvSpPr>
-          <p:spPr>
-            <a:xfrm rot="5400000">
-              <a:off x="3371931" y="2414573"/>
-              <a:ext cx="270043" cy="259058"/>
-            </a:xfrm>
-            <a:prstGeom prst="rightArrow">
-              <a:avLst/>
-            </a:prstGeom>
-            <a:solidFill>
-              <a:schemeClr val="accent2">
-                <a:lumMod val="75000"/>
-              </a:schemeClr>
-            </a:solidFill>
-            <a:ln>
-              <a:solidFill>
-                <a:schemeClr val="tx1"/>
-              </a:solidFill>
-            </a:ln>
-          </p:spPr>
-          <p:style>
-            <a:lnRef idx="2">
-              <a:schemeClr val="accent1">
-                <a:shade val="50000"/>
-              </a:schemeClr>
-            </a:lnRef>
-            <a:fillRef idx="1">
-              <a:schemeClr val="accent1"/>
-            </a:fillRef>
-            <a:effectRef idx="0">
-              <a:schemeClr val="accent1"/>
-            </a:effectRef>
-            <a:fontRef idx="minor">
-              <a:schemeClr val="lt1"/>
-            </a:fontRef>
-          </p:style>
-          <p:txBody>
-            <a:bodyPr rtlCol="0" anchor="ctr"/>
-            <a:lstStyle/>
-            <a:p>
-              <a:pPr algn="ctr"/>
-              <a:endParaRPr lang="en-CH" sz="1801"/>
-            </a:p>
-          </p:txBody>
-        </p:sp>
-        <p:sp>
-          <p:nvSpPr>
-            <p:cNvPr id="24" name="Rectangle 23">
-              <a:extLst>
-                <a:ext uri="{FF2B5EF4-FFF2-40B4-BE49-F238E27FC236}">
-                  <a16:creationId xmlns:a16="http://schemas.microsoft.com/office/drawing/2014/main" id="{B4878A14-80F5-435D-960E-8A4CC6443D31}"/>
-                </a:ext>
-              </a:extLst>
-            </p:cNvPr>
-            <p:cNvSpPr/>
-            <p:nvPr/>
-          </p:nvSpPr>
-          <p:spPr>
-            <a:xfrm>
-              <a:off x="3434952" y="3060970"/>
-              <a:ext cx="144000" cy="1080000"/>
-            </a:xfrm>
-            <a:prstGeom prst="rect">
-              <a:avLst/>
-            </a:prstGeom>
-            <a:ln>
-              <a:solidFill>
-                <a:schemeClr val="tx1"/>
-              </a:solidFill>
-            </a:ln>
-          </p:spPr>
-          <p:style>
-            <a:lnRef idx="2">
-              <a:schemeClr val="accent1">
-                <a:shade val="50000"/>
-              </a:schemeClr>
-            </a:lnRef>
-            <a:fillRef idx="1">
-              <a:schemeClr val="accent1"/>
-            </a:fillRef>
-            <a:effectRef idx="0">
-              <a:schemeClr val="accent1"/>
-            </a:effectRef>
-            <a:fontRef idx="minor">
-              <a:schemeClr val="lt1"/>
-            </a:fontRef>
-          </p:style>
-          <p:txBody>
-            <a:bodyPr rtlCol="0" anchor="ctr"/>
-            <a:lstStyle/>
-            <a:p>
-              <a:pPr algn="ctr"/>
-              <a:endParaRPr lang="en-CH" sz="1801"/>
-            </a:p>
-          </p:txBody>
-        </p:sp>
-      </p:grpSp>
-      <p:sp>
-        <p:nvSpPr>
-          <p:cNvPr id="15" name="Arrow: Right 14">
-            <a:extLst>
-              <a:ext uri="{FF2B5EF4-FFF2-40B4-BE49-F238E27FC236}">
-                <a16:creationId xmlns:a16="http://schemas.microsoft.com/office/drawing/2014/main" id="{6787F51F-4E7D-4EA0-93EA-F42B6594CBAB}"/>
-              </a:ext>
-            </a:extLst>
-          </p:cNvPr>
-          <p:cNvSpPr/>
-          <p:nvPr/>
-        </p:nvSpPr>
-        <p:spPr>
-          <a:xfrm rot="16200000">
-            <a:off x="6331471" y="4593146"/>
-            <a:ext cx="270043" cy="259058"/>
-          </a:xfrm>
-          <a:prstGeom prst="rightArrow">
-            <a:avLst/>
-          </a:prstGeom>
-          <a:solidFill>
-            <a:schemeClr val="accent2">
-              <a:lumMod val="75000"/>
-            </a:schemeClr>
-          </a:solidFill>
-          <a:ln>
-            <a:solidFill>
-              <a:schemeClr val="tx1"/>
-            </a:solidFill>
-          </a:ln>
-        </p:spPr>
-        <p:style>
-          <a:lnRef idx="2">
-            <a:schemeClr val="accent1">
-              <a:shade val="50000"/>
-            </a:schemeClr>
-          </a:lnRef>
-          <a:fillRef idx="1">
-            <a:schemeClr val="accent1"/>
-          </a:fillRef>
-          <a:effectRef idx="0">
-            <a:schemeClr val="accent1"/>
-          </a:effectRef>
-          <a:fontRef idx="minor">
-            <a:schemeClr val="lt1"/>
-          </a:fontRef>
-        </p:style>
-        <p:txBody>
-          <a:bodyPr rtlCol="0" anchor="ctr"/>
-          <a:lstStyle/>
-          <a:p>
-            <a:pPr algn="ctr"/>
-            <a:endParaRPr lang="en-CH" sz="1801"/>
-          </a:p>
-        </p:txBody>
-      </p:sp>
-      <p:sp>
-        <p:nvSpPr>
-          <p:cNvPr id="27" name="Rectangle 26">
-            <a:extLst>
-              <a:ext uri="{FF2B5EF4-FFF2-40B4-BE49-F238E27FC236}">
-                <a16:creationId xmlns:a16="http://schemas.microsoft.com/office/drawing/2014/main" id="{53ED714E-D598-41DA-83DC-6CA6839E7EF8}"/>
-              </a:ext>
-            </a:extLst>
-          </p:cNvPr>
-          <p:cNvSpPr/>
-          <p:nvPr/>
-        </p:nvSpPr>
-        <p:spPr>
-          <a:xfrm>
-            <a:off x="6178491" y="5304378"/>
-            <a:ext cx="576000" cy="720000"/>
-          </a:xfrm>
-          <a:prstGeom prst="rect">
-            <a:avLst/>
-          </a:prstGeom>
-          <a:ln>
-            <a:solidFill>
-              <a:schemeClr val="tx1"/>
-            </a:solidFill>
-          </a:ln>
-        </p:spPr>
-        <p:style>
-          <a:lnRef idx="2">
-            <a:schemeClr val="accent1">
-              <a:shade val="50000"/>
-            </a:schemeClr>
-          </a:lnRef>
-          <a:fillRef idx="1">
-            <a:schemeClr val="accent1"/>
-          </a:fillRef>
-          <a:effectRef idx="0">
-            <a:schemeClr val="accent1"/>
-          </a:effectRef>
-          <a:fontRef idx="minor">
-            <a:schemeClr val="lt1"/>
-          </a:fontRef>
-        </p:style>
-        <p:txBody>
-          <a:bodyPr rtlCol="0" anchor="ctr"/>
-          <a:lstStyle/>
-          <a:p>
-            <a:pPr algn="ctr"/>
-            <a:endParaRPr lang="en-CH" sz="1801"/>
-          </a:p>
-        </p:txBody>
-      </p:sp>
-      <p:grpSp>
-        <p:nvGrpSpPr>
-          <p:cNvPr id="18" name="Group 17">
-            <a:extLst>
-              <a:ext uri="{FF2B5EF4-FFF2-40B4-BE49-F238E27FC236}">
-                <a16:creationId xmlns:a16="http://schemas.microsoft.com/office/drawing/2014/main" id="{A7F82C0D-4391-4878-8554-764F6B49E2AD}"/>
-              </a:ext>
-            </a:extLst>
-          </p:cNvPr>
-          <p:cNvGrpSpPr/>
-          <p:nvPr/>
-        </p:nvGrpSpPr>
-        <p:grpSpPr>
-          <a:xfrm>
-            <a:off x="6178491" y="3060970"/>
-            <a:ext cx="576000" cy="1080000"/>
-            <a:chOff x="6183622" y="3140675"/>
-            <a:chExt cx="576000" cy="1080000"/>
-          </a:xfrm>
-        </p:grpSpPr>
-        <p:sp>
-          <p:nvSpPr>
-            <p:cNvPr id="23" name="Rectangle 22">
-              <a:extLst>
-                <a:ext uri="{FF2B5EF4-FFF2-40B4-BE49-F238E27FC236}">
-                  <a16:creationId xmlns:a16="http://schemas.microsoft.com/office/drawing/2014/main" id="{D12ECB96-8C63-4BB9-BC74-DF3D3D816BA3}"/>
-                </a:ext>
-              </a:extLst>
-            </p:cNvPr>
-            <p:cNvSpPr/>
-            <p:nvPr/>
-          </p:nvSpPr>
-          <p:spPr>
-            <a:xfrm>
-              <a:off x="6471622" y="3140675"/>
-              <a:ext cx="288000" cy="1080000"/>
-            </a:xfrm>
-            <a:prstGeom prst="rect">
-              <a:avLst/>
-            </a:prstGeom>
-            <a:ln>
-              <a:solidFill>
-                <a:schemeClr val="tx1"/>
-              </a:solidFill>
-            </a:ln>
-          </p:spPr>
-          <p:style>
-            <a:lnRef idx="2">
-              <a:schemeClr val="accent1">
-                <a:shade val="50000"/>
-              </a:schemeClr>
-            </a:lnRef>
-            <a:fillRef idx="1">
-              <a:schemeClr val="accent1"/>
-            </a:fillRef>
-            <a:effectRef idx="0">
-              <a:schemeClr val="accent1"/>
-            </a:effectRef>
-            <a:fontRef idx="minor">
-              <a:schemeClr val="lt1"/>
-            </a:fontRef>
-          </p:style>
-          <p:txBody>
-            <a:bodyPr rtlCol="0" anchor="ctr"/>
-            <a:lstStyle/>
-            <a:p>
-              <a:pPr algn="ctr"/>
-              <a:endParaRPr lang="en-CH" sz="1801"/>
-            </a:p>
-          </p:txBody>
-        </p:sp>
-        <p:sp>
-          <p:nvSpPr>
-            <p:cNvPr id="29" name="Rectangle 28">
-              <a:extLst>
-                <a:ext uri="{FF2B5EF4-FFF2-40B4-BE49-F238E27FC236}">
-                  <a16:creationId xmlns:a16="http://schemas.microsoft.com/office/drawing/2014/main" id="{E7A7932C-FBC4-4509-8A68-0CD740C5462B}"/>
-                </a:ext>
-              </a:extLst>
-            </p:cNvPr>
-            <p:cNvSpPr/>
-            <p:nvPr/>
-          </p:nvSpPr>
-          <p:spPr>
-            <a:xfrm>
-              <a:off x="6183622" y="3140675"/>
-              <a:ext cx="288000" cy="1080000"/>
-            </a:xfrm>
-            <a:prstGeom prst="rect">
-              <a:avLst/>
-            </a:prstGeom>
-            <a:pattFill prst="wdDnDiag">
-              <a:fgClr>
-                <a:schemeClr val="bg1">
-                  <a:lumMod val="50000"/>
-                </a:schemeClr>
-              </a:fgClr>
-              <a:bgClr>
-                <a:schemeClr val="bg1"/>
-              </a:bgClr>
-            </a:pattFill>
-            <a:ln>
-              <a:solidFill>
-                <a:schemeClr val="tx1"/>
-              </a:solidFill>
-            </a:ln>
-          </p:spPr>
-          <p:style>
-            <a:lnRef idx="2">
-              <a:schemeClr val="accent1">
-                <a:shade val="50000"/>
-              </a:schemeClr>
-            </a:lnRef>
-            <a:fillRef idx="1">
-              <a:schemeClr val="accent1"/>
-            </a:fillRef>
-            <a:effectRef idx="0">
-              <a:schemeClr val="accent1"/>
-            </a:effectRef>
-            <a:fontRef idx="minor">
-              <a:schemeClr val="lt1"/>
-            </a:fontRef>
-          </p:style>
-          <p:txBody>
-            <a:bodyPr rtlCol="0" anchor="ctr"/>
-            <a:lstStyle/>
-            <a:p>
-              <a:pPr algn="ctr"/>
-              <a:endParaRPr lang="en-CH" sz="1801"/>
-            </a:p>
-          </p:txBody>
-        </p:sp>
-      </p:grpSp>
-      <p:sp>
-        <p:nvSpPr>
-          <p:cNvPr id="22" name="Rectangle 21">
-            <a:extLst>
-              <a:ext uri="{FF2B5EF4-FFF2-40B4-BE49-F238E27FC236}">
-                <a16:creationId xmlns:a16="http://schemas.microsoft.com/office/drawing/2014/main" id="{EC46BE0F-692E-43CA-B2E2-72BE7E04859F}"/>
-              </a:ext>
-            </a:extLst>
-          </p:cNvPr>
-          <p:cNvSpPr/>
-          <p:nvPr/>
-        </p:nvSpPr>
-        <p:spPr>
-          <a:xfrm>
-            <a:off x="4653751" y="3060970"/>
-            <a:ext cx="288000" cy="1080000"/>
-          </a:xfrm>
-          <a:prstGeom prst="rect">
-            <a:avLst/>
-          </a:prstGeom>
-          <a:ln>
-            <a:solidFill>
-              <a:schemeClr val="tx1"/>
-            </a:solidFill>
-          </a:ln>
-        </p:spPr>
-        <p:style>
-          <a:lnRef idx="2">
-            <a:schemeClr val="accent1">
-              <a:shade val="50000"/>
-            </a:schemeClr>
-          </a:lnRef>
-          <a:fillRef idx="1">
-            <a:schemeClr val="accent1"/>
-          </a:fillRef>
-          <a:effectRef idx="0">
-            <a:schemeClr val="accent1"/>
-          </a:effectRef>
-          <a:fontRef idx="minor">
-            <a:schemeClr val="lt1"/>
-          </a:fontRef>
-        </p:style>
-        <p:txBody>
-          <a:bodyPr rtlCol="0" anchor="ctr"/>
-          <a:lstStyle/>
-          <a:p>
-            <a:pPr algn="ctr"/>
-            <a:endParaRPr lang="en-CH" sz="1801"/>
-          </a:p>
-        </p:txBody>
-      </p:sp>
-      <p:sp>
-        <p:nvSpPr>
-          <p:cNvPr id="26" name="Rectangle 25">
-            <a:extLst>
-              <a:ext uri="{FF2B5EF4-FFF2-40B4-BE49-F238E27FC236}">
-                <a16:creationId xmlns:a16="http://schemas.microsoft.com/office/drawing/2014/main" id="{CF514824-FFC3-4C87-92CA-D001016625CC}"/>
-              </a:ext>
-            </a:extLst>
-          </p:cNvPr>
-          <p:cNvSpPr/>
-          <p:nvPr/>
-        </p:nvSpPr>
-        <p:spPr>
-          <a:xfrm>
-            <a:off x="4653751" y="5304378"/>
-            <a:ext cx="288000" cy="720000"/>
-          </a:xfrm>
-          <a:prstGeom prst="rect">
-            <a:avLst/>
-          </a:prstGeom>
-          <a:ln>
-            <a:solidFill>
-              <a:schemeClr val="tx1"/>
-            </a:solidFill>
-          </a:ln>
-        </p:spPr>
-        <p:style>
-          <a:lnRef idx="2">
-            <a:schemeClr val="accent1">
-              <a:shade val="50000"/>
-            </a:schemeClr>
-          </a:lnRef>
-          <a:fillRef idx="1">
-            <a:schemeClr val="accent1"/>
-          </a:fillRef>
-          <a:effectRef idx="0">
-            <a:schemeClr val="accent1"/>
-          </a:effectRef>
-          <a:fontRef idx="minor">
-            <a:schemeClr val="lt1"/>
-          </a:fontRef>
-        </p:style>
-        <p:txBody>
-          <a:bodyPr rtlCol="0" anchor="ctr"/>
-          <a:lstStyle/>
-          <a:p>
-            <a:pPr algn="ctr"/>
-            <a:endParaRPr lang="en-CH" sz="1801"/>
-          </a:p>
-        </p:txBody>
-      </p:sp>
-      <p:sp>
-        <p:nvSpPr>
-          <p:cNvPr id="31" name="Arrow: Right 30">
-            <a:extLst>
-              <a:ext uri="{FF2B5EF4-FFF2-40B4-BE49-F238E27FC236}">
-                <a16:creationId xmlns:a16="http://schemas.microsoft.com/office/drawing/2014/main" id="{D603045E-270D-4E50-96FF-6B69D6C9E032}"/>
-              </a:ext>
-            </a:extLst>
-          </p:cNvPr>
-          <p:cNvSpPr/>
-          <p:nvPr/>
-        </p:nvSpPr>
-        <p:spPr>
-          <a:xfrm rot="5400000">
-            <a:off x="4662731" y="4593146"/>
-            <a:ext cx="270043" cy="259058"/>
-          </a:xfrm>
-          <a:prstGeom prst="rightArrow">
-            <a:avLst/>
-          </a:prstGeom>
-          <a:solidFill>
-            <a:schemeClr val="accent2">
-              <a:lumMod val="75000"/>
-            </a:schemeClr>
-          </a:solidFill>
-          <a:ln>
-            <a:solidFill>
-              <a:schemeClr val="tx1"/>
-            </a:solidFill>
-          </a:ln>
-        </p:spPr>
-        <p:style>
-          <a:lnRef idx="2">
-            <a:schemeClr val="accent1">
-              <a:shade val="50000"/>
-            </a:schemeClr>
-          </a:lnRef>
-          <a:fillRef idx="1">
-            <a:schemeClr val="accent1"/>
-          </a:fillRef>
-          <a:effectRef idx="0">
-            <a:schemeClr val="accent1"/>
-          </a:effectRef>
-          <a:fontRef idx="minor">
-            <a:schemeClr val="lt1"/>
-          </a:fontRef>
-        </p:style>
-        <p:txBody>
-          <a:bodyPr rtlCol="0" anchor="ctr"/>
-          <a:lstStyle/>
-          <a:p>
-            <a:pPr algn="ctr"/>
-            <a:endParaRPr lang="en-CH" sz="1801"/>
-          </a:p>
-        </p:txBody>
-      </p:sp>
-      <p:sp>
-        <p:nvSpPr>
-          <p:cNvPr id="32" name="Arrow: Right 31">
-            <a:extLst>
-              <a:ext uri="{FF2B5EF4-FFF2-40B4-BE49-F238E27FC236}">
-                <a16:creationId xmlns:a16="http://schemas.microsoft.com/office/drawing/2014/main" id="{70C31499-80AA-45DF-B4FF-65AE32CBFEEA}"/>
-              </a:ext>
-            </a:extLst>
-          </p:cNvPr>
-          <p:cNvSpPr/>
-          <p:nvPr/>
-        </p:nvSpPr>
-        <p:spPr>
-          <a:xfrm>
-            <a:off x="5147306" y="3518422"/>
-            <a:ext cx="654050" cy="165100"/>
-          </a:xfrm>
-          <a:prstGeom prst="rightArrow">
-            <a:avLst/>
-          </a:prstGeom>
-          <a:solidFill>
-            <a:schemeClr val="bg1">
-              <a:lumMod val="50000"/>
-            </a:schemeClr>
-          </a:solidFill>
-          <a:ln>
-            <a:solidFill>
-              <a:schemeClr val="tx1"/>
-            </a:solidFill>
-          </a:ln>
-        </p:spPr>
-        <p:style>
-          <a:lnRef idx="2">
-            <a:schemeClr val="accent1">
-              <a:shade val="50000"/>
-            </a:schemeClr>
-          </a:lnRef>
-          <a:fillRef idx="1">
-            <a:schemeClr val="accent1"/>
-          </a:fillRef>
-          <a:effectRef idx="0">
-            <a:schemeClr val="accent1"/>
-          </a:effectRef>
-          <a:fontRef idx="minor">
-            <a:schemeClr val="lt1"/>
-          </a:fontRef>
-        </p:style>
-        <p:txBody>
-          <a:bodyPr rtlCol="0" anchor="ctr"/>
-          <a:lstStyle/>
-          <a:p>
-            <a:pPr algn="ctr"/>
-            <a:endParaRPr lang="en-CH" sz="1801"/>
-          </a:p>
-        </p:txBody>
-      </p:sp>
-      <p:grpSp>
-        <p:nvGrpSpPr>
-          <p:cNvPr id="20" name="Group 19">
-            <a:extLst>
-              <a:ext uri="{FF2B5EF4-FFF2-40B4-BE49-F238E27FC236}">
-                <a16:creationId xmlns:a16="http://schemas.microsoft.com/office/drawing/2014/main" id="{73760071-A232-4BC7-AEDB-241D49F966E1}"/>
-              </a:ext>
-            </a:extLst>
-          </p:cNvPr>
-          <p:cNvGrpSpPr/>
-          <p:nvPr/>
-        </p:nvGrpSpPr>
-        <p:grpSpPr>
-          <a:xfrm>
-            <a:off x="8392713" y="565627"/>
-            <a:ext cx="432000" cy="3575344"/>
-            <a:chOff x="8392712" y="565626"/>
-            <a:chExt cx="432000" cy="3575344"/>
-          </a:xfrm>
-        </p:grpSpPr>
-        <p:sp>
-          <p:nvSpPr>
-            <p:cNvPr id="34" name="Rectangle 33">
-              <a:extLst>
-                <a:ext uri="{FF2B5EF4-FFF2-40B4-BE49-F238E27FC236}">
-                  <a16:creationId xmlns:a16="http://schemas.microsoft.com/office/drawing/2014/main" id="{B29846BB-8F89-4E56-86FB-C6ECA1CD7E32}"/>
-                </a:ext>
-              </a:extLst>
-            </p:cNvPr>
-            <p:cNvSpPr/>
-            <p:nvPr/>
-          </p:nvSpPr>
-          <p:spPr>
-            <a:xfrm>
-              <a:off x="8464712" y="3060970"/>
-              <a:ext cx="288000" cy="1080000"/>
-            </a:xfrm>
-            <a:prstGeom prst="rect">
-              <a:avLst/>
-            </a:prstGeom>
-            <a:ln>
-              <a:solidFill>
-                <a:schemeClr val="tx1"/>
-              </a:solidFill>
-            </a:ln>
-          </p:spPr>
-          <p:style>
-            <a:lnRef idx="2">
-              <a:schemeClr val="accent1">
-                <a:shade val="50000"/>
-              </a:schemeClr>
-            </a:lnRef>
-            <a:fillRef idx="1">
-              <a:schemeClr val="accent1"/>
-            </a:fillRef>
-            <a:effectRef idx="0">
-              <a:schemeClr val="accent1"/>
-            </a:effectRef>
-            <a:fontRef idx="minor">
-              <a:schemeClr val="lt1"/>
-            </a:fontRef>
-          </p:style>
-          <p:txBody>
-            <a:bodyPr rtlCol="0" anchor="ctr"/>
-            <a:lstStyle/>
-            <a:p>
-              <a:pPr algn="ctr"/>
-              <a:endParaRPr lang="en-CH" sz="1801"/>
-            </a:p>
-          </p:txBody>
-        </p:sp>
-        <p:sp>
-          <p:nvSpPr>
-            <p:cNvPr id="35" name="Arrow: Right 34">
-              <a:extLst>
-                <a:ext uri="{FF2B5EF4-FFF2-40B4-BE49-F238E27FC236}">
-                  <a16:creationId xmlns:a16="http://schemas.microsoft.com/office/drawing/2014/main" id="{4A65BEEC-90CE-4BA6-B8C1-85B05C0FF771}"/>
-                </a:ext>
-              </a:extLst>
-            </p:cNvPr>
-            <p:cNvSpPr/>
-            <p:nvPr/>
-          </p:nvSpPr>
-          <p:spPr>
-            <a:xfrm rot="16200000">
-              <a:off x="8473691" y="2436674"/>
-              <a:ext cx="270043" cy="259058"/>
-            </a:xfrm>
-            <a:prstGeom prst="rightArrow">
-              <a:avLst/>
-            </a:prstGeom>
-            <a:solidFill>
-              <a:schemeClr val="accent2">
-                <a:lumMod val="75000"/>
-              </a:schemeClr>
-            </a:solidFill>
-            <a:ln>
-              <a:solidFill>
-                <a:schemeClr val="tx1"/>
-              </a:solidFill>
-            </a:ln>
-          </p:spPr>
-          <p:style>
-            <a:lnRef idx="2">
-              <a:schemeClr val="accent1">
-                <a:shade val="50000"/>
-              </a:schemeClr>
-            </a:lnRef>
-            <a:fillRef idx="1">
-              <a:schemeClr val="accent1"/>
-            </a:fillRef>
-            <a:effectRef idx="0">
-              <a:schemeClr val="accent1"/>
-            </a:effectRef>
-            <a:fontRef idx="minor">
-              <a:schemeClr val="lt1"/>
-            </a:fontRef>
-          </p:style>
-          <p:txBody>
-            <a:bodyPr rtlCol="0" anchor="ctr"/>
-            <a:lstStyle/>
-            <a:p>
-              <a:pPr algn="ctr"/>
-              <a:endParaRPr lang="en-CH" sz="1801"/>
-            </a:p>
-          </p:txBody>
-        </p:sp>
-        <p:grpSp>
-          <p:nvGrpSpPr>
-            <p:cNvPr id="8" name="Group 7">
-              <a:extLst>
-                <a:ext uri="{FF2B5EF4-FFF2-40B4-BE49-F238E27FC236}">
-                  <a16:creationId xmlns:a16="http://schemas.microsoft.com/office/drawing/2014/main" id="{EEC42DD4-EF8F-4613-9017-600F6BCD359D}"/>
-                </a:ext>
-              </a:extLst>
-            </p:cNvPr>
-            <p:cNvGrpSpPr/>
-            <p:nvPr/>
-          </p:nvGrpSpPr>
-          <p:grpSpPr>
-            <a:xfrm>
-              <a:off x="8392712" y="565626"/>
-              <a:ext cx="432000" cy="1440000"/>
-              <a:chOff x="8798423" y="524351"/>
-              <a:chExt cx="432000" cy="1440000"/>
-            </a:xfrm>
-          </p:grpSpPr>
-          <p:sp>
-            <p:nvSpPr>
-              <p:cNvPr id="36" name="Rectangle 35">
-                <a:extLst>
-                  <a:ext uri="{FF2B5EF4-FFF2-40B4-BE49-F238E27FC236}">
-                    <a16:creationId xmlns:a16="http://schemas.microsoft.com/office/drawing/2014/main" id="{84E91ACC-756A-4BBE-A542-D0A60199DA47}"/>
-                  </a:ext>
-                </a:extLst>
-              </p:cNvPr>
-              <p:cNvSpPr/>
-              <p:nvPr/>
-            </p:nvSpPr>
-            <p:spPr>
-              <a:xfrm>
-                <a:off x="8942423" y="524351"/>
-                <a:ext cx="288000" cy="1440000"/>
-              </a:xfrm>
-              <a:prstGeom prst="rect">
-                <a:avLst/>
-              </a:prstGeom>
-              <a:ln>
-                <a:solidFill>
-                  <a:schemeClr val="tx1"/>
-                </a:solidFill>
-              </a:ln>
-            </p:spPr>
-            <p:style>
-              <a:lnRef idx="2">
-                <a:schemeClr val="accent1">
-                  <a:shade val="50000"/>
-                </a:schemeClr>
-              </a:lnRef>
-              <a:fillRef idx="1">
-                <a:schemeClr val="accent1"/>
-              </a:fillRef>
-              <a:effectRef idx="0">
-                <a:schemeClr val="accent1"/>
-              </a:effectRef>
-              <a:fontRef idx="minor">
-                <a:schemeClr val="lt1"/>
-              </a:fontRef>
-            </p:style>
-            <p:txBody>
-              <a:bodyPr rtlCol="0" anchor="ctr"/>
-              <a:lstStyle/>
-              <a:p>
-                <a:pPr algn="ctr"/>
-                <a:endParaRPr lang="en-CH" sz="1801"/>
-              </a:p>
-            </p:txBody>
-          </p:sp>
-          <p:sp>
-            <p:nvSpPr>
-              <p:cNvPr id="37" name="Rectangle 36">
-                <a:extLst>
-                  <a:ext uri="{FF2B5EF4-FFF2-40B4-BE49-F238E27FC236}">
-                    <a16:creationId xmlns:a16="http://schemas.microsoft.com/office/drawing/2014/main" id="{7195BF83-7F95-46EC-9AFD-FCBEC9253200}"/>
-                  </a:ext>
-                </a:extLst>
-              </p:cNvPr>
-              <p:cNvSpPr/>
-              <p:nvPr/>
-            </p:nvSpPr>
-            <p:spPr>
-              <a:xfrm>
-                <a:off x="8798423" y="524351"/>
-                <a:ext cx="144000" cy="1440000"/>
-              </a:xfrm>
-              <a:prstGeom prst="rect">
-                <a:avLst/>
-              </a:prstGeom>
-              <a:pattFill prst="wdDnDiag">
-                <a:fgClr>
-                  <a:schemeClr val="bg1">
-                    <a:lumMod val="50000"/>
-                  </a:schemeClr>
-                </a:fgClr>
-                <a:bgClr>
-                  <a:schemeClr val="bg1"/>
-                </a:bgClr>
-              </a:pattFill>
-              <a:ln>
-                <a:solidFill>
-                  <a:schemeClr val="tx1"/>
-                </a:solidFill>
-              </a:ln>
-            </p:spPr>
-            <p:style>
-              <a:lnRef idx="2">
-                <a:schemeClr val="accent1">
-                  <a:shade val="50000"/>
-                </a:schemeClr>
-              </a:lnRef>
-              <a:fillRef idx="1">
-                <a:schemeClr val="accent1"/>
-              </a:fillRef>
-              <a:effectRef idx="0">
-                <a:schemeClr val="accent1"/>
-              </a:effectRef>
-              <a:fontRef idx="minor">
-                <a:schemeClr val="lt1"/>
-              </a:fontRef>
-            </p:style>
-            <p:txBody>
-              <a:bodyPr rtlCol="0" anchor="ctr"/>
-              <a:lstStyle/>
-              <a:p>
-                <a:pPr algn="ctr"/>
-                <a:endParaRPr lang="en-CH" sz="1801"/>
-              </a:p>
-            </p:txBody>
-          </p:sp>
-        </p:grpSp>
-      </p:grpSp>
-      <p:sp>
-        <p:nvSpPr>
-          <p:cNvPr id="38" name="Arrow: Right 37">
-            <a:extLst>
-              <a:ext uri="{FF2B5EF4-FFF2-40B4-BE49-F238E27FC236}">
-                <a16:creationId xmlns:a16="http://schemas.microsoft.com/office/drawing/2014/main" id="{F4517626-A95E-4E71-8F75-C3A67E9E71DF}"/>
-              </a:ext>
-            </a:extLst>
-          </p:cNvPr>
-          <p:cNvSpPr/>
-          <p:nvPr/>
-        </p:nvSpPr>
-        <p:spPr>
-          <a:xfrm>
-            <a:off x="8653206" y="5447158"/>
-            <a:ext cx="654050" cy="165100"/>
-          </a:xfrm>
-          <a:prstGeom prst="rightArrow">
-            <a:avLst/>
-          </a:prstGeom>
-          <a:ln>
-            <a:solidFill>
-              <a:schemeClr val="tx1"/>
-            </a:solidFill>
-          </a:ln>
-        </p:spPr>
-        <p:style>
-          <a:lnRef idx="2">
-            <a:schemeClr val="accent1">
-              <a:shade val="50000"/>
-            </a:schemeClr>
-          </a:lnRef>
-          <a:fillRef idx="1">
-            <a:schemeClr val="accent1"/>
-          </a:fillRef>
-          <a:effectRef idx="0">
-            <a:schemeClr val="accent1"/>
-          </a:effectRef>
-          <a:fontRef idx="minor">
-            <a:schemeClr val="lt1"/>
-          </a:fontRef>
-        </p:style>
-        <p:txBody>
-          <a:bodyPr rtlCol="0" anchor="ctr"/>
-          <a:lstStyle/>
-          <a:p>
-            <a:pPr algn="ctr"/>
-            <a:endParaRPr lang="en-CH" sz="1801"/>
-          </a:p>
-        </p:txBody>
-      </p:sp>
-      <p:sp>
-        <p:nvSpPr>
-          <p:cNvPr id="39" name="TextBox 38">
-            <a:extLst>
-              <a:ext uri="{FF2B5EF4-FFF2-40B4-BE49-F238E27FC236}">
-                <a16:creationId xmlns:a16="http://schemas.microsoft.com/office/drawing/2014/main" id="{E2931C0D-FCCA-44A1-AB07-AD920A303461}"/>
-              </a:ext>
-            </a:extLst>
-          </p:cNvPr>
-          <p:cNvSpPr txBox="1"/>
-          <p:nvPr/>
-        </p:nvSpPr>
-        <p:spPr>
-          <a:xfrm>
-            <a:off x="9578656" y="5345041"/>
-            <a:ext cx="2613344" cy="369460"/>
-          </a:xfrm>
-          <a:prstGeom prst="rect">
-            <a:avLst/>
-          </a:prstGeom>
-          <a:noFill/>
-        </p:spPr>
-        <p:txBody>
-          <a:bodyPr wrap="none" rtlCol="0">
-            <a:spAutoFit/>
-          </a:bodyPr>
-          <a:lstStyle/>
-          <a:p>
-            <a:r>
-              <a:rPr lang="en-US" sz="1801" dirty="0"/>
-              <a:t>GCN (double convolution)</a:t>
-            </a:r>
-            <a:endParaRPr lang="en-CH" sz="1801" dirty="0"/>
-          </a:p>
-        </p:txBody>
-      </p:sp>
-      <p:sp>
-        <p:nvSpPr>
-          <p:cNvPr id="40" name="Arrow: Right 39">
-            <a:extLst>
-              <a:ext uri="{FF2B5EF4-FFF2-40B4-BE49-F238E27FC236}">
-                <a16:creationId xmlns:a16="http://schemas.microsoft.com/office/drawing/2014/main" id="{376C799F-74DD-4EBE-ABB5-4E93E4B3EAEE}"/>
-              </a:ext>
-            </a:extLst>
-          </p:cNvPr>
-          <p:cNvSpPr/>
-          <p:nvPr/>
-        </p:nvSpPr>
-        <p:spPr>
-          <a:xfrm rot="5400000">
-            <a:off x="8845211" y="5886522"/>
-            <a:ext cx="270043" cy="259058"/>
-          </a:xfrm>
-          <a:prstGeom prst="rightArrow">
-            <a:avLst/>
-          </a:prstGeom>
-          <a:solidFill>
-            <a:schemeClr val="accent2">
-              <a:lumMod val="75000"/>
-            </a:schemeClr>
-          </a:solidFill>
-          <a:ln>
-            <a:solidFill>
-              <a:schemeClr val="tx1"/>
-            </a:solidFill>
-          </a:ln>
-        </p:spPr>
-        <p:style>
-          <a:lnRef idx="2">
-            <a:schemeClr val="accent1">
-              <a:shade val="50000"/>
-            </a:schemeClr>
-          </a:lnRef>
-          <a:fillRef idx="1">
-            <a:schemeClr val="accent1"/>
-          </a:fillRef>
-          <a:effectRef idx="0">
-            <a:schemeClr val="accent1"/>
-          </a:effectRef>
-          <a:fontRef idx="minor">
-            <a:schemeClr val="lt1"/>
-          </a:fontRef>
-        </p:style>
-        <p:txBody>
-          <a:bodyPr rtlCol="0" anchor="ctr"/>
-          <a:lstStyle/>
-          <a:p>
-            <a:pPr algn="ctr"/>
-            <a:endParaRPr lang="en-CH" sz="1801"/>
-          </a:p>
-        </p:txBody>
-      </p:sp>
-      <p:sp>
-        <p:nvSpPr>
-          <p:cNvPr id="41" name="TextBox 40">
-            <a:extLst>
-              <a:ext uri="{FF2B5EF4-FFF2-40B4-BE49-F238E27FC236}">
-                <a16:creationId xmlns:a16="http://schemas.microsoft.com/office/drawing/2014/main" id="{CB98E1ED-3F7A-4649-92E2-4C2EC8E22BFD}"/>
-              </a:ext>
-            </a:extLst>
-          </p:cNvPr>
-          <p:cNvSpPr txBox="1"/>
-          <p:nvPr/>
-        </p:nvSpPr>
-        <p:spPr>
-          <a:xfrm>
-            <a:off x="9578657" y="5807156"/>
-            <a:ext cx="886781" cy="369460"/>
-          </a:xfrm>
-          <a:prstGeom prst="rect">
-            <a:avLst/>
-          </a:prstGeom>
-          <a:noFill/>
-        </p:spPr>
-        <p:txBody>
-          <a:bodyPr wrap="none" rtlCol="0">
-            <a:spAutoFit/>
-          </a:bodyPr>
-          <a:lstStyle/>
-          <a:p>
-            <a:r>
-              <a:rPr lang="en-US" sz="1801" dirty="0"/>
-              <a:t>pooling</a:t>
-            </a:r>
-            <a:endParaRPr lang="en-CH" sz="1801" dirty="0"/>
-          </a:p>
-        </p:txBody>
-      </p:sp>
-      <p:sp>
-        <p:nvSpPr>
-          <p:cNvPr id="42" name="Arrow: Right 41">
-            <a:extLst>
-              <a:ext uri="{FF2B5EF4-FFF2-40B4-BE49-F238E27FC236}">
-                <a16:creationId xmlns:a16="http://schemas.microsoft.com/office/drawing/2014/main" id="{71F5C1D1-15CC-4FFA-8BD6-CC5EAB1EB2DA}"/>
-              </a:ext>
-            </a:extLst>
-          </p:cNvPr>
-          <p:cNvSpPr/>
-          <p:nvPr/>
-        </p:nvSpPr>
-        <p:spPr>
-          <a:xfrm rot="16200000">
-            <a:off x="8845211" y="6425339"/>
-            <a:ext cx="270043" cy="259058"/>
-          </a:xfrm>
-          <a:prstGeom prst="rightArrow">
-            <a:avLst/>
-          </a:prstGeom>
-          <a:solidFill>
-            <a:schemeClr val="accent2">
-              <a:lumMod val="75000"/>
-            </a:schemeClr>
-          </a:solidFill>
-          <a:ln>
-            <a:solidFill>
-              <a:schemeClr val="tx1"/>
-            </a:solidFill>
-          </a:ln>
-        </p:spPr>
-        <p:style>
-          <a:lnRef idx="2">
-            <a:schemeClr val="accent1">
-              <a:shade val="50000"/>
-            </a:schemeClr>
-          </a:lnRef>
-          <a:fillRef idx="1">
-            <a:schemeClr val="accent1"/>
-          </a:fillRef>
-          <a:effectRef idx="0">
-            <a:schemeClr val="accent1"/>
-          </a:effectRef>
-          <a:fontRef idx="minor">
-            <a:schemeClr val="lt1"/>
-          </a:fontRef>
-        </p:style>
-        <p:txBody>
-          <a:bodyPr rtlCol="0" anchor="ctr"/>
-          <a:lstStyle/>
-          <a:p>
-            <a:pPr algn="ctr"/>
-            <a:endParaRPr lang="en-CH" sz="1801"/>
-          </a:p>
-        </p:txBody>
-      </p:sp>
-      <p:sp>
-        <p:nvSpPr>
-          <p:cNvPr id="43" name="TextBox 42">
-            <a:extLst>
-              <a:ext uri="{FF2B5EF4-FFF2-40B4-BE49-F238E27FC236}">
-                <a16:creationId xmlns:a16="http://schemas.microsoft.com/office/drawing/2014/main" id="{3D438139-2456-494D-88A4-1171BC6F495E}"/>
-              </a:ext>
-            </a:extLst>
-          </p:cNvPr>
-          <p:cNvSpPr txBox="1"/>
-          <p:nvPr/>
-        </p:nvSpPr>
-        <p:spPr>
-          <a:xfrm>
-            <a:off x="9597214" y="6320557"/>
-            <a:ext cx="1130438" cy="369460"/>
-          </a:xfrm>
-          <a:prstGeom prst="rect">
-            <a:avLst/>
-          </a:prstGeom>
-          <a:noFill/>
-        </p:spPr>
-        <p:txBody>
-          <a:bodyPr wrap="none" rtlCol="0">
-            <a:spAutoFit/>
-          </a:bodyPr>
-          <a:lstStyle/>
-          <a:p>
-            <a:r>
-              <a:rPr lang="en-US" sz="1801" dirty="0" err="1"/>
-              <a:t>unpooling</a:t>
-            </a:r>
-            <a:endParaRPr lang="en-CH" sz="1801" dirty="0"/>
-          </a:p>
-        </p:txBody>
-      </p:sp>
-      <p:sp>
-        <p:nvSpPr>
-          <p:cNvPr id="46" name="Rectangle 45">
-            <a:extLst>
-              <a:ext uri="{FF2B5EF4-FFF2-40B4-BE49-F238E27FC236}">
-                <a16:creationId xmlns:a16="http://schemas.microsoft.com/office/drawing/2014/main" id="{39BAD6E2-39B6-4F1D-BE5C-C599C320734D}"/>
-              </a:ext>
-            </a:extLst>
-          </p:cNvPr>
-          <p:cNvSpPr/>
-          <p:nvPr/>
-        </p:nvSpPr>
-        <p:spPr>
-          <a:xfrm>
-            <a:off x="11431671" y="565626"/>
-            <a:ext cx="72000" cy="1440000"/>
-          </a:xfrm>
-          <a:prstGeom prst="rect">
-            <a:avLst/>
-          </a:prstGeom>
-          <a:ln>
-            <a:solidFill>
-              <a:schemeClr val="tx1"/>
-            </a:solidFill>
-          </a:ln>
-        </p:spPr>
-        <p:style>
-          <a:lnRef idx="2">
-            <a:schemeClr val="accent1">
-              <a:shade val="50000"/>
-            </a:schemeClr>
-          </a:lnRef>
-          <a:fillRef idx="1">
-            <a:schemeClr val="accent1"/>
-          </a:fillRef>
-          <a:effectRef idx="0">
-            <a:schemeClr val="accent1"/>
-          </a:effectRef>
-          <a:fontRef idx="minor">
-            <a:schemeClr val="lt1"/>
-          </a:fontRef>
-        </p:style>
-        <p:txBody>
-          <a:bodyPr rtlCol="0" anchor="ctr"/>
-          <a:lstStyle/>
-          <a:p>
-            <a:pPr algn="ctr"/>
-            <a:endParaRPr lang="en-CH" sz="1801"/>
-          </a:p>
-        </p:txBody>
-      </p:sp>
-      <p:sp>
-        <p:nvSpPr>
-          <p:cNvPr id="47" name="Arrow: Right 46">
-            <a:extLst>
-              <a:ext uri="{FF2B5EF4-FFF2-40B4-BE49-F238E27FC236}">
-                <a16:creationId xmlns:a16="http://schemas.microsoft.com/office/drawing/2014/main" id="{04E8ADD8-62C2-43DF-86B6-B68E5FCE009D}"/>
-              </a:ext>
-            </a:extLst>
-          </p:cNvPr>
-          <p:cNvSpPr/>
-          <p:nvPr/>
-        </p:nvSpPr>
-        <p:spPr>
-          <a:xfrm>
-            <a:off x="8640571" y="5060660"/>
-            <a:ext cx="654050" cy="165100"/>
-          </a:xfrm>
-          <a:prstGeom prst="rightArrow">
-            <a:avLst/>
-          </a:prstGeom>
-          <a:solidFill>
-            <a:schemeClr val="bg1">
-              <a:lumMod val="50000"/>
-            </a:schemeClr>
-          </a:solidFill>
-          <a:ln>
-            <a:solidFill>
-              <a:schemeClr val="tx1"/>
-            </a:solidFill>
-          </a:ln>
-        </p:spPr>
-        <p:style>
-          <a:lnRef idx="2">
-            <a:schemeClr val="accent1">
-              <a:shade val="50000"/>
-            </a:schemeClr>
-          </a:lnRef>
-          <a:fillRef idx="1">
-            <a:schemeClr val="accent1"/>
-          </a:fillRef>
-          <a:effectRef idx="0">
-            <a:schemeClr val="accent1"/>
-          </a:effectRef>
-          <a:fontRef idx="minor">
-            <a:schemeClr val="lt1"/>
-          </a:fontRef>
-        </p:style>
-        <p:txBody>
-          <a:bodyPr rtlCol="0" anchor="ctr"/>
-          <a:lstStyle/>
-          <a:p>
-            <a:pPr algn="ctr"/>
-            <a:endParaRPr lang="en-CH" sz="1801"/>
-          </a:p>
-        </p:txBody>
-      </p:sp>
-      <p:sp>
-        <p:nvSpPr>
-          <p:cNvPr id="48" name="TextBox 47">
-            <a:extLst>
-              <a:ext uri="{FF2B5EF4-FFF2-40B4-BE49-F238E27FC236}">
-                <a16:creationId xmlns:a16="http://schemas.microsoft.com/office/drawing/2014/main" id="{E0156F9F-5DB5-4A6F-9230-76E2591E3146}"/>
-              </a:ext>
-            </a:extLst>
-          </p:cNvPr>
-          <p:cNvSpPr txBox="1"/>
-          <p:nvPr/>
-        </p:nvSpPr>
-        <p:spPr>
-          <a:xfrm>
-            <a:off x="9566022" y="4958543"/>
-            <a:ext cx="1670329" cy="369460"/>
-          </a:xfrm>
-          <a:prstGeom prst="rect">
-            <a:avLst/>
-          </a:prstGeom>
-          <a:noFill/>
-        </p:spPr>
-        <p:txBody>
-          <a:bodyPr wrap="none" rtlCol="0">
-            <a:spAutoFit/>
-          </a:bodyPr>
-          <a:lstStyle/>
-          <a:p>
-            <a:r>
-              <a:rPr lang="en-US" sz="1801" dirty="0"/>
-              <a:t>Skip connection</a:t>
-            </a:r>
-            <a:endParaRPr lang="en-CH" sz="1801" dirty="0"/>
-          </a:p>
-        </p:txBody>
-      </p:sp>
-      <p:sp>
-        <p:nvSpPr>
-          <p:cNvPr id="2" name="TextBox 1">
-            <a:extLst>
-              <a:ext uri="{FF2B5EF4-FFF2-40B4-BE49-F238E27FC236}">
-                <a16:creationId xmlns:a16="http://schemas.microsoft.com/office/drawing/2014/main" id="{C33A6264-182B-4547-969A-71E6D2C683D2}"/>
-              </a:ext>
-            </a:extLst>
-          </p:cNvPr>
-          <p:cNvSpPr txBox="1"/>
-          <p:nvPr/>
-        </p:nvSpPr>
-        <p:spPr>
-          <a:xfrm>
-            <a:off x="4582785" y="-17178"/>
-            <a:ext cx="3476465" cy="369460"/>
-          </a:xfrm>
-          <a:prstGeom prst="rect">
-            <a:avLst/>
-          </a:prstGeom>
-          <a:noFill/>
-        </p:spPr>
-        <p:txBody>
-          <a:bodyPr wrap="none" rtlCol="0">
-            <a:spAutoFit/>
-          </a:bodyPr>
-          <a:lstStyle/>
-          <a:p>
-            <a:r>
-              <a:rPr lang="en-US" sz="1801" dirty="0"/>
-              <a:t>Variable naming for dense diff pool</a:t>
-            </a:r>
-            <a:endParaRPr lang="en-CH" sz="1801" dirty="0"/>
-          </a:p>
-        </p:txBody>
-      </p:sp>
-      <p:sp>
-        <p:nvSpPr>
-          <p:cNvPr id="9" name="Arrow: Right 8">
-            <a:extLst>
-              <a:ext uri="{FF2B5EF4-FFF2-40B4-BE49-F238E27FC236}">
-                <a16:creationId xmlns:a16="http://schemas.microsoft.com/office/drawing/2014/main" id="{C4197ACF-7A33-4477-AA05-A911ABD020CE}"/>
-              </a:ext>
-            </a:extLst>
-          </p:cNvPr>
-          <p:cNvSpPr/>
-          <p:nvPr/>
-        </p:nvSpPr>
-        <p:spPr>
-          <a:xfrm>
-            <a:off x="1889039" y="1401990"/>
-            <a:ext cx="654050" cy="165100"/>
-          </a:xfrm>
-          <a:prstGeom prst="rightArrow">
-            <a:avLst/>
-          </a:prstGeom>
-          <a:ln>
-            <a:solidFill>
-              <a:schemeClr val="tx1"/>
-            </a:solidFill>
-          </a:ln>
-        </p:spPr>
-        <p:style>
-          <a:lnRef idx="2">
-            <a:schemeClr val="accent1">
-              <a:shade val="50000"/>
-            </a:schemeClr>
-          </a:lnRef>
-          <a:fillRef idx="1">
-            <a:schemeClr val="accent1"/>
-          </a:fillRef>
-          <a:effectRef idx="0">
-            <a:schemeClr val="accent1"/>
-          </a:effectRef>
-          <a:fontRef idx="minor">
-            <a:schemeClr val="lt1"/>
-          </a:fontRef>
-        </p:style>
-        <p:txBody>
-          <a:bodyPr rtlCol="0" anchor="ctr"/>
-          <a:lstStyle/>
-          <a:p>
-            <a:pPr algn="ctr"/>
-            <a:endParaRPr lang="en-CH" sz="1801" dirty="0"/>
-          </a:p>
-        </p:txBody>
-      </p:sp>
-      <p:sp>
-        <p:nvSpPr>
-          <p:cNvPr id="3" name="TextBox 2">
-            <a:extLst>
-              <a:ext uri="{FF2B5EF4-FFF2-40B4-BE49-F238E27FC236}">
-                <a16:creationId xmlns:a16="http://schemas.microsoft.com/office/drawing/2014/main" id="{A001B40B-BC9C-46EE-8A67-DD12B6F5D20B}"/>
-              </a:ext>
-            </a:extLst>
-          </p:cNvPr>
-          <p:cNvSpPr txBox="1"/>
-          <p:nvPr/>
-        </p:nvSpPr>
-        <p:spPr>
-          <a:xfrm>
-            <a:off x="1259741" y="1162515"/>
-            <a:ext cx="1691489" cy="246349"/>
-          </a:xfrm>
-          <a:prstGeom prst="rect">
-            <a:avLst/>
-          </a:prstGeom>
-          <a:noFill/>
-        </p:spPr>
-        <p:txBody>
-          <a:bodyPr wrap="none" rtlCol="0">
-            <a:spAutoFit/>
-          </a:bodyPr>
-          <a:lstStyle/>
-          <a:p>
-            <a:r>
-              <a:rPr lang="en-US" sz="1001" dirty="0"/>
-              <a:t>gcn0_in(</a:t>
-            </a:r>
-            <a:r>
-              <a:rPr lang="en-US" sz="1001" dirty="0" err="1"/>
-              <a:t>n_features</a:t>
-            </a:r>
-            <a:r>
-              <a:rPr lang="en-US" sz="1001" dirty="0"/>
-              <a:t>-&gt; 2**</a:t>
-            </a:r>
-            <a:r>
-              <a:rPr lang="en-US" sz="1001" dirty="0" err="1"/>
-              <a:t>wf</a:t>
-            </a:r>
-            <a:r>
-              <a:rPr lang="en-US" sz="1001" dirty="0"/>
-              <a:t>)</a:t>
-            </a:r>
-            <a:endParaRPr lang="en-CH" sz="1001" dirty="0"/>
-          </a:p>
-        </p:txBody>
-      </p:sp>
-      <p:sp>
-        <p:nvSpPr>
-          <p:cNvPr id="45" name="Arrow: Right 44">
-            <a:extLst>
-              <a:ext uri="{FF2B5EF4-FFF2-40B4-BE49-F238E27FC236}">
-                <a16:creationId xmlns:a16="http://schemas.microsoft.com/office/drawing/2014/main" id="{2051397D-EB90-423D-B820-AF6FDBE2CD7E}"/>
-              </a:ext>
-            </a:extLst>
-          </p:cNvPr>
-          <p:cNvSpPr/>
-          <p:nvPr/>
-        </p:nvSpPr>
-        <p:spPr>
-          <a:xfrm>
-            <a:off x="9801169" y="1398414"/>
-            <a:ext cx="654050" cy="165100"/>
-          </a:xfrm>
-          <a:prstGeom prst="rightArrow">
-            <a:avLst/>
-          </a:prstGeom>
-          <a:ln>
-            <a:solidFill>
-              <a:schemeClr val="tx1"/>
-            </a:solidFill>
-          </a:ln>
-        </p:spPr>
-        <p:style>
-          <a:lnRef idx="2">
-            <a:schemeClr val="accent1">
-              <a:shade val="50000"/>
-            </a:schemeClr>
-          </a:lnRef>
-          <a:fillRef idx="1">
-            <a:schemeClr val="accent1"/>
-          </a:fillRef>
-          <a:effectRef idx="0">
-            <a:schemeClr val="accent1"/>
-          </a:effectRef>
-          <a:fontRef idx="minor">
-            <a:schemeClr val="lt1"/>
-          </a:fontRef>
-        </p:style>
-        <p:txBody>
-          <a:bodyPr rtlCol="0" anchor="ctr"/>
-          <a:lstStyle/>
-          <a:p>
-            <a:pPr algn="ctr"/>
-            <a:endParaRPr lang="en-CH" sz="1801"/>
-          </a:p>
-        </p:txBody>
-      </p:sp>
-      <p:sp>
-        <p:nvSpPr>
-          <p:cNvPr id="25" name="Arrow: Right 24">
-            <a:extLst>
-              <a:ext uri="{FF2B5EF4-FFF2-40B4-BE49-F238E27FC236}">
-                <a16:creationId xmlns:a16="http://schemas.microsoft.com/office/drawing/2014/main" id="{955C35DA-1627-4CB4-9D09-DE019414688F}"/>
-              </a:ext>
-            </a:extLst>
-          </p:cNvPr>
-          <p:cNvSpPr/>
-          <p:nvPr/>
-        </p:nvSpPr>
-        <p:spPr>
-          <a:xfrm>
-            <a:off x="3674285" y="3518422"/>
-            <a:ext cx="654050" cy="165100"/>
-          </a:xfrm>
-          <a:prstGeom prst="rightArrow">
-            <a:avLst/>
-          </a:prstGeom>
-          <a:ln>
-            <a:solidFill>
-              <a:schemeClr val="tx1"/>
-            </a:solidFill>
-          </a:ln>
-        </p:spPr>
-        <p:style>
-          <a:lnRef idx="2">
-            <a:schemeClr val="accent1">
-              <a:shade val="50000"/>
-            </a:schemeClr>
-          </a:lnRef>
-          <a:fillRef idx="1">
-            <a:schemeClr val="accent1"/>
-          </a:fillRef>
-          <a:effectRef idx="0">
-            <a:schemeClr val="accent1"/>
-          </a:effectRef>
-          <a:fontRef idx="minor">
-            <a:schemeClr val="lt1"/>
-          </a:fontRef>
-        </p:style>
-        <p:txBody>
-          <a:bodyPr rtlCol="0" anchor="ctr"/>
-          <a:lstStyle/>
-          <a:p>
-            <a:pPr algn="ctr"/>
-            <a:endParaRPr lang="en-CH" sz="1801"/>
-          </a:p>
-        </p:txBody>
-      </p:sp>
-      <p:sp>
-        <p:nvSpPr>
-          <p:cNvPr id="28" name="Arrow: Right 27">
-            <a:extLst>
-              <a:ext uri="{FF2B5EF4-FFF2-40B4-BE49-F238E27FC236}">
-                <a16:creationId xmlns:a16="http://schemas.microsoft.com/office/drawing/2014/main" id="{EBB4DC02-D5B8-4102-90F4-EBE8612F6CAE}"/>
-              </a:ext>
-            </a:extLst>
-          </p:cNvPr>
-          <p:cNvSpPr/>
-          <p:nvPr/>
-        </p:nvSpPr>
-        <p:spPr>
-          <a:xfrm>
-            <a:off x="5196550" y="5581830"/>
-            <a:ext cx="654050" cy="165100"/>
-          </a:xfrm>
-          <a:prstGeom prst="rightArrow">
-            <a:avLst/>
-          </a:prstGeom>
-          <a:ln>
-            <a:solidFill>
-              <a:schemeClr val="tx1"/>
-            </a:solidFill>
-          </a:ln>
-        </p:spPr>
-        <p:style>
-          <a:lnRef idx="2">
-            <a:schemeClr val="accent1">
-              <a:shade val="50000"/>
-            </a:schemeClr>
-          </a:lnRef>
-          <a:fillRef idx="1">
-            <a:schemeClr val="accent1"/>
-          </a:fillRef>
-          <a:effectRef idx="0">
-            <a:schemeClr val="accent1"/>
-          </a:effectRef>
-          <a:fontRef idx="minor">
-            <a:schemeClr val="lt1"/>
-          </a:fontRef>
-        </p:style>
-        <p:txBody>
-          <a:bodyPr rtlCol="0" anchor="ctr"/>
-          <a:lstStyle/>
-          <a:p>
-            <a:pPr algn="ctr"/>
-            <a:endParaRPr lang="en-CH" sz="1801"/>
-          </a:p>
-        </p:txBody>
-      </p:sp>
-      <p:sp>
-        <p:nvSpPr>
-          <p:cNvPr id="33" name="Arrow: Right 32">
-            <a:extLst>
-              <a:ext uri="{FF2B5EF4-FFF2-40B4-BE49-F238E27FC236}">
-                <a16:creationId xmlns:a16="http://schemas.microsoft.com/office/drawing/2014/main" id="{54F1970B-A5F2-48F3-A232-D13D1406F43F}"/>
-              </a:ext>
-            </a:extLst>
-          </p:cNvPr>
-          <p:cNvSpPr/>
-          <p:nvPr/>
-        </p:nvSpPr>
-        <p:spPr>
-          <a:xfrm>
-            <a:off x="7141891" y="3518422"/>
-            <a:ext cx="654050" cy="165100"/>
-          </a:xfrm>
-          <a:prstGeom prst="rightArrow">
-            <a:avLst/>
-          </a:prstGeom>
-          <a:ln>
-            <a:solidFill>
-              <a:schemeClr val="tx1"/>
-            </a:solidFill>
-          </a:ln>
-        </p:spPr>
-        <p:style>
-          <a:lnRef idx="2">
-            <a:schemeClr val="accent1">
-              <a:shade val="50000"/>
-            </a:schemeClr>
-          </a:lnRef>
-          <a:fillRef idx="1">
-            <a:schemeClr val="accent1"/>
-          </a:fillRef>
-          <a:effectRef idx="0">
-            <a:schemeClr val="accent1"/>
-          </a:effectRef>
-          <a:fontRef idx="minor">
-            <a:schemeClr val="lt1"/>
-          </a:fontRef>
-        </p:style>
-        <p:txBody>
-          <a:bodyPr rtlCol="0" anchor="ctr"/>
-          <a:lstStyle/>
-          <a:p>
-            <a:pPr algn="ctr"/>
-            <a:endParaRPr lang="en-CH" sz="1801"/>
-          </a:p>
-        </p:txBody>
-      </p:sp>
-      <p:sp>
-        <p:nvSpPr>
-          <p:cNvPr id="58" name="TextBox 57">
-            <a:extLst>
-              <a:ext uri="{FF2B5EF4-FFF2-40B4-BE49-F238E27FC236}">
-                <a16:creationId xmlns:a16="http://schemas.microsoft.com/office/drawing/2014/main" id="{3E4B0948-514B-43DA-9BE9-9D191769AFEF}"/>
-              </a:ext>
-            </a:extLst>
-          </p:cNvPr>
-          <p:cNvSpPr txBox="1"/>
-          <p:nvPr/>
-        </p:nvSpPr>
-        <p:spPr>
-          <a:xfrm>
-            <a:off x="741771" y="2009684"/>
-            <a:ext cx="401072" cy="369460"/>
-          </a:xfrm>
-          <a:prstGeom prst="rect">
-            <a:avLst/>
-          </a:prstGeom>
-          <a:noFill/>
-        </p:spPr>
-        <p:txBody>
-          <a:bodyPr wrap="none" rtlCol="0">
-            <a:spAutoFit/>
-          </a:bodyPr>
-          <a:lstStyle/>
-          <a:p>
-            <a:r>
-              <a:rPr lang="en-US" sz="1801" dirty="0"/>
-              <a:t>x0</a:t>
-            </a:r>
-            <a:endParaRPr lang="en-CH" sz="1801" dirty="0"/>
-          </a:p>
-        </p:txBody>
-      </p:sp>
-      <p:sp>
-        <p:nvSpPr>
-          <p:cNvPr id="59" name="TextBox 58">
-            <a:extLst>
-              <a:ext uri="{FF2B5EF4-FFF2-40B4-BE49-F238E27FC236}">
-                <a16:creationId xmlns:a16="http://schemas.microsoft.com/office/drawing/2014/main" id="{7579EF44-F1E9-4AF0-967C-E4F21A75464E}"/>
-              </a:ext>
-            </a:extLst>
-          </p:cNvPr>
-          <p:cNvSpPr txBox="1"/>
-          <p:nvPr/>
-        </p:nvSpPr>
-        <p:spPr>
-          <a:xfrm>
-            <a:off x="3138652" y="4162785"/>
-            <a:ext cx="401072" cy="369460"/>
-          </a:xfrm>
-          <a:prstGeom prst="rect">
-            <a:avLst/>
-          </a:prstGeom>
-          <a:noFill/>
-        </p:spPr>
-        <p:txBody>
-          <a:bodyPr wrap="none" rtlCol="0">
-            <a:spAutoFit/>
-          </a:bodyPr>
-          <a:lstStyle/>
-          <a:p>
-            <a:r>
-              <a:rPr lang="en-US" sz="1801" dirty="0"/>
-              <a:t>x1</a:t>
-            </a:r>
-            <a:endParaRPr lang="en-CH" sz="1801" dirty="0"/>
-          </a:p>
-        </p:txBody>
-      </p:sp>
-      <p:sp>
-        <p:nvSpPr>
-          <p:cNvPr id="60" name="TextBox 59">
-            <a:extLst>
-              <a:ext uri="{FF2B5EF4-FFF2-40B4-BE49-F238E27FC236}">
-                <a16:creationId xmlns:a16="http://schemas.microsoft.com/office/drawing/2014/main" id="{599E0B1D-F48D-47DB-B5F5-5D90C3A5E917}"/>
-              </a:ext>
-            </a:extLst>
-          </p:cNvPr>
-          <p:cNvSpPr txBox="1"/>
-          <p:nvPr/>
-        </p:nvSpPr>
-        <p:spPr>
-          <a:xfrm>
-            <a:off x="4604400" y="6024378"/>
-            <a:ext cx="401072" cy="369460"/>
-          </a:xfrm>
-          <a:prstGeom prst="rect">
-            <a:avLst/>
-          </a:prstGeom>
-          <a:noFill/>
-        </p:spPr>
-        <p:txBody>
-          <a:bodyPr wrap="none" rtlCol="0">
-            <a:spAutoFit/>
-          </a:bodyPr>
-          <a:lstStyle/>
-          <a:p>
-            <a:r>
-              <a:rPr lang="en-US" sz="1801" dirty="0"/>
-              <a:t>x2</a:t>
-            </a:r>
-            <a:endParaRPr lang="en-CH" sz="1801" dirty="0"/>
-          </a:p>
-        </p:txBody>
-      </p:sp>
-      <p:sp>
-        <p:nvSpPr>
-          <p:cNvPr id="61" name="TextBox 60">
-            <a:extLst>
-              <a:ext uri="{FF2B5EF4-FFF2-40B4-BE49-F238E27FC236}">
-                <a16:creationId xmlns:a16="http://schemas.microsoft.com/office/drawing/2014/main" id="{06C13880-870D-4BB0-B5B0-C406EFC63AF5}"/>
-              </a:ext>
-            </a:extLst>
-          </p:cNvPr>
-          <p:cNvSpPr txBox="1"/>
-          <p:nvPr/>
-        </p:nvSpPr>
-        <p:spPr>
-          <a:xfrm>
-            <a:off x="4546692" y="4162785"/>
-            <a:ext cx="516488" cy="369460"/>
-          </a:xfrm>
-          <a:prstGeom prst="rect">
-            <a:avLst/>
-          </a:prstGeom>
-          <a:noFill/>
-        </p:spPr>
-        <p:txBody>
-          <a:bodyPr wrap="none" rtlCol="0">
-            <a:spAutoFit/>
-          </a:bodyPr>
-          <a:lstStyle/>
-          <a:p>
-            <a:r>
-              <a:rPr lang="en-US" sz="1801" dirty="0"/>
-              <a:t>x1_</a:t>
-            </a:r>
-            <a:endParaRPr lang="en-CH" sz="1801" dirty="0"/>
-          </a:p>
-        </p:txBody>
-      </p:sp>
-      <p:sp>
-        <p:nvSpPr>
-          <p:cNvPr id="62" name="TextBox 61">
-            <a:extLst>
-              <a:ext uri="{FF2B5EF4-FFF2-40B4-BE49-F238E27FC236}">
-                <a16:creationId xmlns:a16="http://schemas.microsoft.com/office/drawing/2014/main" id="{58E1BB2B-BFBD-4F79-94B1-EEA8A5CFFE1E}"/>
-              </a:ext>
-            </a:extLst>
-          </p:cNvPr>
-          <p:cNvSpPr txBox="1"/>
-          <p:nvPr/>
-        </p:nvSpPr>
-        <p:spPr>
-          <a:xfrm>
-            <a:off x="6047946" y="6024378"/>
-            <a:ext cx="837089" cy="369460"/>
-          </a:xfrm>
-          <a:prstGeom prst="rect">
-            <a:avLst/>
-          </a:prstGeom>
-          <a:noFill/>
-        </p:spPr>
-        <p:txBody>
-          <a:bodyPr wrap="none" rtlCol="0">
-            <a:spAutoFit/>
-          </a:bodyPr>
-          <a:lstStyle/>
-          <a:p>
-            <a:r>
-              <a:rPr lang="en-US" sz="1801" dirty="0"/>
-              <a:t>x2_out</a:t>
-            </a:r>
-            <a:endParaRPr lang="en-CH" sz="1801" dirty="0"/>
-          </a:p>
-        </p:txBody>
-      </p:sp>
-      <p:sp>
-        <p:nvSpPr>
-          <p:cNvPr id="63" name="TextBox 62">
-            <a:extLst>
-              <a:ext uri="{FF2B5EF4-FFF2-40B4-BE49-F238E27FC236}">
-                <a16:creationId xmlns:a16="http://schemas.microsoft.com/office/drawing/2014/main" id="{D4954A41-366D-4C6B-9D9C-58CE0CB22D20}"/>
-              </a:ext>
-            </a:extLst>
-          </p:cNvPr>
-          <p:cNvSpPr txBox="1"/>
-          <p:nvPr/>
-        </p:nvSpPr>
-        <p:spPr>
-          <a:xfrm>
-            <a:off x="5756199" y="4170557"/>
-            <a:ext cx="1779654" cy="369460"/>
-          </a:xfrm>
-          <a:prstGeom prst="rect">
-            <a:avLst/>
-          </a:prstGeom>
-          <a:noFill/>
-        </p:spPr>
-        <p:txBody>
-          <a:bodyPr wrap="none" rtlCol="0">
-            <a:spAutoFit/>
-          </a:bodyPr>
-          <a:lstStyle/>
-          <a:p>
-            <a:r>
-              <a:rPr lang="en-US" sz="1801" dirty="0"/>
-              <a:t>[x1_, x2_out_up]</a:t>
-            </a:r>
-            <a:endParaRPr lang="en-CH" sz="1801" dirty="0"/>
-          </a:p>
-        </p:txBody>
-      </p:sp>
-      <p:sp>
-        <p:nvSpPr>
-          <p:cNvPr id="64" name="TextBox 63">
-            <a:extLst>
-              <a:ext uri="{FF2B5EF4-FFF2-40B4-BE49-F238E27FC236}">
-                <a16:creationId xmlns:a16="http://schemas.microsoft.com/office/drawing/2014/main" id="{B4ABBADD-A6AE-4105-A348-3133EAC1B7FB}"/>
-              </a:ext>
-            </a:extLst>
-          </p:cNvPr>
-          <p:cNvSpPr txBox="1"/>
-          <p:nvPr/>
-        </p:nvSpPr>
-        <p:spPr>
-          <a:xfrm>
-            <a:off x="8190168" y="4131384"/>
-            <a:ext cx="837089" cy="369460"/>
-          </a:xfrm>
-          <a:prstGeom prst="rect">
-            <a:avLst/>
-          </a:prstGeom>
-          <a:noFill/>
-        </p:spPr>
-        <p:txBody>
-          <a:bodyPr wrap="none" rtlCol="0">
-            <a:spAutoFit/>
-          </a:bodyPr>
-          <a:lstStyle/>
-          <a:p>
-            <a:r>
-              <a:rPr lang="en-US" sz="1801" dirty="0"/>
-              <a:t>x1_out</a:t>
-            </a:r>
-            <a:endParaRPr lang="en-CH" sz="1801" dirty="0"/>
-          </a:p>
-        </p:txBody>
-      </p:sp>
-      <p:sp>
-        <p:nvSpPr>
-          <p:cNvPr id="65" name="TextBox 64">
-            <a:extLst>
-              <a:ext uri="{FF2B5EF4-FFF2-40B4-BE49-F238E27FC236}">
-                <a16:creationId xmlns:a16="http://schemas.microsoft.com/office/drawing/2014/main" id="{9DC51178-9F9A-4867-B9D0-8C97FB4ABBA8}"/>
-              </a:ext>
-            </a:extLst>
-          </p:cNvPr>
-          <p:cNvSpPr txBox="1"/>
-          <p:nvPr/>
-        </p:nvSpPr>
-        <p:spPr>
-          <a:xfrm>
-            <a:off x="8028131" y="2009684"/>
-            <a:ext cx="1305165" cy="369460"/>
-          </a:xfrm>
-          <a:prstGeom prst="rect">
-            <a:avLst/>
-          </a:prstGeom>
-          <a:noFill/>
-        </p:spPr>
-        <p:txBody>
-          <a:bodyPr wrap="none" rtlCol="0">
-            <a:spAutoFit/>
-          </a:bodyPr>
-          <a:lstStyle/>
-          <a:p>
-            <a:r>
-              <a:rPr lang="en-US" sz="1801" dirty="0"/>
-              <a:t>[x0, x1_out]</a:t>
-            </a:r>
-            <a:endParaRPr lang="en-CH" sz="1801" dirty="0"/>
-          </a:p>
-        </p:txBody>
-      </p:sp>
-      <p:sp>
-        <p:nvSpPr>
-          <p:cNvPr id="66" name="TextBox 65">
-            <a:extLst>
-              <a:ext uri="{FF2B5EF4-FFF2-40B4-BE49-F238E27FC236}">
-                <a16:creationId xmlns:a16="http://schemas.microsoft.com/office/drawing/2014/main" id="{2D7AD520-7E9F-49D4-B6CE-C5BA875A2E15}"/>
-              </a:ext>
-            </a:extLst>
-          </p:cNvPr>
-          <p:cNvSpPr txBox="1"/>
-          <p:nvPr/>
-        </p:nvSpPr>
-        <p:spPr>
-          <a:xfrm>
-            <a:off x="3080944" y="2009684"/>
-            <a:ext cx="516488" cy="369460"/>
-          </a:xfrm>
-          <a:prstGeom prst="rect">
-            <a:avLst/>
-          </a:prstGeom>
-          <a:noFill/>
-        </p:spPr>
-        <p:txBody>
-          <a:bodyPr wrap="none" rtlCol="0">
-            <a:spAutoFit/>
-          </a:bodyPr>
-          <a:lstStyle/>
-          <a:p>
-            <a:r>
-              <a:rPr lang="en-US" sz="1801" dirty="0"/>
-              <a:t>x0_</a:t>
-            </a:r>
-            <a:endParaRPr lang="en-CH" sz="1801" dirty="0"/>
-          </a:p>
-        </p:txBody>
-      </p:sp>
-      <p:sp>
-        <p:nvSpPr>
-          <p:cNvPr id="67" name="TextBox 66">
-            <a:extLst>
-              <a:ext uri="{FF2B5EF4-FFF2-40B4-BE49-F238E27FC236}">
-                <a16:creationId xmlns:a16="http://schemas.microsoft.com/office/drawing/2014/main" id="{CD32680D-DD8F-4FBE-B701-2F264D28A4BF}"/>
-              </a:ext>
-            </a:extLst>
-          </p:cNvPr>
-          <p:cNvSpPr txBox="1"/>
-          <p:nvPr/>
-        </p:nvSpPr>
-        <p:spPr>
-          <a:xfrm>
-            <a:off x="11049126" y="2009684"/>
-            <a:ext cx="837089" cy="369460"/>
-          </a:xfrm>
-          <a:prstGeom prst="rect">
-            <a:avLst/>
-          </a:prstGeom>
-          <a:noFill/>
-        </p:spPr>
-        <p:txBody>
-          <a:bodyPr wrap="none" rtlCol="0">
-            <a:spAutoFit/>
-          </a:bodyPr>
-          <a:lstStyle/>
-          <a:p>
-            <a:r>
-              <a:rPr lang="en-US" sz="1801" dirty="0"/>
-              <a:t>x0_out</a:t>
-            </a:r>
-            <a:endParaRPr lang="en-CH" sz="1801" dirty="0"/>
-          </a:p>
-        </p:txBody>
-      </p:sp>
-      <p:sp>
-        <p:nvSpPr>
-          <p:cNvPr id="68" name="TextBox 67">
-            <a:extLst>
-              <a:ext uri="{FF2B5EF4-FFF2-40B4-BE49-F238E27FC236}">
-                <a16:creationId xmlns:a16="http://schemas.microsoft.com/office/drawing/2014/main" id="{6B70A8AF-5C9B-4119-8215-FA0798DC71B6}"/>
-              </a:ext>
-            </a:extLst>
-          </p:cNvPr>
-          <p:cNvSpPr txBox="1"/>
-          <p:nvPr/>
-        </p:nvSpPr>
-        <p:spPr>
-          <a:xfrm>
-            <a:off x="566977" y="268346"/>
-            <a:ext cx="793807" cy="254044"/>
-          </a:xfrm>
-          <a:prstGeom prst="rect">
-            <a:avLst/>
-          </a:prstGeom>
-          <a:noFill/>
-        </p:spPr>
-        <p:txBody>
-          <a:bodyPr wrap="none" rtlCol="0">
-            <a:spAutoFit/>
-          </a:bodyPr>
-          <a:lstStyle/>
-          <a:p>
-            <a:r>
-              <a:rPr lang="en-US" sz="1051" dirty="0" err="1"/>
-              <a:t>N_features</a:t>
-            </a:r>
-            <a:endParaRPr lang="en-CH" sz="1051" dirty="0"/>
-          </a:p>
-        </p:txBody>
-      </p:sp>
-      <p:sp>
-        <p:nvSpPr>
-          <p:cNvPr id="69" name="TextBox 68">
-            <a:extLst>
-              <a:ext uri="{FF2B5EF4-FFF2-40B4-BE49-F238E27FC236}">
-                <a16:creationId xmlns:a16="http://schemas.microsoft.com/office/drawing/2014/main" id="{7E697601-8771-4F6E-B4F6-80C40A9BB7B5}"/>
-              </a:ext>
-            </a:extLst>
-          </p:cNvPr>
-          <p:cNvSpPr txBox="1"/>
-          <p:nvPr/>
-        </p:nvSpPr>
-        <p:spPr>
-          <a:xfrm>
-            <a:off x="3462934" y="3149090"/>
-            <a:ext cx="1330519" cy="400366"/>
-          </a:xfrm>
-          <a:prstGeom prst="rect">
-            <a:avLst/>
-          </a:prstGeom>
-          <a:noFill/>
-        </p:spPr>
-        <p:txBody>
-          <a:bodyPr wrap="square" rtlCol="0">
-            <a:spAutoFit/>
-          </a:bodyPr>
-          <a:lstStyle/>
-          <a:p>
-            <a:r>
-              <a:rPr lang="en-US" sz="1001" dirty="0"/>
-              <a:t>gcn1_in</a:t>
-            </a:r>
-          </a:p>
-          <a:p>
-            <a:r>
-              <a:rPr lang="en-US" sz="1001" dirty="0"/>
-              <a:t>(2**wf</a:t>
-            </a:r>
-            <a:r>
-              <a:rPr lang="en-US" sz="1001" dirty="0">
-                <a:sym typeface="Wingdings" panose="05000000000000000000" pitchFamily="2" charset="2"/>
-              </a:rPr>
-              <a:t>2**(wf+1)</a:t>
-            </a:r>
-            <a:r>
-              <a:rPr lang="en-US" sz="1001" dirty="0"/>
-              <a:t>)</a:t>
-            </a:r>
-            <a:endParaRPr lang="en-CH" sz="1001" dirty="0"/>
-          </a:p>
-        </p:txBody>
-      </p:sp>
-      <p:sp>
-        <p:nvSpPr>
-          <p:cNvPr id="72" name="TextBox 71">
-            <a:extLst>
-              <a:ext uri="{FF2B5EF4-FFF2-40B4-BE49-F238E27FC236}">
-                <a16:creationId xmlns:a16="http://schemas.microsoft.com/office/drawing/2014/main" id="{EF8176B5-5500-4705-B082-481EFFD04FB8}"/>
-              </a:ext>
-            </a:extLst>
-          </p:cNvPr>
-          <p:cNvSpPr txBox="1"/>
-          <p:nvPr/>
-        </p:nvSpPr>
-        <p:spPr>
-          <a:xfrm>
-            <a:off x="4860597" y="5143211"/>
-            <a:ext cx="1591557" cy="400366"/>
-          </a:xfrm>
-          <a:prstGeom prst="rect">
-            <a:avLst/>
-          </a:prstGeom>
-          <a:noFill/>
-        </p:spPr>
-        <p:txBody>
-          <a:bodyPr wrap="square" rtlCol="0">
-            <a:spAutoFit/>
-          </a:bodyPr>
-          <a:lstStyle/>
-          <a:p>
-            <a:r>
-              <a:rPr lang="en-US" sz="1001" dirty="0"/>
-              <a:t>gcn2_in</a:t>
-            </a:r>
-          </a:p>
-          <a:p>
-            <a:r>
-              <a:rPr lang="en-US" sz="1001" dirty="0"/>
-              <a:t>(</a:t>
-            </a:r>
-            <a:r>
-              <a:rPr lang="en-US" sz="1001" dirty="0">
-                <a:sym typeface="Wingdings" panose="05000000000000000000" pitchFamily="2" charset="2"/>
-              </a:rPr>
-              <a:t>2**(wf+1)2**(wf+2)</a:t>
-            </a:r>
-            <a:r>
-              <a:rPr lang="en-US" sz="1001" dirty="0"/>
-              <a:t>)</a:t>
-            </a:r>
-            <a:endParaRPr lang="en-CH" sz="1001" dirty="0"/>
-          </a:p>
-        </p:txBody>
-      </p:sp>
-      <p:sp>
-        <p:nvSpPr>
-          <p:cNvPr id="73" name="TextBox 72">
-            <a:extLst>
-              <a:ext uri="{FF2B5EF4-FFF2-40B4-BE49-F238E27FC236}">
-                <a16:creationId xmlns:a16="http://schemas.microsoft.com/office/drawing/2014/main" id="{2C038B75-BA5C-41F6-8C34-72260E035814}"/>
-              </a:ext>
-            </a:extLst>
-          </p:cNvPr>
-          <p:cNvSpPr txBox="1"/>
-          <p:nvPr/>
-        </p:nvSpPr>
-        <p:spPr>
-          <a:xfrm>
-            <a:off x="6725224" y="3201141"/>
-            <a:ext cx="1868692" cy="338554"/>
-          </a:xfrm>
-          <a:prstGeom prst="rect">
-            <a:avLst/>
-          </a:prstGeom>
-          <a:noFill/>
-        </p:spPr>
-        <p:txBody>
-          <a:bodyPr wrap="square" rtlCol="0">
-            <a:spAutoFit/>
-          </a:bodyPr>
-          <a:lstStyle/>
-          <a:p>
-            <a:r>
-              <a:rPr lang="en-US" sz="800" dirty="0"/>
-              <a:t>gcn1_out</a:t>
-            </a:r>
-          </a:p>
-          <a:p>
-            <a:r>
-              <a:rPr lang="en-US" sz="800" dirty="0"/>
-              <a:t>([2**(wf+1) + 2**(wf+2)]) -&gt; 2**(wf+1) </a:t>
-            </a:r>
-            <a:endParaRPr lang="en-CH" sz="800" dirty="0"/>
-          </a:p>
-        </p:txBody>
-      </p:sp>
-      <p:sp>
-        <p:nvSpPr>
-          <p:cNvPr id="74" name="TextBox 73">
-            <a:extLst>
-              <a:ext uri="{FF2B5EF4-FFF2-40B4-BE49-F238E27FC236}">
-                <a16:creationId xmlns:a16="http://schemas.microsoft.com/office/drawing/2014/main" id="{1F2B487B-9BAE-4CFC-AAC2-ED16C06CE1B4}"/>
-              </a:ext>
-            </a:extLst>
-          </p:cNvPr>
-          <p:cNvSpPr txBox="1"/>
-          <p:nvPr/>
-        </p:nvSpPr>
-        <p:spPr>
-          <a:xfrm>
-            <a:off x="1335150" y="2355786"/>
-            <a:ext cx="2054318" cy="554383"/>
-          </a:xfrm>
-          <a:prstGeom prst="rect">
-            <a:avLst/>
-          </a:prstGeom>
-          <a:noFill/>
-        </p:spPr>
-        <p:txBody>
-          <a:bodyPr wrap="square" rtlCol="0">
-            <a:spAutoFit/>
-          </a:bodyPr>
-          <a:lstStyle/>
-          <a:p>
-            <a:r>
-              <a:rPr lang="en-US" sz="1001" dirty="0"/>
-              <a:t>s1 = conv_pool1(num_clusters1)</a:t>
-            </a:r>
-            <a:br>
-              <a:rPr lang="en-US" sz="1001" dirty="0"/>
-            </a:br>
-            <a:r>
-              <a:rPr lang="en-US" sz="1001" dirty="0" err="1"/>
-              <a:t>dense_diff_pool</a:t>
-            </a:r>
-            <a:r>
-              <a:rPr lang="en-US" sz="1001" dirty="0"/>
-              <a:t>(x0_, </a:t>
-            </a:r>
-            <a:r>
-              <a:rPr lang="en-US" sz="1001" dirty="0" err="1"/>
-              <a:t>data.adj</a:t>
-            </a:r>
-            <a:r>
-              <a:rPr lang="en-US" sz="1001" dirty="0"/>
-              <a:t>, s1, mask)</a:t>
-            </a:r>
-            <a:endParaRPr lang="en-CH" sz="1001" dirty="0"/>
-          </a:p>
-        </p:txBody>
-      </p:sp>
-      <p:sp>
-        <p:nvSpPr>
-          <p:cNvPr id="10" name="Rectangle 9">
-            <a:extLst>
-              <a:ext uri="{FF2B5EF4-FFF2-40B4-BE49-F238E27FC236}">
-                <a16:creationId xmlns:a16="http://schemas.microsoft.com/office/drawing/2014/main" id="{66854192-106D-45AD-A631-E42BF53DA55A}"/>
-              </a:ext>
-            </a:extLst>
-          </p:cNvPr>
-          <p:cNvSpPr/>
-          <p:nvPr/>
-        </p:nvSpPr>
-        <p:spPr>
-          <a:xfrm>
-            <a:off x="6071097" y="5019557"/>
-            <a:ext cx="823110" cy="276999"/>
-          </a:xfrm>
-          <a:prstGeom prst="rect">
-            <a:avLst/>
-          </a:prstGeom>
-        </p:spPr>
-        <p:txBody>
-          <a:bodyPr wrap="none">
-            <a:spAutoFit/>
-          </a:bodyPr>
-          <a:lstStyle/>
-          <a:p>
-            <a:r>
-              <a:rPr lang="en-US" sz="1200" dirty="0">
-                <a:sym typeface="Wingdings" panose="05000000000000000000" pitchFamily="2" charset="2"/>
-              </a:rPr>
-              <a:t>2**(wf+2)</a:t>
-            </a:r>
-            <a:endParaRPr lang="en-CH" sz="1200" dirty="0"/>
-          </a:p>
-        </p:txBody>
-      </p:sp>
-      <p:sp>
-        <p:nvSpPr>
-          <p:cNvPr id="12" name="Rectangle 11">
-            <a:extLst>
-              <a:ext uri="{FF2B5EF4-FFF2-40B4-BE49-F238E27FC236}">
-                <a16:creationId xmlns:a16="http://schemas.microsoft.com/office/drawing/2014/main" id="{18F2B010-5EAB-406C-9BFF-B5E467427404}"/>
-              </a:ext>
-            </a:extLst>
-          </p:cNvPr>
-          <p:cNvSpPr/>
-          <p:nvPr/>
-        </p:nvSpPr>
-        <p:spPr>
-          <a:xfrm>
-            <a:off x="4410900" y="2769773"/>
-            <a:ext cx="742511" cy="254044"/>
-          </a:xfrm>
-          <a:prstGeom prst="rect">
-            <a:avLst/>
-          </a:prstGeom>
-        </p:spPr>
-        <p:txBody>
-          <a:bodyPr wrap="none">
-            <a:spAutoFit/>
-          </a:bodyPr>
-          <a:lstStyle/>
-          <a:p>
-            <a:r>
-              <a:rPr lang="en-US" sz="1051" dirty="0">
-                <a:sym typeface="Wingdings" panose="05000000000000000000" pitchFamily="2" charset="2"/>
-              </a:rPr>
-              <a:t>2**(wf+1)</a:t>
-            </a:r>
-            <a:endParaRPr lang="en-CH" sz="1051" dirty="0"/>
-          </a:p>
-        </p:txBody>
-      </p:sp>
-      <p:sp>
-        <p:nvSpPr>
-          <p:cNvPr id="76" name="Rectangle 75">
-            <a:extLst>
-              <a:ext uri="{FF2B5EF4-FFF2-40B4-BE49-F238E27FC236}">
-                <a16:creationId xmlns:a16="http://schemas.microsoft.com/office/drawing/2014/main" id="{16FD38B4-2F24-40E3-81BA-A8654739A77A}"/>
-              </a:ext>
-            </a:extLst>
-          </p:cNvPr>
-          <p:cNvSpPr/>
-          <p:nvPr/>
-        </p:nvSpPr>
-        <p:spPr>
-          <a:xfrm>
-            <a:off x="8221553" y="2766641"/>
-            <a:ext cx="742511" cy="254044"/>
-          </a:xfrm>
-          <a:prstGeom prst="rect">
-            <a:avLst/>
-          </a:prstGeom>
-        </p:spPr>
-        <p:txBody>
-          <a:bodyPr wrap="none">
-            <a:spAutoFit/>
-          </a:bodyPr>
-          <a:lstStyle/>
-          <a:p>
-            <a:r>
-              <a:rPr lang="en-US" sz="1051" dirty="0">
-                <a:sym typeface="Wingdings" panose="05000000000000000000" pitchFamily="2" charset="2"/>
-              </a:rPr>
-              <a:t>2**(wf+1)</a:t>
-            </a:r>
-            <a:endParaRPr lang="en-CH" sz="1051" dirty="0"/>
-          </a:p>
-        </p:txBody>
-      </p:sp>
-      <p:sp>
-        <p:nvSpPr>
-          <p:cNvPr id="77" name="TextBox 76">
-            <a:extLst>
-              <a:ext uri="{FF2B5EF4-FFF2-40B4-BE49-F238E27FC236}">
-                <a16:creationId xmlns:a16="http://schemas.microsoft.com/office/drawing/2014/main" id="{496DC1E0-6079-43EE-88D8-1B8672F483B3}"/>
-              </a:ext>
-            </a:extLst>
-          </p:cNvPr>
-          <p:cNvSpPr txBox="1"/>
-          <p:nvPr/>
-        </p:nvSpPr>
-        <p:spPr>
-          <a:xfrm>
-            <a:off x="9228088" y="1032820"/>
-            <a:ext cx="1868692" cy="338554"/>
-          </a:xfrm>
-          <a:prstGeom prst="rect">
-            <a:avLst/>
-          </a:prstGeom>
-          <a:noFill/>
-        </p:spPr>
-        <p:txBody>
-          <a:bodyPr wrap="square" rtlCol="0">
-            <a:spAutoFit/>
-          </a:bodyPr>
-          <a:lstStyle/>
-          <a:p>
-            <a:r>
-              <a:rPr lang="en-US" sz="800" dirty="0"/>
-              <a:t>gcn0_out</a:t>
-            </a:r>
-          </a:p>
-          <a:p>
-            <a:r>
-              <a:rPr lang="en-US" sz="800" dirty="0"/>
-              <a:t>([2**(</a:t>
-            </a:r>
-            <a:r>
-              <a:rPr lang="en-US" sz="800" dirty="0" err="1"/>
-              <a:t>wf</a:t>
-            </a:r>
-            <a:r>
-              <a:rPr lang="en-US" sz="800" dirty="0"/>
-              <a:t>) + 2**(wf+1)]) -&gt; </a:t>
-            </a:r>
-            <a:r>
-              <a:rPr lang="en-US" sz="800" dirty="0" err="1"/>
-              <a:t>n_classes</a:t>
-            </a:r>
-            <a:r>
-              <a:rPr lang="en-US" sz="800" dirty="0"/>
-              <a:t> </a:t>
-            </a:r>
-            <a:endParaRPr lang="en-CH" sz="800" dirty="0"/>
-          </a:p>
-        </p:txBody>
-      </p:sp>
-      <p:sp>
-        <p:nvSpPr>
-          <p:cNvPr id="78" name="Rectangle 77">
-            <a:extLst>
-              <a:ext uri="{FF2B5EF4-FFF2-40B4-BE49-F238E27FC236}">
-                <a16:creationId xmlns:a16="http://schemas.microsoft.com/office/drawing/2014/main" id="{229BE1E8-7A6F-45DD-9668-0EA34D05E781}"/>
-              </a:ext>
-            </a:extLst>
-          </p:cNvPr>
-          <p:cNvSpPr/>
-          <p:nvPr/>
-        </p:nvSpPr>
-        <p:spPr>
-          <a:xfrm>
-            <a:off x="5844294" y="2805508"/>
-            <a:ext cx="607859" cy="215444"/>
-          </a:xfrm>
-          <a:prstGeom prst="rect">
-            <a:avLst/>
-          </a:prstGeom>
-        </p:spPr>
-        <p:txBody>
-          <a:bodyPr wrap="none">
-            <a:spAutoFit/>
-          </a:bodyPr>
-          <a:lstStyle/>
-          <a:p>
-            <a:r>
-              <a:rPr lang="en-US" sz="800" dirty="0">
-                <a:sym typeface="Wingdings" panose="05000000000000000000" pitchFamily="2" charset="2"/>
-              </a:rPr>
-              <a:t>2**(wf+1)</a:t>
-            </a:r>
-            <a:endParaRPr lang="en-CH" sz="800" dirty="0"/>
-          </a:p>
-        </p:txBody>
-      </p:sp>
-      <p:sp>
-        <p:nvSpPr>
-          <p:cNvPr id="79" name="Rectangle 78">
-            <a:extLst>
-              <a:ext uri="{FF2B5EF4-FFF2-40B4-BE49-F238E27FC236}">
-                <a16:creationId xmlns:a16="http://schemas.microsoft.com/office/drawing/2014/main" id="{C40F302E-85F1-405C-AF98-3E69E320E45C}"/>
-              </a:ext>
-            </a:extLst>
-          </p:cNvPr>
-          <p:cNvSpPr/>
-          <p:nvPr/>
-        </p:nvSpPr>
-        <p:spPr>
-          <a:xfrm>
-            <a:off x="6531768" y="2777988"/>
-            <a:ext cx="607859" cy="215444"/>
-          </a:xfrm>
-          <a:prstGeom prst="rect">
-            <a:avLst/>
-          </a:prstGeom>
-        </p:spPr>
-        <p:txBody>
-          <a:bodyPr wrap="none">
-            <a:spAutoFit/>
-          </a:bodyPr>
-          <a:lstStyle/>
-          <a:p>
-            <a:r>
-              <a:rPr lang="en-US" sz="800" dirty="0">
-                <a:sym typeface="Wingdings" panose="05000000000000000000" pitchFamily="2" charset="2"/>
-              </a:rPr>
-              <a:t>2**(wf+2)</a:t>
-            </a:r>
-            <a:endParaRPr lang="en-CH" sz="800" dirty="0"/>
-          </a:p>
-        </p:txBody>
-      </p:sp>
-      <p:sp>
-        <p:nvSpPr>
-          <p:cNvPr id="81" name="Rectangle 80">
-            <a:extLst>
-              <a:ext uri="{FF2B5EF4-FFF2-40B4-BE49-F238E27FC236}">
-                <a16:creationId xmlns:a16="http://schemas.microsoft.com/office/drawing/2014/main" id="{40779BD3-A282-491A-B08F-79DE84B05662}"/>
-              </a:ext>
-            </a:extLst>
-          </p:cNvPr>
-          <p:cNvSpPr/>
-          <p:nvPr/>
-        </p:nvSpPr>
-        <p:spPr>
-          <a:xfrm>
-            <a:off x="7928854" y="333428"/>
-            <a:ext cx="607859" cy="215444"/>
-          </a:xfrm>
-          <a:prstGeom prst="rect">
-            <a:avLst/>
-          </a:prstGeom>
-        </p:spPr>
-        <p:txBody>
-          <a:bodyPr wrap="none">
-            <a:spAutoFit/>
-          </a:bodyPr>
-          <a:lstStyle/>
-          <a:p>
-            <a:r>
-              <a:rPr lang="en-US" sz="800" dirty="0">
-                <a:sym typeface="Wingdings" panose="05000000000000000000" pitchFamily="2" charset="2"/>
-              </a:rPr>
-              <a:t>2**(wf+1)</a:t>
-            </a:r>
-            <a:endParaRPr lang="en-CH" sz="800" dirty="0"/>
-          </a:p>
-        </p:txBody>
-      </p:sp>
-      <p:sp>
-        <p:nvSpPr>
-          <p:cNvPr id="82" name="Rectangle 81">
-            <a:extLst>
-              <a:ext uri="{FF2B5EF4-FFF2-40B4-BE49-F238E27FC236}">
-                <a16:creationId xmlns:a16="http://schemas.microsoft.com/office/drawing/2014/main" id="{6A62F598-CF83-41DA-908A-5A203F60C66D}"/>
-              </a:ext>
-            </a:extLst>
-          </p:cNvPr>
-          <p:cNvSpPr/>
-          <p:nvPr/>
-        </p:nvSpPr>
-        <p:spPr>
-          <a:xfrm>
-            <a:off x="8536712" y="333428"/>
-            <a:ext cx="505267" cy="215444"/>
-          </a:xfrm>
-          <a:prstGeom prst="rect">
-            <a:avLst/>
-          </a:prstGeom>
-        </p:spPr>
-        <p:txBody>
-          <a:bodyPr wrap="none">
-            <a:spAutoFit/>
-          </a:bodyPr>
-          <a:lstStyle/>
-          <a:p>
-            <a:r>
-              <a:rPr lang="en-US" sz="800" dirty="0">
-                <a:sym typeface="Wingdings" panose="05000000000000000000" pitchFamily="2" charset="2"/>
-              </a:rPr>
-              <a:t>2**(</a:t>
-            </a:r>
-            <a:r>
-              <a:rPr lang="en-US" sz="800" dirty="0" err="1">
-                <a:sym typeface="Wingdings" panose="05000000000000000000" pitchFamily="2" charset="2"/>
-              </a:rPr>
-              <a:t>wf</a:t>
-            </a:r>
-            <a:r>
-              <a:rPr lang="en-US" sz="800" dirty="0">
-                <a:sym typeface="Wingdings" panose="05000000000000000000" pitchFamily="2" charset="2"/>
-              </a:rPr>
-              <a:t>)</a:t>
-            </a:r>
-            <a:endParaRPr lang="en-CH" sz="800" dirty="0"/>
-          </a:p>
-        </p:txBody>
-      </p:sp>
-      <p:sp>
-        <p:nvSpPr>
-          <p:cNvPr id="84" name="TextBox 83">
-            <a:extLst>
-              <a:ext uri="{FF2B5EF4-FFF2-40B4-BE49-F238E27FC236}">
-                <a16:creationId xmlns:a16="http://schemas.microsoft.com/office/drawing/2014/main" id="{2CCD6E27-51E5-4B75-BECE-6E523A85497B}"/>
-              </a:ext>
-            </a:extLst>
-          </p:cNvPr>
-          <p:cNvSpPr txBox="1"/>
-          <p:nvPr/>
-        </p:nvSpPr>
-        <p:spPr>
-          <a:xfrm>
-            <a:off x="2435774" y="4580698"/>
-            <a:ext cx="2054318" cy="400366"/>
-          </a:xfrm>
-          <a:prstGeom prst="rect">
-            <a:avLst/>
-          </a:prstGeom>
-          <a:noFill/>
-        </p:spPr>
-        <p:txBody>
-          <a:bodyPr wrap="square" rtlCol="0">
-            <a:spAutoFit/>
-          </a:bodyPr>
-          <a:lstStyle/>
-          <a:p>
-            <a:r>
-              <a:rPr lang="en-US" sz="1001" dirty="0"/>
-              <a:t>s2 = conv_pool2(num_clusters2)</a:t>
-            </a:r>
-            <a:br>
-              <a:rPr lang="en-US" sz="1001" dirty="0"/>
-            </a:br>
-            <a:r>
-              <a:rPr lang="en-US" sz="1001" dirty="0" err="1"/>
-              <a:t>dense_diff_pool</a:t>
-            </a:r>
-            <a:r>
-              <a:rPr lang="en-US" sz="1001" dirty="0"/>
-              <a:t>(x1_, adj1, s2)</a:t>
-            </a:r>
-            <a:endParaRPr lang="en-CH" sz="1001" dirty="0"/>
-          </a:p>
-        </p:txBody>
-      </p:sp>
-      <p:sp>
-        <p:nvSpPr>
-          <p:cNvPr id="13" name="Rectangle 12">
-            <a:extLst>
-              <a:ext uri="{FF2B5EF4-FFF2-40B4-BE49-F238E27FC236}">
-                <a16:creationId xmlns:a16="http://schemas.microsoft.com/office/drawing/2014/main" id="{CA661599-50C4-4E07-9D09-5C9E7C4F8A83}"/>
-              </a:ext>
-            </a:extLst>
-          </p:cNvPr>
-          <p:cNvSpPr/>
-          <p:nvPr/>
-        </p:nvSpPr>
-        <p:spPr>
-          <a:xfrm>
-            <a:off x="2949625" y="264415"/>
-            <a:ext cx="628698" cy="261610"/>
-          </a:xfrm>
-          <a:prstGeom prst="rect">
-            <a:avLst/>
-          </a:prstGeom>
-        </p:spPr>
-        <p:txBody>
-          <a:bodyPr wrap="none">
-            <a:spAutoFit/>
-          </a:bodyPr>
-          <a:lstStyle/>
-          <a:p>
-            <a:r>
-              <a:rPr lang="en-US" sz="1100" dirty="0">
-                <a:sym typeface="Wingdings" panose="05000000000000000000" pitchFamily="2" charset="2"/>
-              </a:rPr>
-              <a:t>2**(</a:t>
-            </a:r>
-            <a:r>
-              <a:rPr lang="en-US" sz="1100" dirty="0" err="1">
-                <a:sym typeface="Wingdings" panose="05000000000000000000" pitchFamily="2" charset="2"/>
-              </a:rPr>
-              <a:t>wf</a:t>
-            </a:r>
-            <a:r>
-              <a:rPr lang="en-US" sz="1100" dirty="0">
-                <a:sym typeface="Wingdings" panose="05000000000000000000" pitchFamily="2" charset="2"/>
-              </a:rPr>
-              <a:t>)</a:t>
-            </a:r>
-            <a:endParaRPr lang="en-CH" sz="1100" dirty="0"/>
-          </a:p>
-        </p:txBody>
-      </p:sp>
-      <p:sp>
-        <p:nvSpPr>
-          <p:cNvPr id="70" name="Arrow: Right 69">
-            <a:extLst>
-              <a:ext uri="{FF2B5EF4-FFF2-40B4-BE49-F238E27FC236}">
-                <a16:creationId xmlns:a16="http://schemas.microsoft.com/office/drawing/2014/main" id="{E046BDD7-C59B-4003-B5E4-7566B0BFD2F0}"/>
-              </a:ext>
-            </a:extLst>
-          </p:cNvPr>
-          <p:cNvSpPr/>
-          <p:nvPr/>
-        </p:nvSpPr>
-        <p:spPr>
-          <a:xfrm>
-            <a:off x="615283" y="5798480"/>
-            <a:ext cx="654050" cy="165100"/>
-          </a:xfrm>
-          <a:prstGeom prst="rightArrow">
-            <a:avLst/>
-          </a:prstGeom>
-          <a:ln>
-            <a:solidFill>
-              <a:schemeClr val="tx1"/>
-            </a:solidFill>
-          </a:ln>
-        </p:spPr>
-        <p:style>
-          <a:lnRef idx="2">
-            <a:schemeClr val="accent1">
-              <a:shade val="50000"/>
-            </a:schemeClr>
-          </a:lnRef>
-          <a:fillRef idx="1">
-            <a:schemeClr val="accent1"/>
-          </a:fillRef>
-          <a:effectRef idx="0">
-            <a:schemeClr val="accent1"/>
-          </a:effectRef>
-          <a:fontRef idx="minor">
-            <a:schemeClr val="lt1"/>
-          </a:fontRef>
-        </p:style>
-        <p:txBody>
-          <a:bodyPr rtlCol="0" anchor="ctr"/>
-          <a:lstStyle/>
-          <a:p>
-            <a:pPr algn="ctr"/>
-            <a:endParaRPr lang="en-CH" sz="1801" dirty="0"/>
-          </a:p>
-        </p:txBody>
-      </p:sp>
-      <p:sp>
-        <p:nvSpPr>
-          <p:cNvPr id="71" name="Rectangle 70">
-            <a:extLst>
-              <a:ext uri="{FF2B5EF4-FFF2-40B4-BE49-F238E27FC236}">
-                <a16:creationId xmlns:a16="http://schemas.microsoft.com/office/drawing/2014/main" id="{2769D534-6E6E-4794-AECA-44EB20E3DED0}"/>
-              </a:ext>
-            </a:extLst>
-          </p:cNvPr>
-          <p:cNvSpPr/>
-          <p:nvPr/>
-        </p:nvSpPr>
-        <p:spPr>
-          <a:xfrm rot="16200000">
-            <a:off x="2469682" y="3422177"/>
-            <a:ext cx="777777" cy="254044"/>
-          </a:xfrm>
-          <a:prstGeom prst="rect">
-            <a:avLst/>
-          </a:prstGeom>
-        </p:spPr>
-        <p:txBody>
-          <a:bodyPr wrap="none">
-            <a:spAutoFit/>
-          </a:bodyPr>
-          <a:lstStyle/>
-          <a:p>
-            <a:r>
-              <a:rPr lang="en-US" sz="1051" dirty="0">
-                <a:sym typeface="Wingdings" panose="05000000000000000000" pitchFamily="2" charset="2"/>
-              </a:rPr>
-              <a:t>N_cluster1</a:t>
-            </a:r>
-            <a:endParaRPr lang="en-CH" sz="1051" dirty="0"/>
-          </a:p>
-        </p:txBody>
-      </p:sp>
-      <p:sp>
-        <p:nvSpPr>
-          <p:cNvPr id="75" name="Rectangle 74">
-            <a:extLst>
-              <a:ext uri="{FF2B5EF4-FFF2-40B4-BE49-F238E27FC236}">
-                <a16:creationId xmlns:a16="http://schemas.microsoft.com/office/drawing/2014/main" id="{D9948A37-E6FF-41C7-889E-699B9417B1C9}"/>
-              </a:ext>
-            </a:extLst>
-          </p:cNvPr>
-          <p:cNvSpPr/>
-          <p:nvPr/>
-        </p:nvSpPr>
-        <p:spPr>
-          <a:xfrm rot="16200000">
-            <a:off x="216877" y="1163302"/>
-            <a:ext cx="814647" cy="254044"/>
-          </a:xfrm>
-          <a:prstGeom prst="rect">
-            <a:avLst/>
-          </a:prstGeom>
-        </p:spPr>
-        <p:txBody>
-          <a:bodyPr wrap="none">
-            <a:spAutoFit/>
-          </a:bodyPr>
-          <a:lstStyle/>
-          <a:p>
-            <a:r>
-              <a:rPr lang="en-US" sz="1051" dirty="0" err="1">
-                <a:sym typeface="Wingdings" panose="05000000000000000000" pitchFamily="2" charset="2"/>
-              </a:rPr>
-              <a:t>N_Features</a:t>
-            </a:r>
-            <a:endParaRPr lang="en-CH" sz="1051" dirty="0"/>
-          </a:p>
-        </p:txBody>
-      </p:sp>
-      <p:sp>
-        <p:nvSpPr>
-          <p:cNvPr id="83" name="Rectangle 82">
-            <a:extLst>
-              <a:ext uri="{FF2B5EF4-FFF2-40B4-BE49-F238E27FC236}">
-                <a16:creationId xmlns:a16="http://schemas.microsoft.com/office/drawing/2014/main" id="{417C973D-2D3F-41B4-8C78-E404D2A2B507}"/>
-              </a:ext>
-            </a:extLst>
-          </p:cNvPr>
-          <p:cNvSpPr/>
-          <p:nvPr/>
-        </p:nvSpPr>
-        <p:spPr>
-          <a:xfrm rot="16200000">
-            <a:off x="4016210" y="5546033"/>
-            <a:ext cx="777777" cy="254044"/>
-          </a:xfrm>
-          <a:prstGeom prst="rect">
-            <a:avLst/>
-          </a:prstGeom>
-        </p:spPr>
-        <p:txBody>
-          <a:bodyPr wrap="none">
-            <a:spAutoFit/>
-          </a:bodyPr>
-          <a:lstStyle/>
-          <a:p>
-            <a:r>
-              <a:rPr lang="en-US" sz="1051" dirty="0">
-                <a:sym typeface="Wingdings" panose="05000000000000000000" pitchFamily="2" charset="2"/>
-              </a:rPr>
-              <a:t>N_cluster2</a:t>
-            </a:r>
-            <a:endParaRPr lang="en-CH" sz="1051" dirty="0"/>
-          </a:p>
-        </p:txBody>
-      </p:sp>
-    </p:spTree>
-    <p:extLst>
-      <p:ext uri="{BB962C8B-B14F-4D97-AF65-F5344CB8AC3E}">
-        <p14:creationId xmlns:p14="http://schemas.microsoft.com/office/powerpoint/2010/main" val="2084767380"/>
-      </p:ext>
-    </p:extLst>
-  </p:cSld>
-  <p:clrMapOvr>
-    <a:masterClrMapping/>
-  </p:clrMapOvr>
-</p:sld>
-</file>
-
-<file path=ppt/slides/slide3.xml><?xml version="1.0" encoding="utf-8"?>
-<p:sld xmlns:a="http://schemas.openxmlformats.org/drawingml/2006/main" xmlns:r="http://schemas.openxmlformats.org/officeDocument/2006/relationships" xmlns:p="http://schemas.openxmlformats.org/presentationml/2006/main">
-  <p:cSld>
-    <p:spTree>
-      <p:nvGrpSpPr>
-        <p:cNvPr id="1" name=""/>
-        <p:cNvGrpSpPr/>
-        <p:nvPr/>
-      </p:nvGrpSpPr>
-      <p:grpSpPr>
-        <a:xfrm>
-          <a:off x="0" y="0"/>
-          <a:ext cx="0" cy="0"/>
-          <a:chOff x="0" y="0"/>
-          <a:chExt cx="0" cy="0"/>
-        </a:xfrm>
-      </p:grpSpPr>
-      <p:sp>
-        <p:nvSpPr>
-          <p:cNvPr id="2" name="Title 1">
-            <a:extLst>
-              <a:ext uri="{FF2B5EF4-FFF2-40B4-BE49-F238E27FC236}">
-                <a16:creationId xmlns:a16="http://schemas.microsoft.com/office/drawing/2014/main" id="{6E6AD097-7633-4345-B3C3-CED53B3996EA}"/>
-              </a:ext>
-            </a:extLst>
-          </p:cNvPr>
-          <p:cNvSpPr>
-            <a:spLocks noGrp="1"/>
-          </p:cNvSpPr>
-          <p:nvPr>
-            <p:ph type="title"/>
-          </p:nvPr>
-        </p:nvSpPr>
-        <p:spPr/>
-        <p:txBody>
-          <a:bodyPr/>
-          <a:lstStyle/>
-          <a:p>
-            <a:endParaRPr lang="en-CH"/>
-          </a:p>
-        </p:txBody>
-      </p:sp>
-      <p:sp>
-        <p:nvSpPr>
-          <p:cNvPr id="3" name="Content Placeholder 2">
-            <a:extLst>
-              <a:ext uri="{FF2B5EF4-FFF2-40B4-BE49-F238E27FC236}">
-                <a16:creationId xmlns:a16="http://schemas.microsoft.com/office/drawing/2014/main" id="{DD3560D7-F9AB-4646-A612-A3CA88B7674B}"/>
-              </a:ext>
-            </a:extLst>
-          </p:cNvPr>
-          <p:cNvSpPr>
-            <a:spLocks noGrp="1"/>
-          </p:cNvSpPr>
-          <p:nvPr>
-            <p:ph idx="1"/>
-          </p:nvPr>
-        </p:nvSpPr>
-        <p:spPr/>
-        <p:txBody>
-          <a:bodyPr/>
-          <a:lstStyle/>
-          <a:p>
-            <a:endParaRPr lang="en-CH"/>
-          </a:p>
-        </p:txBody>
-      </p:sp>
-    </p:spTree>
-    <p:extLst>
-      <p:ext uri="{BB962C8B-B14F-4D97-AF65-F5344CB8AC3E}">
-        <p14:creationId xmlns:p14="http://schemas.microsoft.com/office/powerpoint/2010/main" val="469849756"/>
-      </p:ext>
-    </p:extLst>
-  </p:cSld>
-  <p:clrMapOvr>
-    <a:masterClrMapping/>
-  </p:clrMapOvr>
-</p:sld>
-</file>
-
 <file path=ppt/theme/theme1.xml><?xml version="1.0" encoding="utf-8"?>
 <a:theme xmlns:a="http://schemas.openxmlformats.org/drawingml/2006/main" name="Office Theme">
   <a:themeElements>

</xml_diff>